<commit_message>
Updated project pitch presentation power point and make a custom background.
</commit_message>
<xml_diff>
--- a/docs/Project-Investor-Pitch.pptx
+++ b/docs/Project-Investor-Pitch.pptx
@@ -6,12 +6,12 @@
   </p:sldMasterIdLst>
   <p:sldIdLst>
     <p:sldId id="256" r:id="rId2"/>
-    <p:sldId id="257" r:id="rId3"/>
+    <p:sldId id="264" r:id="rId3"/>
     <p:sldId id="258" r:id="rId4"/>
     <p:sldId id="259" r:id="rId5"/>
     <p:sldId id="260" r:id="rId6"/>
     <p:sldId id="262" r:id="rId7"/>
-    <p:sldId id="264" r:id="rId8"/>
+    <p:sldId id="273" r:id="rId8"/>
     <p:sldId id="265" r:id="rId9"/>
     <p:sldId id="266" r:id="rId10"/>
     <p:sldId id="267" r:id="rId11"/>
@@ -19,6 +19,7 @@
     <p:sldId id="271" r:id="rId13"/>
     <p:sldId id="270" r:id="rId14"/>
     <p:sldId id="272" r:id="rId15"/>
+    <p:sldId id="274" r:id="rId16"/>
   </p:sldIdLst>
   <p:sldSz cx="12192000" cy="6858000"/>
   <p:notesSz cx="6858000" cy="9144000"/>
@@ -256,7 +257,7 @@
           <a:p>
             <a:fld id="{913D867D-D97B-4959-B47F-FD9CEDE44328}" type="datetimeFigureOut">
               <a:rPr lang="en-PH" smtClean="0"/>
-              <a:t>03/07/2020</a:t>
+              <a:t>04/07/2020</a:t>
             </a:fld>
             <a:endParaRPr lang="en-PH"/>
           </a:p>
@@ -426,7 +427,7 @@
           <a:p>
             <a:fld id="{913D867D-D97B-4959-B47F-FD9CEDE44328}" type="datetimeFigureOut">
               <a:rPr lang="en-PH" smtClean="0"/>
-              <a:t>03/07/2020</a:t>
+              <a:t>04/07/2020</a:t>
             </a:fld>
             <a:endParaRPr lang="en-PH"/>
           </a:p>
@@ -606,7 +607,7 @@
           <a:p>
             <a:fld id="{913D867D-D97B-4959-B47F-FD9CEDE44328}" type="datetimeFigureOut">
               <a:rPr lang="en-PH" smtClean="0"/>
-              <a:t>03/07/2020</a:t>
+              <a:t>04/07/2020</a:t>
             </a:fld>
             <a:endParaRPr lang="en-PH"/>
           </a:p>
@@ -776,7 +777,7 @@
           <a:p>
             <a:fld id="{913D867D-D97B-4959-B47F-FD9CEDE44328}" type="datetimeFigureOut">
               <a:rPr lang="en-PH" smtClean="0"/>
-              <a:t>03/07/2020</a:t>
+              <a:t>04/07/2020</a:t>
             </a:fld>
             <a:endParaRPr lang="en-PH"/>
           </a:p>
@@ -1022,7 +1023,7 @@
           <a:p>
             <a:fld id="{913D867D-D97B-4959-B47F-FD9CEDE44328}" type="datetimeFigureOut">
               <a:rPr lang="en-PH" smtClean="0"/>
-              <a:t>03/07/2020</a:t>
+              <a:t>04/07/2020</a:t>
             </a:fld>
             <a:endParaRPr lang="en-PH"/>
           </a:p>
@@ -1254,7 +1255,7 @@
           <a:p>
             <a:fld id="{913D867D-D97B-4959-B47F-FD9CEDE44328}" type="datetimeFigureOut">
               <a:rPr lang="en-PH" smtClean="0"/>
-              <a:t>03/07/2020</a:t>
+              <a:t>04/07/2020</a:t>
             </a:fld>
             <a:endParaRPr lang="en-PH"/>
           </a:p>
@@ -1621,7 +1622,7 @@
           <a:p>
             <a:fld id="{913D867D-D97B-4959-B47F-FD9CEDE44328}" type="datetimeFigureOut">
               <a:rPr lang="en-PH" smtClean="0"/>
-              <a:t>03/07/2020</a:t>
+              <a:t>04/07/2020</a:t>
             </a:fld>
             <a:endParaRPr lang="en-PH"/>
           </a:p>
@@ -1739,7 +1740,7 @@
           <a:p>
             <a:fld id="{913D867D-D97B-4959-B47F-FD9CEDE44328}" type="datetimeFigureOut">
               <a:rPr lang="en-PH" smtClean="0"/>
-              <a:t>03/07/2020</a:t>
+              <a:t>04/07/2020</a:t>
             </a:fld>
             <a:endParaRPr lang="en-PH"/>
           </a:p>
@@ -1834,7 +1835,7 @@
           <a:p>
             <a:fld id="{913D867D-D97B-4959-B47F-FD9CEDE44328}" type="datetimeFigureOut">
               <a:rPr lang="en-PH" smtClean="0"/>
-              <a:t>03/07/2020</a:t>
+              <a:t>04/07/2020</a:t>
             </a:fld>
             <a:endParaRPr lang="en-PH"/>
           </a:p>
@@ -2111,7 +2112,7 @@
           <a:p>
             <a:fld id="{913D867D-D97B-4959-B47F-FD9CEDE44328}" type="datetimeFigureOut">
               <a:rPr lang="en-PH" smtClean="0"/>
-              <a:t>03/07/2020</a:t>
+              <a:t>04/07/2020</a:t>
             </a:fld>
             <a:endParaRPr lang="en-PH"/>
           </a:p>
@@ -2364,7 +2365,7 @@
           <a:p>
             <a:fld id="{913D867D-D97B-4959-B47F-FD9CEDE44328}" type="datetimeFigureOut">
               <a:rPr lang="en-PH" smtClean="0"/>
-              <a:t>03/07/2020</a:t>
+              <a:t>04/07/2020</a:t>
             </a:fld>
             <a:endParaRPr lang="en-PH"/>
           </a:p>
@@ -2577,7 +2578,7 @@
           <a:p>
             <a:fld id="{913D867D-D97B-4959-B47F-FD9CEDE44328}" type="datetimeFigureOut">
               <a:rPr lang="en-PH" smtClean="0"/>
-              <a:t>03/07/2020</a:t>
+              <a:t>04/07/2020</a:t>
             </a:fld>
             <a:endParaRPr lang="en-PH"/>
           </a:p>
@@ -2970,9 +2971,15 @@
   <p:cSld>
     <p:bg>
       <p:bgPr>
-        <a:solidFill>
-          <a:schemeClr val="bg1"/>
-        </a:solidFill>
+        <a:blipFill dpi="0" rotWithShape="1">
+          <a:blip r:embed="rId2">
+            <a:lum/>
+          </a:blip>
+          <a:srcRect/>
+          <a:stretch>
+            <a:fillRect/>
+          </a:stretch>
+        </a:blipFill>
         <a:effectLst/>
       </p:bgPr>
     </p:bg>
@@ -3000,20 +3007,50 @@
             <p:ph type="subTitle" idx="1"/>
           </p:nvPr>
         </p:nvSpPr>
-        <p:spPr/>
-        <p:txBody>
-          <a:bodyPr/>
+        <p:spPr>
+          <a:xfrm>
+            <a:off x="1523998" y="2687216"/>
+            <a:ext cx="9144000" cy="3083347"/>
+          </a:xfrm>
+        </p:spPr>
+        <p:txBody>
+          <a:bodyPr>
+            <a:normAutofit/>
+          </a:bodyPr>
           <a:lstStyle/>
           <a:p>
             <a:r>
-              <a:rPr lang="en-US" b="1" dirty="0" smtClean="0"/>
+              <a:rPr lang="en-US" sz="4800" i="1" dirty="0" smtClean="0"/>
               <a:t> </a:t>
             </a:r>
             <a:r>
-              <a:rPr lang="en-US" sz="2800" b="1" dirty="0" smtClean="0"/>
-              <a:t>Your On-demand Social Media Delivery App</a:t>
-            </a:r>
-            <a:endParaRPr lang="en-PH" b="1" dirty="0"/>
+              <a:rPr lang="en-US" sz="4800" i="1" dirty="0" smtClean="0"/>
+              <a:t>“</a:t>
+            </a:r>
+            <a:r>
+              <a:rPr lang="en-US" sz="5400" i="1" dirty="0" smtClean="0"/>
+              <a:t>Your </a:t>
+            </a:r>
+            <a:r>
+              <a:rPr lang="en-US" sz="5400" i="1" dirty="0" smtClean="0"/>
+              <a:t>On-demand </a:t>
+            </a:r>
+            <a:r>
+              <a:rPr lang="en-US" sz="5400" i="1" dirty="0" smtClean="0"/>
+              <a:t>Social </a:t>
+            </a:r>
+            <a:r>
+              <a:rPr lang="en-US" sz="5400" i="1" dirty="0" smtClean="0"/>
+              <a:t>Media </a:t>
+            </a:r>
+            <a:endParaRPr lang="en-US" sz="5400" i="1" dirty="0" smtClean="0"/>
+          </a:p>
+          <a:p>
+            <a:r>
+              <a:rPr lang="en-US" sz="5400" i="1" dirty="0" smtClean="0"/>
+              <a:t>Delivery App”</a:t>
+            </a:r>
+            <a:endParaRPr lang="en-PH" sz="4800" i="1" dirty="0"/>
           </a:p>
         </p:txBody>
       </p:sp>
@@ -3026,7 +3063,7 @@
           <p:nvPr/>
         </p:nvPicPr>
         <p:blipFill>
-          <a:blip r:embed="rId2">
+          <a:blip r:embed="rId3">
             <a:extLst>
               <a:ext uri="{28A0092B-C50C-407E-A947-70E740481C1C}">
                 <a14:useLocalDpi xmlns:a14="http://schemas.microsoft.com/office/drawing/2010/main" val="0"/>
@@ -3039,8 +3076,8 @@
         </p:blipFill>
         <p:spPr>
           <a:xfrm>
-            <a:off x="2251351" y="1030288"/>
-            <a:ext cx="7689297" cy="2291410"/>
+            <a:off x="4029484" y="177282"/>
+            <a:ext cx="4133027" cy="1231641"/>
           </a:xfrm>
           <a:prstGeom prst="rect">
             <a:avLst/>
@@ -3057,12 +3094,33 @@
   <p:clrMapOvr>
     <a:masterClrMapping/>
   </p:clrMapOvr>
+  <p:timing>
+    <p:tnLst>
+      <p:par>
+        <p:cTn id="1" dur="indefinite" restart="never" nodeType="tmRoot"/>
+      </p:par>
+    </p:tnLst>
+  </p:timing>
 </p:sld>
 </file>
 
 <file path=ppt/slides/slide10.xml><?xml version="1.0" encoding="utf-8"?>
 <p:sld xmlns:a="http://schemas.openxmlformats.org/drawingml/2006/main" xmlns:r="http://schemas.openxmlformats.org/officeDocument/2006/relationships" xmlns:p="http://schemas.openxmlformats.org/presentationml/2006/main">
   <p:cSld>
+    <p:bg>
+      <p:bgPr>
+        <a:blipFill dpi="0" rotWithShape="1">
+          <a:blip r:embed="rId2">
+            <a:lum/>
+          </a:blip>
+          <a:srcRect/>
+          <a:stretch>
+            <a:fillRect/>
+          </a:stretch>
+        </a:blipFill>
+        <a:effectLst/>
+      </p:bgPr>
+    </p:bg>
     <p:spTree>
       <p:nvGrpSpPr>
         <p:cNvPr id="1" name=""/>
@@ -3092,8 +3150,12 @@
           <a:bodyPr/>
           <a:lstStyle/>
           <a:p>
+            <a:pPr algn="ctr"/>
             <a:r>
               <a:rPr lang="en-AU" b="1" dirty="0">
+                <a:solidFill>
+                  <a:schemeClr val="bg1"/>
+                </a:solidFill>
                 <a:effectLst>
                   <a:outerShdw blurRad="38100" dist="38100" dir="2700000" algn="tl">
                     <a:srgbClr val="000000">
@@ -3105,6 +3167,9 @@
               <a:t>COMPETITIVE ADVANTAGE</a:t>
             </a:r>
             <a:endParaRPr lang="en-PH" b="1" dirty="0">
+              <a:solidFill>
+                <a:schemeClr val="bg1"/>
+              </a:solidFill>
               <a:effectLst>
                 <a:outerShdw blurRad="38100" dist="38100" dir="2700000" algn="tl">
                   <a:srgbClr val="000000">
@@ -3139,8 +3204,12 @@
               <a:t>First in the Market </a:t>
             </a:r>
             <a:r>
+              <a:rPr lang="en-AU" sz="3600" dirty="0" smtClean="0"/>
+              <a:t>– for </a:t>
+            </a:r>
+            <a:r>
               <a:rPr lang="en-AU" sz="3600" dirty="0"/>
-              <a:t>– for being social media on-demand app</a:t>
+              <a:t>being social media on-demand app</a:t>
             </a:r>
             <a:endParaRPr lang="en-PH" sz="3600" dirty="0"/>
           </a:p>
@@ -3152,7 +3221,15 @@
             </a:r>
             <a:r>
               <a:rPr lang="en-AU" sz="3600" dirty="0"/>
-              <a:t>– Movers &amp; Shops owners doesn’t need to download different aps.</a:t>
+              <a:t>– Movers &amp; Shops owners doesn’t need to download different </a:t>
+            </a:r>
+            <a:r>
+              <a:rPr lang="en-AU" sz="3600" dirty="0" smtClean="0"/>
+              <a:t>apps</a:t>
+            </a:r>
+            <a:r>
+              <a:rPr lang="en-AU" sz="3600" dirty="0"/>
+              <a:t>.</a:t>
             </a:r>
             <a:endParaRPr lang="en-PH" sz="3600" dirty="0"/>
           </a:p>
@@ -3215,12 +3292,33 @@
   <p:clrMapOvr>
     <a:masterClrMapping/>
   </p:clrMapOvr>
+  <p:timing>
+    <p:tnLst>
+      <p:par>
+        <p:cTn id="1" dur="indefinite" restart="never" nodeType="tmRoot"/>
+      </p:par>
+    </p:tnLst>
+  </p:timing>
 </p:sld>
 </file>
 
 <file path=ppt/slides/slide11.xml><?xml version="1.0" encoding="utf-8"?>
 <p:sld xmlns:a="http://schemas.openxmlformats.org/drawingml/2006/main" xmlns:r="http://schemas.openxmlformats.org/officeDocument/2006/relationships" xmlns:p="http://schemas.openxmlformats.org/presentationml/2006/main">
   <p:cSld>
+    <p:bg>
+      <p:bgPr>
+        <a:blipFill dpi="0" rotWithShape="1">
+          <a:blip r:embed="rId2">
+            <a:lum/>
+          </a:blip>
+          <a:srcRect/>
+          <a:stretch>
+            <a:fillRect/>
+          </a:stretch>
+        </a:blipFill>
+        <a:effectLst/>
+      </p:bgPr>
+    </p:bg>
     <p:spTree>
       <p:nvGrpSpPr>
         <p:cNvPr id="1" name=""/>
@@ -3250,8 +3348,12 @@
           <a:bodyPr/>
           <a:lstStyle/>
           <a:p>
+            <a:pPr algn="ctr"/>
             <a:r>
               <a:rPr lang="en-AU" b="1" dirty="0">
+                <a:solidFill>
+                  <a:schemeClr val="bg1"/>
+                </a:solidFill>
                 <a:effectLst>
                   <a:outerShdw blurRad="38100" dist="38100" dir="2700000" algn="tl">
                     <a:srgbClr val="000000">
@@ -3263,6 +3365,9 @@
               <a:t>GO-TO MARKET </a:t>
             </a:r>
             <a:endParaRPr lang="en-PH" b="1" dirty="0">
+              <a:solidFill>
+                <a:schemeClr val="bg1"/>
+              </a:solidFill>
               <a:effectLst>
                 <a:outerShdw blurRad="38100" dist="38100" dir="2700000" algn="tl">
                   <a:srgbClr val="000000">
@@ -3292,64 +3397,64 @@
           <a:lstStyle/>
           <a:p>
             <a:r>
-              <a:rPr lang="en-AU" b="1" dirty="0" smtClean="0"/>
+              <a:rPr lang="en-AU" sz="3200" b="1" dirty="0" smtClean="0"/>
               <a:t>Referral </a:t>
             </a:r>
             <a:r>
-              <a:rPr lang="en-AU" b="1" dirty="0"/>
+              <a:rPr lang="en-AU" sz="3200" b="1" dirty="0"/>
               <a:t>System </a:t>
             </a:r>
             <a:r>
-              <a:rPr lang="en-AU" dirty="0"/>
+              <a:rPr lang="en-AU" sz="3200" dirty="0"/>
               <a:t>– User refers the app to another user to get Discounts/Vouchers</a:t>
             </a:r>
-            <a:endParaRPr lang="en-PH" dirty="0"/>
-          </a:p>
-          <a:p>
-            <a:r>
-              <a:rPr lang="en-AU" b="1" dirty="0"/>
+            <a:endParaRPr lang="en-PH" sz="3200" dirty="0"/>
+          </a:p>
+          <a:p>
+            <a:r>
+              <a:rPr lang="en-AU" sz="3200" b="1" dirty="0"/>
               <a:t>Social Media </a:t>
             </a:r>
             <a:r>
-              <a:rPr lang="en-AU" dirty="0"/>
+              <a:rPr lang="en-AU" sz="3200" dirty="0"/>
               <a:t>– Partnerships with </a:t>
             </a:r>
             <a:r>
-              <a:rPr lang="en-AU" dirty="0" smtClean="0"/>
+              <a:rPr lang="en-AU" sz="3200" dirty="0" smtClean="0"/>
               <a:t>Influencers, </a:t>
             </a:r>
             <a:r>
-              <a:rPr lang="en-AU" dirty="0"/>
+              <a:rPr lang="en-AU" sz="3200" dirty="0"/>
               <a:t>Page </a:t>
             </a:r>
             <a:r>
-              <a:rPr lang="en-AU" dirty="0" smtClean="0"/>
+              <a:rPr lang="en-AU" sz="3200" dirty="0" smtClean="0"/>
               <a:t>Groups, Facebook and Google Ads. </a:t>
             </a:r>
-            <a:endParaRPr lang="en-PH" dirty="0"/>
-          </a:p>
-          <a:p>
-            <a:r>
-              <a:rPr lang="en-AU" b="1" dirty="0"/>
+            <a:endParaRPr lang="en-PH" sz="3200" dirty="0"/>
+          </a:p>
+          <a:p>
+            <a:r>
+              <a:rPr lang="en-AU" sz="3200" b="1" dirty="0"/>
               <a:t>Partners Page </a:t>
             </a:r>
             <a:r>
-              <a:rPr lang="en-AU" dirty="0"/>
+              <a:rPr lang="en-AU" sz="3200" dirty="0"/>
               <a:t>– Creating a deal with our Partner to make us their Cover Photo.</a:t>
             </a:r>
-            <a:endParaRPr lang="en-PH" dirty="0"/>
-          </a:p>
-          <a:p>
-            <a:r>
-              <a:rPr lang="en-AU" b="1" dirty="0"/>
+            <a:endParaRPr lang="en-PH" sz="3200" dirty="0"/>
+          </a:p>
+          <a:p>
+            <a:r>
+              <a:rPr lang="en-AU" sz="3200" b="1" dirty="0"/>
               <a:t>Posters &amp; Sticker </a:t>
             </a:r>
             <a:r>
-              <a:rPr lang="en-AU" dirty="0"/>
+              <a:rPr lang="en-AU" sz="3200" dirty="0"/>
               <a:t>– on Tricycles and Partners </a:t>
             </a:r>
             <a:r>
-              <a:rPr lang="en-AU" dirty="0" smtClean="0"/>
+              <a:rPr lang="en-AU" sz="3200" dirty="0" smtClean="0"/>
               <a:t>Shops</a:t>
             </a:r>
           </a:p>
@@ -3365,12 +3470,33 @@
   <p:clrMapOvr>
     <a:masterClrMapping/>
   </p:clrMapOvr>
+  <p:timing>
+    <p:tnLst>
+      <p:par>
+        <p:cTn id="1" dur="indefinite" restart="never" nodeType="tmRoot"/>
+      </p:par>
+    </p:tnLst>
+  </p:timing>
 </p:sld>
 </file>
 
 <file path=ppt/slides/slide12.xml><?xml version="1.0" encoding="utf-8"?>
 <p:sld xmlns:a="http://schemas.openxmlformats.org/drawingml/2006/main" xmlns:r="http://schemas.openxmlformats.org/officeDocument/2006/relationships" xmlns:p="http://schemas.openxmlformats.org/presentationml/2006/main">
   <p:cSld>
+    <p:bg>
+      <p:bgPr>
+        <a:blipFill dpi="0" rotWithShape="1">
+          <a:blip r:embed="rId2">
+            <a:lum/>
+          </a:blip>
+          <a:srcRect/>
+          <a:stretch>
+            <a:fillRect/>
+          </a:stretch>
+        </a:blipFill>
+        <a:effectLst/>
+      </p:bgPr>
+    </p:bg>
     <p:spTree>
       <p:nvGrpSpPr>
         <p:cNvPr id="1" name=""/>
@@ -3400,8 +3526,12 @@
           <a:bodyPr/>
           <a:lstStyle/>
           <a:p>
+            <a:pPr algn="ctr"/>
             <a:r>
               <a:rPr lang="en-AU" b="1" dirty="0">
+                <a:solidFill>
+                  <a:schemeClr val="bg1"/>
+                </a:solidFill>
                 <a:effectLst>
                   <a:outerShdw blurRad="38100" dist="38100" dir="2700000" algn="tl">
                     <a:srgbClr val="000000">
@@ -3413,6 +3543,9 @@
               <a:t>MEET OUR TEAM</a:t>
             </a:r>
             <a:endParaRPr lang="en-PH" b="1" dirty="0">
+              <a:solidFill>
+                <a:schemeClr val="bg1"/>
+              </a:solidFill>
               <a:effectLst>
                 <a:outerShdw blurRad="38100" dist="38100" dir="2700000" algn="tl">
                   <a:srgbClr val="000000">
@@ -3442,7 +3575,7 @@
         </p:spPr>
         <p:txBody>
           <a:bodyPr>
-            <a:normAutofit/>
+            <a:normAutofit fontScale="47500" lnSpcReduction="20000"/>
           </a:bodyPr>
           <a:lstStyle/>
           <a:p>
@@ -3478,7 +3611,71 @@
             <a:pPr marL="0" indent="0" algn="ctr">
               <a:buNone/>
             </a:pPr>
-            <a:endParaRPr lang="en-PH" sz="1400" dirty="0"/>
+            <a:endParaRPr lang="en-US" sz="1400" dirty="0" smtClean="0"/>
+          </a:p>
+          <a:p>
+            <a:pPr marL="0" indent="0" algn="ctr">
+              <a:buNone/>
+            </a:pPr>
+            <a:r>
+              <a:rPr lang="en-US" sz="2900" i="1" dirty="0"/>
+              <a:t>- Registered Electrical Engineer</a:t>
+            </a:r>
+          </a:p>
+          <a:p>
+            <a:pPr marL="0" indent="0" algn="ctr">
+              <a:buNone/>
+            </a:pPr>
+            <a:r>
+              <a:rPr lang="en-US" sz="2900" i="1" dirty="0" smtClean="0"/>
+              <a:t>- Registered </a:t>
+            </a:r>
+            <a:r>
+              <a:rPr lang="en-US" sz="2900" i="1" dirty="0"/>
+              <a:t>Master Electrician</a:t>
+            </a:r>
+          </a:p>
+          <a:p>
+            <a:pPr marL="0" indent="0" algn="ctr">
+              <a:buNone/>
+            </a:pPr>
+            <a:r>
+              <a:rPr lang="en-US" sz="2900" i="1" dirty="0" smtClean="0"/>
+              <a:t>- 11 </a:t>
+            </a:r>
+            <a:r>
+              <a:rPr lang="en-US" sz="2900" i="1" dirty="0" err="1" smtClean="0"/>
+              <a:t>yrs</a:t>
+            </a:r>
+            <a:r>
+              <a:rPr lang="en-US" sz="2900" i="1" dirty="0" smtClean="0"/>
+              <a:t> Experience on</a:t>
+            </a:r>
+          </a:p>
+          <a:p>
+            <a:pPr marL="0" indent="0" algn="ctr">
+              <a:buNone/>
+            </a:pPr>
+            <a:r>
+              <a:rPr lang="en-US" sz="2900" i="1" dirty="0" smtClean="0"/>
+              <a:t>Project Management.</a:t>
+            </a:r>
+          </a:p>
+          <a:p>
+            <a:pPr algn="ctr">
+              <a:buFontTx/>
+              <a:buChar char="-"/>
+            </a:pPr>
+            <a:r>
+              <a:rPr lang="en-US" sz="2900" i="1" dirty="0" smtClean="0"/>
+              <a:t>Completed Project Management Professional Course at Cambridge University.</a:t>
+            </a:r>
+          </a:p>
+          <a:p>
+            <a:pPr marL="0" indent="0" algn="ctr">
+              <a:buNone/>
+            </a:pPr>
+            <a:endParaRPr lang="en-US" sz="2000" i="1" dirty="0" smtClean="0"/>
           </a:p>
         </p:txBody>
       </p:sp>
@@ -3491,7 +3688,7 @@
           <p:nvPr/>
         </p:nvPicPr>
         <p:blipFill>
-          <a:blip r:embed="rId2"/>
+          <a:blip r:embed="rId3"/>
           <a:stretch>
             <a:fillRect/>
           </a:stretch>
@@ -3515,7 +3712,7 @@
           <p:nvPr/>
         </p:nvPicPr>
         <p:blipFill>
-          <a:blip r:embed="rId3"/>
+          <a:blip r:embed="rId4"/>
           <a:stretch>
             <a:fillRect/>
           </a:stretch>
@@ -3539,7 +3736,7 @@
           <p:nvPr/>
         </p:nvPicPr>
         <p:blipFill>
-          <a:blip r:embed="rId4"/>
+          <a:blip r:embed="rId5"/>
           <a:stretch>
             <a:fillRect/>
           </a:stretch>
@@ -3573,7 +3770,7 @@
         </p:spPr>
         <p:txBody>
           <a:bodyPr vert="horz" lIns="91440" tIns="45720" rIns="91440" bIns="45720" rtlCol="0">
-            <a:normAutofit/>
+            <a:normAutofit fontScale="77500" lnSpcReduction="20000"/>
           </a:bodyPr>
           <a:lstStyle>
             <a:lvl1pPr marL="228600" indent="-228600" algn="l" defTabSz="914400" rtl="0" eaLnBrk="1" latinLnBrk="0" hangingPunct="1">
@@ -3766,9 +3963,71 @@
             </a:r>
             <a:r>
               <a:rPr lang="en-PH" sz="1400" dirty="0" smtClean="0"/>
-              <a:t>Technical Officer</a:t>
-            </a:r>
-            <a:endParaRPr lang="en-PH" sz="1400" dirty="0"/>
+              <a:t>Technical </a:t>
+            </a:r>
+            <a:r>
+              <a:rPr lang="en-PH" sz="1400" dirty="0" smtClean="0"/>
+              <a:t>Officer</a:t>
+            </a:r>
+          </a:p>
+          <a:p>
+            <a:pPr marL="0" indent="0" algn="ctr">
+              <a:buNone/>
+            </a:pPr>
+            <a:endParaRPr lang="en-US" sz="1400" dirty="0" smtClean="0"/>
+          </a:p>
+          <a:p>
+            <a:pPr marL="0" indent="0" algn="ctr">
+              <a:buNone/>
+            </a:pPr>
+            <a:r>
+              <a:rPr lang="en-US" sz="1800" i="1" dirty="0" smtClean="0"/>
+              <a:t>- 6 </a:t>
+            </a:r>
+            <a:r>
+              <a:rPr lang="en-US" sz="1800" i="1" dirty="0" err="1" smtClean="0"/>
+              <a:t>yrs</a:t>
+            </a:r>
+            <a:r>
+              <a:rPr lang="en-US" sz="1800" i="1" dirty="0" smtClean="0"/>
+              <a:t> Experience as</a:t>
+            </a:r>
+          </a:p>
+          <a:p>
+            <a:pPr marL="0" indent="0" algn="ctr">
+              <a:buNone/>
+            </a:pPr>
+            <a:r>
+              <a:rPr lang="en-US" sz="1800" i="1" dirty="0" smtClean="0"/>
+              <a:t>Software Developer.</a:t>
+            </a:r>
+          </a:p>
+          <a:p>
+            <a:pPr algn="ctr">
+              <a:buFontTx/>
+              <a:buChar char="-"/>
+            </a:pPr>
+            <a:r>
+              <a:rPr lang="en-US" sz="1800" i="1" dirty="0" smtClean="0"/>
+              <a:t>Published dozens of Company</a:t>
+            </a:r>
+            <a:r>
+              <a:rPr lang="en-PH" sz="1800" i="1" dirty="0"/>
+              <a:t> </a:t>
+            </a:r>
+            <a:r>
+              <a:rPr lang="en-PH" sz="1800" i="1" dirty="0" smtClean="0"/>
+              <a:t>website as Freelance.</a:t>
+            </a:r>
+          </a:p>
+          <a:p>
+            <a:pPr marL="0" indent="0" algn="ctr">
+              <a:buNone/>
+            </a:pPr>
+            <a:r>
+              <a:rPr lang="en-US" sz="1800" i="1" dirty="0" smtClean="0"/>
+              <a:t>- Integrate Network Firewall in a BPO Company.</a:t>
+            </a:r>
           </a:p>
         </p:txBody>
       </p:sp>
@@ -3791,7 +4050,7 @@
         </p:spPr>
         <p:txBody>
           <a:bodyPr vert="horz" lIns="91440" tIns="45720" rIns="91440" bIns="45720" rtlCol="0">
-            <a:normAutofit/>
+            <a:normAutofit fontScale="77500" lnSpcReduction="20000"/>
           </a:bodyPr>
           <a:lstStyle>
             <a:lvl1pPr marL="228600" indent="-228600" algn="l" defTabSz="914400" rtl="0" eaLnBrk="1" latinLnBrk="0" hangingPunct="1">
@@ -4002,10 +4261,91 @@
           </a:p>
           <a:p>
             <a:pPr marL="0" indent="0" algn="ctr">
+              <a:buNone/>
+            </a:pPr>
+            <a:endParaRPr lang="en-US" sz="1200" i="1" dirty="0" smtClean="0"/>
+          </a:p>
+          <a:p>
+            <a:pPr marL="0" indent="0" algn="ctr">
+              <a:buNone/>
+            </a:pPr>
+            <a:r>
+              <a:rPr lang="en-US" sz="2000" i="1" dirty="0"/>
+              <a:t>- </a:t>
+            </a:r>
+            <a:r>
+              <a:rPr lang="en-US" sz="2000" i="1" dirty="0" smtClean="0"/>
+              <a:t>Electronics </a:t>
+            </a:r>
+            <a:r>
+              <a:rPr lang="en-US" sz="2000" i="1" dirty="0"/>
+              <a:t>and Communication </a:t>
+            </a:r>
+            <a:r>
+              <a:rPr lang="en-US" sz="2000" i="1" dirty="0" smtClean="0"/>
+              <a:t>Engineer.</a:t>
+            </a:r>
+          </a:p>
+          <a:p>
+            <a:pPr marL="0" indent="0" algn="ctr">
               <a:buFont typeface="Arial" panose="020B0604020202020204" pitchFamily="34" charset="0"/>
               <a:buNone/>
             </a:pPr>
-            <a:endParaRPr lang="en-PH" sz="1800" dirty="0"/>
+            <a:r>
+              <a:rPr lang="en-US" sz="2000" i="1" dirty="0" smtClean="0"/>
+              <a:t>- </a:t>
+            </a:r>
+            <a:r>
+              <a:rPr lang="en-US" sz="2000" i="1" dirty="0" smtClean="0"/>
+              <a:t>14 </a:t>
+            </a:r>
+            <a:r>
+              <a:rPr lang="en-US" sz="2000" i="1" dirty="0" err="1" smtClean="0"/>
+              <a:t>yrs</a:t>
+            </a:r>
+            <a:r>
+              <a:rPr lang="en-US" sz="2000" i="1" dirty="0" smtClean="0"/>
+              <a:t> Experience as</a:t>
+            </a:r>
+          </a:p>
+          <a:p>
+            <a:pPr marL="0" indent="0" algn="ctr">
+              <a:buFont typeface="Arial" panose="020B0604020202020204" pitchFamily="34" charset="0"/>
+              <a:buNone/>
+            </a:pPr>
+            <a:r>
+              <a:rPr lang="en-US" sz="2000" i="1" dirty="0" smtClean="0"/>
+              <a:t>Process Engineer.</a:t>
+            </a:r>
+          </a:p>
+          <a:p>
+            <a:pPr marL="0" indent="0" algn="ctr">
+              <a:buNone/>
+            </a:pPr>
+            <a:r>
+              <a:rPr lang="en-US" sz="2000" i="1" dirty="0" smtClean="0"/>
+              <a:t>-  </a:t>
+            </a:r>
+            <a:r>
+              <a:rPr lang="en-US" sz="2000" i="1" dirty="0"/>
+              <a:t>Project Operation Manager </a:t>
+            </a:r>
+          </a:p>
+          <a:p>
+            <a:pPr marL="0" indent="0" algn="ctr">
+              <a:buNone/>
+            </a:pPr>
+            <a:r>
+              <a:rPr lang="en-US" sz="2000" i="1" dirty="0"/>
+              <a:t>at AMKOR Tech Phil.</a:t>
+            </a:r>
+          </a:p>
+          <a:p>
+            <a:pPr marL="0" indent="0" algn="ctr">
+              <a:buFont typeface="Arial" panose="020B0604020202020204" pitchFamily="34" charset="0"/>
+              <a:buNone/>
+            </a:pPr>
+            <a:endParaRPr lang="en-PH" sz="2000" dirty="0"/>
           </a:p>
         </p:txBody>
       </p:sp>
@@ -4032,6 +4372,20 @@
 <file path=ppt/slides/slide13.xml><?xml version="1.0" encoding="utf-8"?>
 <p:sld xmlns:a="http://schemas.openxmlformats.org/drawingml/2006/main" xmlns:r="http://schemas.openxmlformats.org/officeDocument/2006/relationships" xmlns:p="http://schemas.openxmlformats.org/presentationml/2006/main">
   <p:cSld>
+    <p:bg>
+      <p:bgPr>
+        <a:blipFill dpi="0" rotWithShape="1">
+          <a:blip r:embed="rId2">
+            <a:lum/>
+          </a:blip>
+          <a:srcRect/>
+          <a:stretch>
+            <a:fillRect/>
+          </a:stretch>
+        </a:blipFill>
+        <a:effectLst/>
+      </p:bgPr>
+    </p:bg>
     <p:spTree>
       <p:nvGrpSpPr>
         <p:cNvPr id="1" name=""/>
@@ -4061,8 +4415,12 @@
           <a:bodyPr/>
           <a:lstStyle/>
           <a:p>
+            <a:pPr algn="ctr"/>
             <a:r>
               <a:rPr lang="en-AU" b="1" dirty="0" smtClean="0">
+                <a:solidFill>
+                  <a:schemeClr val="bg1"/>
+                </a:solidFill>
                 <a:effectLst>
                   <a:outerShdw blurRad="38100" dist="38100" dir="2700000" algn="tl">
                     <a:srgbClr val="000000">
@@ -4074,6 +4432,9 @@
               <a:t>TRACTION </a:t>
             </a:r>
             <a:endParaRPr lang="en-PH" b="1" dirty="0">
+              <a:solidFill>
+                <a:schemeClr val="bg1"/>
+              </a:solidFill>
               <a:effectLst>
                 <a:outerShdw blurRad="38100" dist="38100" dir="2700000" algn="tl">
                   <a:srgbClr val="000000">
@@ -4098,18 +4459,22 @@
         <p:spPr/>
         <p:txBody>
           <a:bodyPr>
-            <a:normAutofit/>
+            <a:normAutofit lnSpcReduction="10000"/>
           </a:bodyPr>
           <a:lstStyle/>
           <a:p>
             <a:pPr lvl="0"/>
             <a:r>
               <a:rPr lang="en-AU" dirty="0" err="1" smtClean="0"/>
-              <a:t>Pasabuy.app</a:t>
+              <a:t>PasaBuy.App</a:t>
             </a:r>
             <a:r>
               <a:rPr lang="en-AU" dirty="0" smtClean="0"/>
-              <a:t> website up</a:t>
+              <a:t> </a:t>
+            </a:r>
+            <a:r>
+              <a:rPr lang="en-AU" dirty="0" smtClean="0"/>
+              <a:t>website up</a:t>
             </a:r>
             <a:endParaRPr lang="en-PH" dirty="0" smtClean="0"/>
           </a:p>
@@ -4133,7 +4498,22 @@
             <a:pPr lvl="0"/>
             <a:r>
               <a:rPr lang="en-AU" dirty="0" smtClean="0"/>
-              <a:t>30 Food Shops signed as Partner</a:t>
+              <a:t>30 </a:t>
+            </a:r>
+            <a:r>
+              <a:rPr lang="en-AU" dirty="0" smtClean="0"/>
+              <a:t>Food Shops signed as </a:t>
+            </a:r>
+            <a:r>
+              <a:rPr lang="en-AU" dirty="0" smtClean="0"/>
+              <a:t>Partner </a:t>
+            </a:r>
+          </a:p>
+          <a:p>
+            <a:pPr lvl="0"/>
+            <a:r>
+              <a:rPr lang="en-AU" dirty="0" smtClean="0"/>
+              <a:t>82 Interested Food shops</a:t>
             </a:r>
             <a:endParaRPr lang="en-PH" dirty="0" smtClean="0"/>
           </a:p>
@@ -4189,6 +4569,36 @@
           </a:p>
         </p:txBody>
       </p:sp>
+      <p:pic>
+        <p:nvPicPr>
+          <p:cNvPr id="4" name="Picture 3"/>
+          <p:cNvPicPr>
+            <a:picLocks noChangeAspect="1"/>
+          </p:cNvPicPr>
+          <p:nvPr/>
+        </p:nvPicPr>
+        <p:blipFill>
+          <a:blip r:embed="rId3">
+            <a:extLst>
+              <a:ext uri="{28A0092B-C50C-407E-A947-70E740481C1C}">
+                <a14:useLocalDpi xmlns:a14="http://schemas.microsoft.com/office/drawing/2010/main" val="0"/>
+              </a:ext>
+            </a:extLst>
+          </a:blip>
+          <a:stretch>
+            <a:fillRect/>
+          </a:stretch>
+        </p:blipFill>
+        <p:spPr>
+          <a:xfrm>
+            <a:off x="7543800" y="1504950"/>
+            <a:ext cx="4498622" cy="5060950"/>
+          </a:xfrm>
+          <a:prstGeom prst="rect">
+            <a:avLst/>
+          </a:prstGeom>
+        </p:spPr>
+      </p:pic>
     </p:spTree>
     <p:extLst>
       <p:ext uri="{BB962C8B-B14F-4D97-AF65-F5344CB8AC3E}">
@@ -4199,12 +4609,33 @@
   <p:clrMapOvr>
     <a:masterClrMapping/>
   </p:clrMapOvr>
+  <p:timing>
+    <p:tnLst>
+      <p:par>
+        <p:cTn id="1" dur="indefinite" restart="never" nodeType="tmRoot"/>
+      </p:par>
+    </p:tnLst>
+  </p:timing>
 </p:sld>
 </file>
 
 <file path=ppt/slides/slide14.xml><?xml version="1.0" encoding="utf-8"?>
 <p:sld xmlns:a="http://schemas.openxmlformats.org/drawingml/2006/main" xmlns:r="http://schemas.openxmlformats.org/officeDocument/2006/relationships" xmlns:p="http://schemas.openxmlformats.org/presentationml/2006/main">
   <p:cSld>
+    <p:bg>
+      <p:bgPr>
+        <a:blipFill dpi="0" rotWithShape="1">
+          <a:blip r:embed="rId2">
+            <a:lum/>
+          </a:blip>
+          <a:srcRect/>
+          <a:stretch>
+            <a:fillRect/>
+          </a:stretch>
+        </a:blipFill>
+        <a:effectLst/>
+      </p:bgPr>
+    </p:bg>
     <p:spTree>
       <p:nvGrpSpPr>
         <p:cNvPr id="1" name=""/>
@@ -4234,8 +4665,12 @@
           <a:bodyPr/>
           <a:lstStyle/>
           <a:p>
+            <a:pPr algn="ctr"/>
             <a:r>
               <a:rPr lang="en-AU" b="1" dirty="0">
+                <a:solidFill>
+                  <a:schemeClr val="bg1"/>
+                </a:solidFill>
                 <a:effectLst>
                   <a:outerShdw blurRad="38100" dist="38100" dir="2700000" algn="tl">
                     <a:srgbClr val="000000">
@@ -4247,6 +4682,9 @@
               <a:t>FUNDRAISING INFORMATION</a:t>
             </a:r>
             <a:endParaRPr lang="en-PH" b="1" dirty="0">
+              <a:solidFill>
+                <a:schemeClr val="bg1"/>
+              </a:solidFill>
               <a:effectLst>
                 <a:outerShdw blurRad="38100" dist="38100" dir="2700000" algn="tl">
                   <a:srgbClr val="000000">
@@ -4308,19 +4746,54 @@
           <p:nvPr/>
         </p:nvPicPr>
         <p:blipFill>
-          <a:blip r:embed="rId2"/>
+          <a:blip r:embed="rId3"/>
           <a:stretch>
             <a:fillRect/>
           </a:stretch>
         </p:blipFill>
         <p:spPr>
           <a:xfrm>
-            <a:off x="2888413" y="2592910"/>
+            <a:off x="5573901" y="2524226"/>
             <a:ext cx="6114271" cy="3718990"/>
           </a:xfrm>
           <a:prstGeom prst="rect">
             <a:avLst/>
           </a:prstGeom>
+        </p:spPr>
+      </p:pic>
+      <p:pic>
+        <p:nvPicPr>
+          <p:cNvPr id="6" name="Picture 5"/>
+          <p:cNvPicPr>
+            <a:picLocks noChangeAspect="1"/>
+          </p:cNvPicPr>
+          <p:nvPr/>
+        </p:nvPicPr>
+        <p:blipFill>
+          <a:blip r:embed="rId4">
+            <a:extLst>
+              <a:ext uri="{28A0092B-C50C-407E-A947-70E740481C1C}">
+                <a14:useLocalDpi xmlns:a14="http://schemas.microsoft.com/office/drawing/2010/main" val="0"/>
+              </a:ext>
+            </a:extLst>
+          </a:blip>
+          <a:stretch>
+            <a:fillRect/>
+          </a:stretch>
+        </p:blipFill>
+        <p:spPr>
+          <a:xfrm>
+            <a:off x="632181" y="2536926"/>
+            <a:ext cx="4941720" cy="3706290"/>
+          </a:xfrm>
+          <a:prstGeom prst="rect">
+            <a:avLst/>
+          </a:prstGeom>
+          <a:ln w="38100">
+            <a:solidFill>
+              <a:schemeClr val="bg1"/>
+            </a:solidFill>
+          </a:ln>
         </p:spPr>
       </p:pic>
     </p:spTree>
@@ -4333,12 +4806,33 @@
   <p:clrMapOvr>
     <a:masterClrMapping/>
   </p:clrMapOvr>
+  <p:timing>
+    <p:tnLst>
+      <p:par>
+        <p:cTn id="1" dur="indefinite" restart="never" nodeType="tmRoot"/>
+      </p:par>
+    </p:tnLst>
+  </p:timing>
 </p:sld>
 </file>
 
-<file path=ppt/slides/slide2.xml><?xml version="1.0" encoding="utf-8"?>
+<file path=ppt/slides/slide15.xml><?xml version="1.0" encoding="utf-8"?>
 <p:sld xmlns:a="http://schemas.openxmlformats.org/drawingml/2006/main" xmlns:r="http://schemas.openxmlformats.org/officeDocument/2006/relationships" xmlns:p="http://schemas.openxmlformats.org/presentationml/2006/main">
   <p:cSld>
+    <p:bg>
+      <p:bgPr>
+        <a:blipFill dpi="0" rotWithShape="1">
+          <a:blip r:embed="rId2">
+            <a:lum/>
+          </a:blip>
+          <a:srcRect/>
+          <a:stretch>
+            <a:fillRect/>
+          </a:stretch>
+        </a:blipFill>
+        <a:effectLst/>
+      </p:bgPr>
+    </p:bg>
     <p:spTree>
       <p:nvGrpSpPr>
         <p:cNvPr id="1" name=""/>
@@ -4353,116 +4847,103 @@
           <a:chExt cx="0" cy="0"/>
         </a:xfrm>
       </p:grpSpPr>
-      <p:sp>
-        <p:nvSpPr>
-          <p:cNvPr id="2" name="Title 1"/>
-          <p:cNvSpPr>
-            <a:spLocks noGrp="1"/>
-          </p:cNvSpPr>
-          <p:nvPr>
-            <p:ph type="title"/>
-          </p:nvPr>
-        </p:nvSpPr>
-        <p:spPr/>
-        <p:txBody>
-          <a:bodyPr/>
-          <a:lstStyle/>
-          <a:p>
-            <a:r>
-              <a:rPr lang="en-US" b="1" dirty="0" smtClean="0">
-                <a:effectLst>
-                  <a:outerShdw blurRad="38100" dist="38100" dir="2700000" algn="tl">
-                    <a:srgbClr val="000000">
-                      <a:alpha val="43137"/>
-                    </a:srgbClr>
-                  </a:outerShdw>
-                </a:effectLst>
-              </a:rPr>
-              <a:t>PROBLEM</a:t>
-            </a:r>
-            <a:endParaRPr lang="en-PH" b="1" dirty="0">
-              <a:effectLst>
-                <a:outerShdw blurRad="38100" dist="38100" dir="2700000" algn="tl">
-                  <a:srgbClr val="000000">
-                    <a:alpha val="43137"/>
-                  </a:srgbClr>
-                </a:outerShdw>
-              </a:effectLst>
-            </a:endParaRPr>
-          </a:p>
-        </p:txBody>
-      </p:sp>
-      <p:sp>
-        <p:nvSpPr>
-          <p:cNvPr id="3" name="Content Placeholder 2"/>
-          <p:cNvSpPr>
-            <a:spLocks noGrp="1"/>
-          </p:cNvSpPr>
-          <p:nvPr>
-            <p:ph idx="1"/>
-          </p:nvPr>
-        </p:nvSpPr>
-        <p:spPr/>
-        <p:txBody>
-          <a:bodyPr>
-            <a:normAutofit/>
-          </a:bodyPr>
-          <a:lstStyle/>
-          <a:p>
-            <a:r>
-              <a:rPr lang="en-AU" sz="3600" b="1" dirty="0"/>
-              <a:t>Price </a:t>
-            </a:r>
-            <a:r>
-              <a:rPr lang="en-AU" sz="3600" dirty="0"/>
-              <a:t>is an important concern for customers ordering online.</a:t>
-            </a:r>
-            <a:endParaRPr lang="en-PH" sz="3600" dirty="0"/>
-          </a:p>
-          <a:p>
-            <a:r>
-              <a:rPr lang="en-AU" sz="3600" b="1" dirty="0"/>
-              <a:t>Bogus Buyer</a:t>
-            </a:r>
-            <a:r>
-              <a:rPr lang="en-AU" sz="3600" dirty="0"/>
-              <a:t> is now a major concern in the Philippines delivery company.</a:t>
-            </a:r>
-            <a:endParaRPr lang="en-PH" sz="3600" dirty="0"/>
-          </a:p>
-          <a:p>
-            <a:r>
-              <a:rPr lang="en-AU" sz="3600" b="1" dirty="0"/>
-              <a:t>High Commission</a:t>
-            </a:r>
-            <a:r>
-              <a:rPr lang="en-AU" sz="3600" dirty="0"/>
-              <a:t> it gives restaurant owners a hard time to earn profits</a:t>
-            </a:r>
-            <a:r>
-              <a:rPr lang="en-AU" sz="3600" dirty="0" smtClean="0"/>
-              <a:t>.</a:t>
-            </a:r>
-            <a:endParaRPr lang="en-PH" sz="3600" dirty="0"/>
-          </a:p>
-        </p:txBody>
-      </p:sp>
+      <p:pic>
+        <p:nvPicPr>
+          <p:cNvPr id="7" name="Picture 6"/>
+          <p:cNvPicPr>
+            <a:picLocks noChangeAspect="1"/>
+          </p:cNvPicPr>
+          <p:nvPr/>
+        </p:nvPicPr>
+        <p:blipFill>
+          <a:blip r:embed="rId3">
+            <a:extLst>
+              <a:ext uri="{28A0092B-C50C-407E-A947-70E740481C1C}">
+                <a14:useLocalDpi xmlns:a14="http://schemas.microsoft.com/office/drawing/2010/main" val="0"/>
+              </a:ext>
+            </a:extLst>
+          </a:blip>
+          <a:stretch>
+            <a:fillRect/>
+          </a:stretch>
+        </p:blipFill>
+        <p:spPr>
+          <a:xfrm>
+            <a:off x="3176385" y="2240135"/>
+            <a:ext cx="5839230" cy="3489635"/>
+          </a:xfrm>
+          <a:prstGeom prst="rect">
+            <a:avLst/>
+          </a:prstGeom>
+        </p:spPr>
+      </p:pic>
+      <p:pic>
+        <p:nvPicPr>
+          <p:cNvPr id="8" name="Picture 7"/>
+          <p:cNvPicPr>
+            <a:picLocks noChangeAspect="1"/>
+          </p:cNvPicPr>
+          <p:nvPr/>
+        </p:nvPicPr>
+        <p:blipFill>
+          <a:blip r:embed="rId4">
+            <a:extLst>
+              <a:ext uri="{28A0092B-C50C-407E-A947-70E740481C1C}">
+                <a14:useLocalDpi xmlns:a14="http://schemas.microsoft.com/office/drawing/2010/main" val="0"/>
+              </a:ext>
+            </a:extLst>
+          </a:blip>
+          <a:stretch>
+            <a:fillRect/>
+          </a:stretch>
+        </p:blipFill>
+        <p:spPr>
+          <a:xfrm>
+            <a:off x="4181884" y="177282"/>
+            <a:ext cx="4133027" cy="1231641"/>
+          </a:xfrm>
+          <a:prstGeom prst="rect">
+            <a:avLst/>
+          </a:prstGeom>
+        </p:spPr>
+      </p:pic>
     </p:spTree>
     <p:extLst>
       <p:ext uri="{BB962C8B-B14F-4D97-AF65-F5344CB8AC3E}">
-        <p14:creationId xmlns:p14="http://schemas.microsoft.com/office/powerpoint/2010/main" val="368259527"/>
+        <p14:creationId xmlns:p14="http://schemas.microsoft.com/office/powerpoint/2010/main" val="4181943349"/>
       </p:ext>
     </p:extLst>
   </p:cSld>
   <p:clrMapOvr>
     <a:masterClrMapping/>
   </p:clrMapOvr>
+  <p:timing>
+    <p:tnLst>
+      <p:par>
+        <p:cTn id="1" dur="indefinite" restart="never" nodeType="tmRoot"/>
+      </p:par>
+    </p:tnLst>
+  </p:timing>
 </p:sld>
 </file>
 
-<file path=ppt/slides/slide3.xml><?xml version="1.0" encoding="utf-8"?>
+<file path=ppt/slides/slide2.xml><?xml version="1.0" encoding="utf-8"?>
 <p:sld xmlns:a="http://schemas.openxmlformats.org/drawingml/2006/main" xmlns:r="http://schemas.openxmlformats.org/officeDocument/2006/relationships" xmlns:p="http://schemas.openxmlformats.org/presentationml/2006/main">
   <p:cSld>
+    <p:bg>
+      <p:bgPr>
+        <a:blipFill dpi="0" rotWithShape="1">
+          <a:blip r:embed="rId2">
+            <a:lum/>
+          </a:blip>
+          <a:srcRect/>
+          <a:stretch>
+            <a:fillRect/>
+          </a:stretch>
+        </a:blipFill>
+        <a:effectLst/>
+      </p:bgPr>
+    </p:bg>
     <p:spTree>
       <p:nvGrpSpPr>
         <p:cNvPr id="1" name=""/>
@@ -4489,11 +4970,17 @@
         </p:nvSpPr>
         <p:spPr/>
         <p:txBody>
-          <a:bodyPr/>
+          <a:bodyPr>
+            <a:normAutofit/>
+          </a:bodyPr>
           <a:lstStyle/>
           <a:p>
-            <a:r>
-              <a:rPr lang="en-US" b="1" dirty="0" smtClean="0">
+            <a:pPr algn="ctr"/>
+            <a:r>
+              <a:rPr lang="en-AU" sz="4000" b="1" dirty="0" smtClean="0">
+                <a:solidFill>
+                  <a:schemeClr val="bg1"/>
+                </a:solidFill>
                 <a:effectLst>
                   <a:outerShdw blurRad="38100" dist="38100" dir="2700000" algn="tl">
                     <a:srgbClr val="000000">
@@ -4502,9 +4989,12 @@
                   </a:outerShdw>
                 </a:effectLst>
               </a:rPr>
-              <a:t>SOLUTION</a:t>
-            </a:r>
-            <a:endParaRPr lang="en-PH" b="1" dirty="0">
+              <a:t>PROBLEM</a:t>
+            </a:r>
+            <a:endParaRPr lang="en-PH" sz="4000" b="1" dirty="0">
+              <a:solidFill>
+                <a:schemeClr val="bg1"/>
+              </a:solidFill>
               <a:effectLst>
                 <a:outerShdw blurRad="38100" dist="38100" dir="2700000" algn="tl">
                   <a:srgbClr val="000000">
@@ -4526,253 +5016,74 @@
             <p:ph idx="1"/>
           </p:nvPr>
         </p:nvSpPr>
-        <p:spPr/>
+        <p:spPr>
+          <a:xfrm>
+            <a:off x="838200" y="1825625"/>
+            <a:ext cx="3451860" cy="4351338"/>
+          </a:xfrm>
+        </p:spPr>
         <p:txBody>
           <a:bodyPr>
             <a:normAutofit/>
           </a:bodyPr>
           <a:lstStyle/>
           <a:p>
-            <a:pPr lvl="0"/>
-            <a:r>
-              <a:rPr lang="en-AU" sz="3600" dirty="0"/>
-              <a:t>Save money on low delivery fee and discount Vouchers</a:t>
-            </a:r>
-            <a:endParaRPr lang="en-PH" sz="3600" dirty="0"/>
-          </a:p>
-          <a:p>
-            <a:pPr lvl="0"/>
-            <a:r>
-              <a:rPr lang="en-AU" sz="3600" dirty="0"/>
-              <a:t>Make sure </a:t>
-            </a:r>
-            <a:r>
-              <a:rPr lang="en-AU" sz="3600" dirty="0" err="1"/>
-              <a:t>sure</a:t>
-            </a:r>
-            <a:r>
-              <a:rPr lang="en-AU" sz="3600" dirty="0"/>
-              <a:t> your dealing with Validated Customers by checking their rating and badges.</a:t>
-            </a:r>
-            <a:endParaRPr lang="en-PH" sz="3600" dirty="0"/>
-          </a:p>
-          <a:p>
-            <a:pPr lvl="0"/>
-            <a:r>
-              <a:rPr lang="en-AU" sz="3600" dirty="0"/>
-              <a:t>Lowest commission rate in the market.</a:t>
-            </a:r>
-            <a:endParaRPr lang="en-PH" sz="3600" dirty="0"/>
-          </a:p>
-        </p:txBody>
-      </p:sp>
-    </p:spTree>
-    <p:extLst>
-      <p:ext uri="{BB962C8B-B14F-4D97-AF65-F5344CB8AC3E}">
-        <p14:creationId xmlns:p14="http://schemas.microsoft.com/office/powerpoint/2010/main" val="2325037928"/>
-      </p:ext>
-    </p:extLst>
-  </p:cSld>
-  <p:clrMapOvr>
-    <a:masterClrMapping/>
-  </p:clrMapOvr>
-</p:sld>
-</file>
-
-<file path=ppt/slides/slide4.xml><?xml version="1.0" encoding="utf-8"?>
-<p:sld xmlns:a="http://schemas.openxmlformats.org/drawingml/2006/main" xmlns:r="http://schemas.openxmlformats.org/officeDocument/2006/relationships" xmlns:p="http://schemas.openxmlformats.org/presentationml/2006/main">
-  <p:cSld>
-    <p:spTree>
-      <p:nvGrpSpPr>
-        <p:cNvPr id="1" name=""/>
-        <p:cNvGrpSpPr/>
-        <p:nvPr/>
-      </p:nvGrpSpPr>
-      <p:grpSpPr>
-        <a:xfrm>
-          <a:off x="0" y="0"/>
-          <a:ext cx="0" cy="0"/>
-          <a:chOff x="0" y="0"/>
-          <a:chExt cx="0" cy="0"/>
-        </a:xfrm>
-      </p:grpSpPr>
-      <p:sp>
-        <p:nvSpPr>
-          <p:cNvPr id="2" name="Title 1"/>
-          <p:cNvSpPr>
-            <a:spLocks noGrp="1"/>
-          </p:cNvSpPr>
-          <p:nvPr>
-            <p:ph type="title"/>
-          </p:nvPr>
-        </p:nvSpPr>
-        <p:spPr/>
-        <p:txBody>
-          <a:bodyPr/>
-          <a:lstStyle/>
-          <a:p>
-            <a:r>
-              <a:rPr lang="en-US" b="1" dirty="0" smtClean="0">
-                <a:effectLst>
-                  <a:outerShdw blurRad="38100" dist="38100" dir="2700000" algn="tl">
-                    <a:srgbClr val="000000">
-                      <a:alpha val="43137"/>
-                    </a:srgbClr>
-                  </a:outerShdw>
-                </a:effectLst>
-              </a:rPr>
-              <a:t>VIDEO DEMO</a:t>
-            </a:r>
-            <a:endParaRPr lang="en-PH" b="1" dirty="0">
-              <a:effectLst>
-                <a:outerShdw blurRad="38100" dist="38100" dir="2700000" algn="tl">
-                  <a:srgbClr val="000000">
-                    <a:alpha val="43137"/>
-                  </a:srgbClr>
-                </a:outerShdw>
-              </a:effectLst>
-            </a:endParaRPr>
-          </a:p>
-        </p:txBody>
-      </p:sp>
-      <p:sp>
-        <p:nvSpPr>
-          <p:cNvPr id="3" name="Content Placeholder 2"/>
-          <p:cNvSpPr>
-            <a:spLocks noGrp="1"/>
-          </p:cNvSpPr>
-          <p:nvPr>
-            <p:ph idx="1"/>
-          </p:nvPr>
-        </p:nvSpPr>
-        <p:spPr/>
-        <p:txBody>
-          <a:bodyPr>
-            <a:normAutofit/>
-          </a:bodyPr>
-          <a:lstStyle/>
-          <a:p>
-            <a:pPr lvl="0"/>
-            <a:r>
-              <a:rPr lang="en-US" sz="3600" dirty="0" smtClean="0"/>
-              <a:t>DEMO HERE</a:t>
-            </a:r>
-            <a:endParaRPr lang="en-PH" sz="3600" dirty="0"/>
-          </a:p>
-        </p:txBody>
-      </p:sp>
-    </p:spTree>
-    <p:extLst>
-      <p:ext uri="{BB962C8B-B14F-4D97-AF65-F5344CB8AC3E}">
-        <p14:creationId xmlns:p14="http://schemas.microsoft.com/office/powerpoint/2010/main" val="2510533427"/>
-      </p:ext>
-    </p:extLst>
-  </p:cSld>
-  <p:clrMapOvr>
-    <a:masterClrMapping/>
-  </p:clrMapOvr>
-</p:sld>
-</file>
-
-<file path=ppt/slides/slide5.xml><?xml version="1.0" encoding="utf-8"?>
-<p:sld xmlns:a="http://schemas.openxmlformats.org/drawingml/2006/main" xmlns:r="http://schemas.openxmlformats.org/officeDocument/2006/relationships" xmlns:p="http://schemas.openxmlformats.org/presentationml/2006/main">
-  <p:cSld>
-    <p:spTree>
-      <p:nvGrpSpPr>
-        <p:cNvPr id="1" name=""/>
-        <p:cNvGrpSpPr/>
-        <p:nvPr/>
-      </p:nvGrpSpPr>
-      <p:grpSpPr>
-        <a:xfrm>
-          <a:off x="0" y="0"/>
-          <a:ext cx="0" cy="0"/>
-          <a:chOff x="0" y="0"/>
-          <a:chExt cx="0" cy="0"/>
-        </a:xfrm>
-      </p:grpSpPr>
-      <p:sp>
-        <p:nvSpPr>
-          <p:cNvPr id="2" name="Title 1"/>
-          <p:cNvSpPr>
-            <a:spLocks noGrp="1"/>
-          </p:cNvSpPr>
-          <p:nvPr>
-            <p:ph type="title"/>
-          </p:nvPr>
-        </p:nvSpPr>
-        <p:spPr/>
-        <p:txBody>
-          <a:bodyPr/>
-          <a:lstStyle/>
-          <a:p>
-            <a:r>
-              <a:rPr lang="en-US" b="1" dirty="0" smtClean="0">
-                <a:effectLst>
-                  <a:outerShdw blurRad="38100" dist="38100" dir="2700000" algn="tl">
-                    <a:srgbClr val="000000">
-                      <a:alpha val="43137"/>
-                    </a:srgbClr>
-                  </a:outerShdw>
-                </a:effectLst>
-              </a:rPr>
-              <a:t>MARKET VALIDATION</a:t>
-            </a:r>
-            <a:endParaRPr lang="en-PH" b="1" dirty="0">
-              <a:effectLst>
-                <a:outerShdw blurRad="38100" dist="38100" dir="2700000" algn="tl">
-                  <a:srgbClr val="000000">
-                    <a:alpha val="43137"/>
-                  </a:srgbClr>
-                </a:outerShdw>
-              </a:effectLst>
-            </a:endParaRPr>
-          </a:p>
-        </p:txBody>
-      </p:sp>
-      <p:sp>
-        <p:nvSpPr>
-          <p:cNvPr id="3" name="Content Placeholder 2"/>
-          <p:cNvSpPr>
-            <a:spLocks noGrp="1"/>
-          </p:cNvSpPr>
-          <p:nvPr>
-            <p:ph idx="1"/>
-          </p:nvPr>
-        </p:nvSpPr>
-        <p:spPr>
-          <a:xfrm>
-            <a:off x="838200" y="1825625"/>
-            <a:ext cx="5096069" cy="4351338"/>
-          </a:xfrm>
-        </p:spPr>
-        <p:txBody>
-          <a:bodyPr>
-            <a:normAutofit/>
-          </a:bodyPr>
-          <a:lstStyle/>
-          <a:p>
             <a:pPr marL="0" indent="0" algn="ctr">
               <a:buNone/>
             </a:pPr>
-            <a:r>
-              <a:rPr lang="en-AU" sz="5400" b="1" dirty="0"/>
-              <a:t>3,756,007</a:t>
-            </a:r>
-            <a:r>
-              <a:rPr lang="en-AU" sz="5400" dirty="0"/>
-              <a:t> </a:t>
-            </a:r>
-            <a:endParaRPr lang="en-AU" sz="5400" dirty="0" smtClean="0"/>
+            <a:endParaRPr lang="en-AU" sz="2000" b="1" dirty="0" smtClean="0"/>
           </a:p>
           <a:p>
             <a:pPr marL="0" indent="0" algn="ctr">
               <a:buNone/>
             </a:pPr>
-            <a:r>
-              <a:rPr lang="en-AU" sz="1800" dirty="0" smtClean="0"/>
-              <a:t>Total population</a:t>
-            </a:r>
+            <a:endParaRPr lang="en-AU" sz="2000" b="1" dirty="0"/>
+          </a:p>
+          <a:p>
+            <a:pPr marL="0" indent="0" algn="ctr">
+              <a:buNone/>
+            </a:pPr>
+            <a:endParaRPr lang="en-AU" sz="2000" b="1" dirty="0" smtClean="0"/>
+          </a:p>
+          <a:p>
+            <a:pPr marL="0" indent="0" algn="ctr">
+              <a:buNone/>
+            </a:pPr>
+            <a:endParaRPr lang="en-AU" sz="2000" b="1" dirty="0"/>
+          </a:p>
+          <a:p>
+            <a:pPr marL="0" indent="0" algn="ctr">
+              <a:buNone/>
+            </a:pPr>
+            <a:r>
+              <a:rPr lang="en-AU" sz="3600" b="1" dirty="0" smtClean="0"/>
+              <a:t>PRICE</a:t>
+            </a:r>
+            <a:endParaRPr lang="en-AU" sz="3600" dirty="0" smtClean="0"/>
+          </a:p>
+          <a:p>
+            <a:pPr marL="0" indent="0" algn="ctr">
+              <a:buNone/>
+            </a:pPr>
+            <a:endParaRPr lang="en-AU" sz="4000" i="1" dirty="0" smtClean="0"/>
+          </a:p>
+          <a:p>
+            <a:pPr marL="0" indent="0" algn="ctr">
+              <a:buNone/>
+            </a:pPr>
+            <a:r>
+              <a:rPr lang="en-AU" sz="2400" i="1" dirty="0" smtClean="0"/>
+              <a:t>an </a:t>
+            </a:r>
+            <a:r>
+              <a:rPr lang="en-AU" sz="2400" i="1" dirty="0"/>
+              <a:t>important concern for customers ordering online.</a:t>
+            </a:r>
+            <a:endParaRPr lang="en-PH" sz="2400" i="1" dirty="0"/>
+          </a:p>
+          <a:p>
+            <a:pPr algn="ctr"/>
+            <a:endParaRPr lang="en-PH" sz="2000" dirty="0"/>
           </a:p>
         </p:txBody>
       </p:sp>
@@ -4786,8 +5097,8 @@
         </p:nvSpPr>
         <p:spPr>
           <a:xfrm>
-            <a:off x="6257731" y="1825625"/>
-            <a:ext cx="5096069" cy="4351338"/>
+            <a:off x="7901940" y="1690688"/>
+            <a:ext cx="3451860" cy="4351338"/>
           </a:xfrm>
           <a:prstGeom prst="rect">
             <a:avLst/>
@@ -4965,68 +5276,1398 @@
             <a:pPr marL="0" indent="0" algn="ctr">
               <a:buNone/>
             </a:pPr>
-            <a:r>
-              <a:rPr lang="en-AU" sz="5400" b="1" dirty="0" smtClean="0"/>
-              <a:t>301,629</a:t>
-            </a:r>
-            <a:r>
-              <a:rPr lang="en-AU" sz="5400" dirty="0" smtClean="0"/>
-              <a:t> </a:t>
-            </a:r>
+            <a:endParaRPr lang="en-AU" sz="2000" b="1" dirty="0" smtClean="0"/>
           </a:p>
           <a:p>
             <a:pPr marL="0" indent="0" algn="ctr">
               <a:buNone/>
             </a:pPr>
-            <a:r>
-              <a:rPr lang="en-AU" sz="1800" dirty="0" smtClean="0"/>
-              <a:t>Food Delivery App User</a:t>
-            </a:r>
-            <a:endParaRPr lang="en-PH" sz="1800" dirty="0"/>
+            <a:endParaRPr lang="en-AU" sz="2000" b="1" dirty="0" smtClean="0"/>
+          </a:p>
+          <a:p>
+            <a:pPr marL="0" indent="0" algn="ctr">
+              <a:buNone/>
+            </a:pPr>
+            <a:endParaRPr lang="en-AU" sz="2000" b="1" dirty="0" smtClean="0"/>
+          </a:p>
+          <a:p>
+            <a:pPr marL="0" indent="0" algn="ctr">
+              <a:buNone/>
+            </a:pPr>
+            <a:endParaRPr lang="en-AU" b="1" dirty="0" smtClean="0"/>
+          </a:p>
+          <a:p>
+            <a:pPr marL="0" indent="0" algn="ctr">
+              <a:buNone/>
+            </a:pPr>
+            <a:r>
+              <a:rPr lang="en-AU" sz="3600" b="1" dirty="0" smtClean="0"/>
+              <a:t>HIGH COMMISSION</a:t>
+            </a:r>
+            <a:endParaRPr lang="en-AU" sz="3600" b="1" dirty="0" smtClean="0"/>
+          </a:p>
+          <a:p>
+            <a:pPr marL="0" indent="0" algn="ctr">
+              <a:buNone/>
+            </a:pPr>
+            <a:endParaRPr lang="en-AU" sz="100" dirty="0" smtClean="0"/>
+          </a:p>
+          <a:p>
+            <a:pPr marL="0" indent="0" algn="ctr">
+              <a:buNone/>
+            </a:pPr>
+            <a:r>
+              <a:rPr lang="en-AU" sz="2600" i="1" dirty="0" smtClean="0"/>
+              <a:t>gives </a:t>
+            </a:r>
+            <a:r>
+              <a:rPr lang="en-AU" sz="2600" i="1" dirty="0"/>
+              <a:t>restaurant owners a hard time to earn profits</a:t>
+            </a:r>
+            <a:r>
+              <a:rPr lang="en-AU" sz="2600" i="1" dirty="0" smtClean="0"/>
+              <a:t>.</a:t>
+            </a:r>
+            <a:endParaRPr lang="en-PH" sz="2600" i="1" dirty="0"/>
+          </a:p>
+        </p:txBody>
+      </p:sp>
+      <p:sp>
+        <p:nvSpPr>
+          <p:cNvPr id="5" name="Content Placeholder 2"/>
+          <p:cNvSpPr txBox="1">
+            <a:spLocks/>
+          </p:cNvSpPr>
+          <p:nvPr/>
+        </p:nvSpPr>
+        <p:spPr>
+          <a:xfrm>
+            <a:off x="4370070" y="1825625"/>
+            <a:ext cx="3451860" cy="4351338"/>
+          </a:xfrm>
+          <a:prstGeom prst="rect">
+            <a:avLst/>
+          </a:prstGeom>
+        </p:spPr>
+        <p:txBody>
+          <a:bodyPr vert="horz" lIns="91440" tIns="45720" rIns="91440" bIns="45720" rtlCol="0">
+            <a:normAutofit/>
+          </a:bodyPr>
+          <a:lstStyle>
+            <a:lvl1pPr marL="228600" indent="-228600" algn="l" defTabSz="914400" rtl="0" eaLnBrk="1" latinLnBrk="0" hangingPunct="1">
+              <a:lnSpc>
+                <a:spcPct val="90000"/>
+              </a:lnSpc>
+              <a:spcBef>
+                <a:spcPts val="1000"/>
+              </a:spcBef>
+              <a:buFont typeface="Arial" panose="020B0604020202020204" pitchFamily="34" charset="0"/>
+              <a:buChar char="•"/>
+              <a:defRPr sz="2800" kern="1200">
+                <a:solidFill>
+                  <a:schemeClr val="tx1"/>
+                </a:solidFill>
+                <a:latin typeface="+mn-lt"/>
+                <a:ea typeface="+mn-ea"/>
+                <a:cs typeface="+mn-cs"/>
+              </a:defRPr>
+            </a:lvl1pPr>
+            <a:lvl2pPr marL="685800" indent="-228600" algn="l" defTabSz="914400" rtl="0" eaLnBrk="1" latinLnBrk="0" hangingPunct="1">
+              <a:lnSpc>
+                <a:spcPct val="90000"/>
+              </a:lnSpc>
+              <a:spcBef>
+                <a:spcPts val="500"/>
+              </a:spcBef>
+              <a:buFont typeface="Arial" panose="020B0604020202020204" pitchFamily="34" charset="0"/>
+              <a:buChar char="•"/>
+              <a:defRPr sz="2400" kern="1200">
+                <a:solidFill>
+                  <a:schemeClr val="tx1"/>
+                </a:solidFill>
+                <a:latin typeface="+mn-lt"/>
+                <a:ea typeface="+mn-ea"/>
+                <a:cs typeface="+mn-cs"/>
+              </a:defRPr>
+            </a:lvl2pPr>
+            <a:lvl3pPr marL="1143000" indent="-228600" algn="l" defTabSz="914400" rtl="0" eaLnBrk="1" latinLnBrk="0" hangingPunct="1">
+              <a:lnSpc>
+                <a:spcPct val="90000"/>
+              </a:lnSpc>
+              <a:spcBef>
+                <a:spcPts val="500"/>
+              </a:spcBef>
+              <a:buFont typeface="Arial" panose="020B0604020202020204" pitchFamily="34" charset="0"/>
+              <a:buChar char="•"/>
+              <a:defRPr sz="2000" kern="1200">
+                <a:solidFill>
+                  <a:schemeClr val="tx1"/>
+                </a:solidFill>
+                <a:latin typeface="+mn-lt"/>
+                <a:ea typeface="+mn-ea"/>
+                <a:cs typeface="+mn-cs"/>
+              </a:defRPr>
+            </a:lvl3pPr>
+            <a:lvl4pPr marL="1600200" indent="-228600" algn="l" defTabSz="914400" rtl="0" eaLnBrk="1" latinLnBrk="0" hangingPunct="1">
+              <a:lnSpc>
+                <a:spcPct val="90000"/>
+              </a:lnSpc>
+              <a:spcBef>
+                <a:spcPts val="500"/>
+              </a:spcBef>
+              <a:buFont typeface="Arial" panose="020B0604020202020204" pitchFamily="34" charset="0"/>
+              <a:buChar char="•"/>
+              <a:defRPr sz="1800" kern="1200">
+                <a:solidFill>
+                  <a:schemeClr val="tx1"/>
+                </a:solidFill>
+                <a:latin typeface="+mn-lt"/>
+                <a:ea typeface="+mn-ea"/>
+                <a:cs typeface="+mn-cs"/>
+              </a:defRPr>
+            </a:lvl4pPr>
+            <a:lvl5pPr marL="2057400" indent="-228600" algn="l" defTabSz="914400" rtl="0" eaLnBrk="1" latinLnBrk="0" hangingPunct="1">
+              <a:lnSpc>
+                <a:spcPct val="90000"/>
+              </a:lnSpc>
+              <a:spcBef>
+                <a:spcPts val="500"/>
+              </a:spcBef>
+              <a:buFont typeface="Arial" panose="020B0604020202020204" pitchFamily="34" charset="0"/>
+              <a:buChar char="•"/>
+              <a:defRPr sz="1800" kern="1200">
+                <a:solidFill>
+                  <a:schemeClr val="tx1"/>
+                </a:solidFill>
+                <a:latin typeface="+mn-lt"/>
+                <a:ea typeface="+mn-ea"/>
+                <a:cs typeface="+mn-cs"/>
+              </a:defRPr>
+            </a:lvl5pPr>
+            <a:lvl6pPr marL="2514600" indent="-228600" algn="l" defTabSz="914400" rtl="0" eaLnBrk="1" latinLnBrk="0" hangingPunct="1">
+              <a:lnSpc>
+                <a:spcPct val="90000"/>
+              </a:lnSpc>
+              <a:spcBef>
+                <a:spcPts val="500"/>
+              </a:spcBef>
+              <a:buFont typeface="Arial" panose="020B0604020202020204" pitchFamily="34" charset="0"/>
+              <a:buChar char="•"/>
+              <a:defRPr sz="1800" kern="1200">
+                <a:solidFill>
+                  <a:schemeClr val="tx1"/>
+                </a:solidFill>
+                <a:latin typeface="+mn-lt"/>
+                <a:ea typeface="+mn-ea"/>
+                <a:cs typeface="+mn-cs"/>
+              </a:defRPr>
+            </a:lvl6pPr>
+            <a:lvl7pPr marL="2971800" indent="-228600" algn="l" defTabSz="914400" rtl="0" eaLnBrk="1" latinLnBrk="0" hangingPunct="1">
+              <a:lnSpc>
+                <a:spcPct val="90000"/>
+              </a:lnSpc>
+              <a:spcBef>
+                <a:spcPts val="500"/>
+              </a:spcBef>
+              <a:buFont typeface="Arial" panose="020B0604020202020204" pitchFamily="34" charset="0"/>
+              <a:buChar char="•"/>
+              <a:defRPr sz="1800" kern="1200">
+                <a:solidFill>
+                  <a:schemeClr val="tx1"/>
+                </a:solidFill>
+                <a:latin typeface="+mn-lt"/>
+                <a:ea typeface="+mn-ea"/>
+                <a:cs typeface="+mn-cs"/>
+              </a:defRPr>
+            </a:lvl7pPr>
+            <a:lvl8pPr marL="3429000" indent="-228600" algn="l" defTabSz="914400" rtl="0" eaLnBrk="1" latinLnBrk="0" hangingPunct="1">
+              <a:lnSpc>
+                <a:spcPct val="90000"/>
+              </a:lnSpc>
+              <a:spcBef>
+                <a:spcPts val="500"/>
+              </a:spcBef>
+              <a:buFont typeface="Arial" panose="020B0604020202020204" pitchFamily="34" charset="0"/>
+              <a:buChar char="•"/>
+              <a:defRPr sz="1800" kern="1200">
+                <a:solidFill>
+                  <a:schemeClr val="tx1"/>
+                </a:solidFill>
+                <a:latin typeface="+mn-lt"/>
+                <a:ea typeface="+mn-ea"/>
+                <a:cs typeface="+mn-cs"/>
+              </a:defRPr>
+            </a:lvl8pPr>
+            <a:lvl9pPr marL="3886200" indent="-228600" algn="l" defTabSz="914400" rtl="0" eaLnBrk="1" latinLnBrk="0" hangingPunct="1">
+              <a:lnSpc>
+                <a:spcPct val="90000"/>
+              </a:lnSpc>
+              <a:spcBef>
+                <a:spcPts val="500"/>
+              </a:spcBef>
+              <a:buFont typeface="Arial" panose="020B0604020202020204" pitchFamily="34" charset="0"/>
+              <a:buChar char="•"/>
+              <a:defRPr sz="1800" kern="1200">
+                <a:solidFill>
+                  <a:schemeClr val="tx1"/>
+                </a:solidFill>
+                <a:latin typeface="+mn-lt"/>
+                <a:ea typeface="+mn-ea"/>
+                <a:cs typeface="+mn-cs"/>
+              </a:defRPr>
+            </a:lvl9pPr>
+          </a:lstStyle>
+          <a:p>
+            <a:pPr marL="0" indent="0" algn="ctr">
+              <a:buNone/>
+            </a:pPr>
+            <a:endParaRPr lang="en-AU" sz="2000" b="1" dirty="0" smtClean="0"/>
+          </a:p>
+          <a:p>
+            <a:pPr marL="0" indent="0" algn="ctr">
+              <a:buNone/>
+            </a:pPr>
+            <a:endParaRPr lang="en-AU" sz="2000" b="1" dirty="0"/>
+          </a:p>
+          <a:p>
+            <a:pPr marL="0" indent="0" algn="ctr">
+              <a:buNone/>
+            </a:pPr>
+            <a:endParaRPr lang="en-AU" sz="2000" b="1" dirty="0" smtClean="0"/>
+          </a:p>
+          <a:p>
+            <a:pPr marL="0" indent="0" algn="ctr">
+              <a:buNone/>
+            </a:pPr>
+            <a:endParaRPr lang="en-AU" sz="2000" b="1" dirty="0"/>
+          </a:p>
+          <a:p>
+            <a:pPr marL="0" indent="0" algn="ctr">
+              <a:buNone/>
+            </a:pPr>
+            <a:r>
+              <a:rPr lang="en-AU" sz="3600" b="1" dirty="0" smtClean="0"/>
+              <a:t>BOGUS BUYER</a:t>
+            </a:r>
+            <a:endParaRPr lang="en-AU" sz="3600" b="1" dirty="0" smtClean="0"/>
+          </a:p>
+          <a:p>
+            <a:pPr marL="0" indent="0" algn="ctr">
+              <a:buNone/>
+            </a:pPr>
+            <a:endParaRPr lang="en-AU" sz="3600" i="1" dirty="0" smtClean="0"/>
+          </a:p>
+          <a:p>
+            <a:pPr marL="0" indent="0" algn="ctr">
+              <a:buNone/>
+            </a:pPr>
+            <a:r>
+              <a:rPr lang="en-AU" sz="2400" i="1" dirty="0" smtClean="0"/>
+              <a:t>now </a:t>
+            </a:r>
+            <a:r>
+              <a:rPr lang="en-AU" sz="2400" i="1" dirty="0"/>
+              <a:t>a major concern in the Philippines delivery </a:t>
+            </a:r>
+            <a:r>
+              <a:rPr lang="en-AU" sz="2400" i="1" dirty="0" smtClean="0"/>
+              <a:t>companies.</a:t>
+            </a:r>
+            <a:endParaRPr lang="en-PH" sz="2400" i="1" dirty="0"/>
           </a:p>
         </p:txBody>
       </p:sp>
       <p:pic>
         <p:nvPicPr>
-          <p:cNvPr id="1026" name="Picture 2" descr="Population Clip Art at Clker.com - vector clip art online, royalty ..."/>
+          <p:cNvPr id="8" name="Picture 7"/>
           <p:cNvPicPr>
-            <a:picLocks noChangeAspect="1" noChangeArrowheads="1"/>
+            <a:picLocks noChangeAspect="1"/>
           </p:cNvPicPr>
           <p:nvPr/>
         </p:nvPicPr>
         <p:blipFill>
-          <a:blip r:embed="rId2">
+          <a:blip r:embed="rId3" cstate="print">
             <a:extLst>
               <a:ext uri="{28A0092B-C50C-407E-A947-70E740481C1C}">
                 <a14:useLocalDpi xmlns:a14="http://schemas.microsoft.com/office/drawing/2010/main" val="0"/>
               </a:ext>
             </a:extLst>
           </a:blip>
+          <a:stretch>
+            <a:fillRect/>
+          </a:stretch>
+        </p:blipFill>
+        <p:spPr>
+          <a:xfrm>
+            <a:off x="1762614" y="1712769"/>
+            <a:ext cx="1603031" cy="1603031"/>
+          </a:xfrm>
+          <a:prstGeom prst="rect">
+            <a:avLst/>
+          </a:prstGeom>
+        </p:spPr>
+      </p:pic>
+      <p:pic>
+        <p:nvPicPr>
+          <p:cNvPr id="9" name="Picture 8"/>
+          <p:cNvPicPr>
+            <a:picLocks noChangeAspect="1"/>
+          </p:cNvPicPr>
+          <p:nvPr/>
+        </p:nvPicPr>
+        <p:blipFill>
+          <a:blip r:embed="rId4" cstate="print">
+            <a:extLst>
+              <a:ext uri="{28A0092B-C50C-407E-A947-70E740481C1C}">
+                <a14:useLocalDpi xmlns:a14="http://schemas.microsoft.com/office/drawing/2010/main" val="0"/>
+              </a:ext>
+            </a:extLst>
+          </a:blip>
+          <a:stretch>
+            <a:fillRect/>
+          </a:stretch>
+        </p:blipFill>
+        <p:spPr>
+          <a:xfrm>
+            <a:off x="5041137" y="1459421"/>
+            <a:ext cx="2109725" cy="2109725"/>
+          </a:xfrm>
+          <a:prstGeom prst="rect">
+            <a:avLst/>
+          </a:prstGeom>
+        </p:spPr>
+      </p:pic>
+      <p:pic>
+        <p:nvPicPr>
+          <p:cNvPr id="10" name="Picture 9"/>
+          <p:cNvPicPr>
+            <a:picLocks noChangeAspect="1"/>
+          </p:cNvPicPr>
+          <p:nvPr/>
+        </p:nvPicPr>
+        <p:blipFill>
+          <a:blip r:embed="rId5" cstate="print">
+            <a:extLst>
+              <a:ext uri="{28A0092B-C50C-407E-A947-70E740481C1C}">
+                <a14:useLocalDpi xmlns:a14="http://schemas.microsoft.com/office/drawing/2010/main" val="0"/>
+              </a:ext>
+            </a:extLst>
+          </a:blip>
+          <a:stretch>
+            <a:fillRect/>
+          </a:stretch>
+        </p:blipFill>
+        <p:spPr>
+          <a:xfrm rot="18464666">
+            <a:off x="8799137" y="1567621"/>
+            <a:ext cx="1913311" cy="1913311"/>
+          </a:xfrm>
+          <a:prstGeom prst="rect">
+            <a:avLst/>
+          </a:prstGeom>
+        </p:spPr>
+      </p:pic>
+    </p:spTree>
+    <p:extLst>
+      <p:ext uri="{BB962C8B-B14F-4D97-AF65-F5344CB8AC3E}">
+        <p14:creationId xmlns:p14="http://schemas.microsoft.com/office/powerpoint/2010/main" val="3415509148"/>
+      </p:ext>
+    </p:extLst>
+  </p:cSld>
+  <p:clrMapOvr>
+    <a:masterClrMapping/>
+  </p:clrMapOvr>
+  <p:timing>
+    <p:tnLst>
+      <p:par>
+        <p:cTn id="1" dur="indefinite" restart="never" nodeType="tmRoot"/>
+      </p:par>
+    </p:tnLst>
+  </p:timing>
+</p:sld>
+</file>
+
+<file path=ppt/slides/slide3.xml><?xml version="1.0" encoding="utf-8"?>
+<p:sld xmlns:a="http://schemas.openxmlformats.org/drawingml/2006/main" xmlns:r="http://schemas.openxmlformats.org/officeDocument/2006/relationships" xmlns:p="http://schemas.openxmlformats.org/presentationml/2006/main">
+  <p:cSld>
+    <p:bg>
+      <p:bgPr>
+        <a:blipFill dpi="0" rotWithShape="1">
+          <a:blip r:embed="rId2">
+            <a:lum/>
+          </a:blip>
           <a:srcRect/>
           <a:stretch>
             <a:fillRect/>
           </a:stretch>
+        </a:blipFill>
+        <a:effectLst/>
+      </p:bgPr>
+    </p:bg>
+    <p:spTree>
+      <p:nvGrpSpPr>
+        <p:cNvPr id="1" name=""/>
+        <p:cNvGrpSpPr/>
+        <p:nvPr/>
+      </p:nvGrpSpPr>
+      <p:grpSpPr>
+        <a:xfrm>
+          <a:off x="0" y="0"/>
+          <a:ext cx="0" cy="0"/>
+          <a:chOff x="0" y="0"/>
+          <a:chExt cx="0" cy="0"/>
+        </a:xfrm>
+      </p:grpSpPr>
+      <p:sp>
+        <p:nvSpPr>
+          <p:cNvPr id="2" name="Title 1"/>
+          <p:cNvSpPr>
+            <a:spLocks noGrp="1"/>
+          </p:cNvSpPr>
+          <p:nvPr>
+            <p:ph type="title"/>
+          </p:nvPr>
+        </p:nvSpPr>
+        <p:spPr/>
+        <p:txBody>
+          <a:bodyPr/>
+          <a:lstStyle/>
+          <a:p>
+            <a:pPr algn="ctr"/>
+            <a:r>
+              <a:rPr lang="en-US" b="1" dirty="0" smtClean="0">
+                <a:solidFill>
+                  <a:schemeClr val="bg1"/>
+                </a:solidFill>
+                <a:effectLst>
+                  <a:outerShdw blurRad="38100" dist="38100" dir="2700000" algn="tl">
+                    <a:srgbClr val="000000">
+                      <a:alpha val="43137"/>
+                    </a:srgbClr>
+                  </a:outerShdw>
+                </a:effectLst>
+              </a:rPr>
+              <a:t>SOLUTION</a:t>
+            </a:r>
+            <a:endParaRPr lang="en-PH" b="1" dirty="0">
+              <a:solidFill>
+                <a:schemeClr val="bg1"/>
+              </a:solidFill>
+              <a:effectLst>
+                <a:outerShdw blurRad="38100" dist="38100" dir="2700000" algn="tl">
+                  <a:srgbClr val="000000">
+                    <a:alpha val="43137"/>
+                  </a:srgbClr>
+                </a:outerShdw>
+              </a:effectLst>
+            </a:endParaRPr>
+          </a:p>
+        </p:txBody>
+      </p:sp>
+      <p:sp>
+        <p:nvSpPr>
+          <p:cNvPr id="3" name="Content Placeholder 2"/>
+          <p:cNvSpPr>
+            <a:spLocks noGrp="1"/>
+          </p:cNvSpPr>
+          <p:nvPr>
+            <p:ph idx="1"/>
+          </p:nvPr>
+        </p:nvSpPr>
+        <p:spPr>
+          <a:xfrm>
+            <a:off x="469641" y="1757850"/>
+            <a:ext cx="11252718" cy="4642950"/>
+          </a:xfrm>
+        </p:spPr>
+        <p:txBody>
+          <a:bodyPr>
+            <a:normAutofit fontScale="92500" lnSpcReduction="20000"/>
+          </a:bodyPr>
+          <a:lstStyle/>
+          <a:p>
+            <a:pPr marL="0" lvl="0" indent="0">
+              <a:buNone/>
+            </a:pPr>
+            <a:r>
+              <a:rPr lang="en-AU" sz="3000" dirty="0" smtClean="0"/>
+              <a:t>	</a:t>
+            </a:r>
+            <a:r>
+              <a:rPr lang="en-AU" sz="3000" dirty="0"/>
+              <a:t>	</a:t>
+            </a:r>
+            <a:r>
+              <a:rPr lang="en-AU" sz="3000" dirty="0" smtClean="0"/>
+              <a:t>  </a:t>
+            </a:r>
+          </a:p>
+          <a:p>
+            <a:pPr marL="0" lvl="0" indent="0">
+              <a:buNone/>
+            </a:pPr>
+            <a:r>
+              <a:rPr lang="en-AU" sz="3600" dirty="0"/>
+              <a:t>	</a:t>
+            </a:r>
+            <a:r>
+              <a:rPr lang="en-AU" sz="3600" dirty="0" smtClean="0"/>
+              <a:t>	  Save </a:t>
+            </a:r>
+            <a:r>
+              <a:rPr lang="en-AU" sz="3600" dirty="0"/>
+              <a:t>money on </a:t>
+            </a:r>
+            <a:r>
+              <a:rPr lang="en-AU" sz="3600" b="1" dirty="0"/>
+              <a:t>low </a:t>
+            </a:r>
+            <a:r>
+              <a:rPr lang="en-AU" sz="3600" b="1" dirty="0" smtClean="0"/>
+              <a:t>delivery </a:t>
+            </a:r>
+          </a:p>
+          <a:p>
+            <a:pPr marL="0" lvl="0" indent="0">
+              <a:buNone/>
+            </a:pPr>
+            <a:r>
+              <a:rPr lang="en-AU" sz="3600" b="1" dirty="0" smtClean="0"/>
+              <a:t>		  fee</a:t>
+            </a:r>
+            <a:r>
+              <a:rPr lang="en-AU" sz="3600" dirty="0" smtClean="0"/>
+              <a:t> </a:t>
+            </a:r>
+            <a:r>
+              <a:rPr lang="en-AU" sz="3600" dirty="0"/>
+              <a:t>and </a:t>
+            </a:r>
+            <a:r>
+              <a:rPr lang="en-AU" sz="3600" b="1" dirty="0"/>
+              <a:t>discount</a:t>
+            </a:r>
+            <a:r>
+              <a:rPr lang="en-AU" sz="3600" dirty="0"/>
+              <a:t> </a:t>
+            </a:r>
+            <a:r>
+              <a:rPr lang="en-AU" sz="3600" dirty="0" smtClean="0"/>
+              <a:t>Vouchers</a:t>
+            </a:r>
+          </a:p>
+          <a:p>
+            <a:pPr marL="0" lvl="0" indent="0">
+              <a:buNone/>
+            </a:pPr>
+            <a:endParaRPr lang="en-PH" sz="1800" dirty="0"/>
+          </a:p>
+          <a:p>
+            <a:pPr marL="0" lvl="0" indent="0" algn="r">
+              <a:buNone/>
+            </a:pPr>
+            <a:r>
+              <a:rPr lang="en-AU" sz="3600" dirty="0"/>
+              <a:t>Make sure </a:t>
+            </a:r>
+            <a:r>
+              <a:rPr lang="en-AU" sz="3600" dirty="0" smtClean="0"/>
+              <a:t>your </a:t>
+            </a:r>
+            <a:r>
+              <a:rPr lang="en-AU" sz="3600" dirty="0"/>
+              <a:t>dealing </a:t>
+            </a:r>
+            <a:r>
+              <a:rPr lang="en-AU" sz="3600" dirty="0" smtClean="0"/>
+              <a:t>with			 </a:t>
+            </a:r>
+          </a:p>
+          <a:p>
+            <a:pPr marL="0" lvl="0" indent="0" algn="r">
+              <a:buNone/>
+            </a:pPr>
+            <a:r>
+              <a:rPr lang="en-AU" sz="3600" b="1" dirty="0" smtClean="0"/>
+              <a:t>Validated Customers</a:t>
+            </a:r>
+            <a:r>
+              <a:rPr lang="en-AU" sz="3600" dirty="0" smtClean="0"/>
+              <a:t> </a:t>
+            </a:r>
+            <a:r>
+              <a:rPr lang="en-AU" sz="3600" dirty="0"/>
+              <a:t>by </a:t>
+            </a:r>
+            <a:r>
+              <a:rPr lang="en-AU" sz="3600" dirty="0" smtClean="0"/>
+              <a:t>checking			 </a:t>
+            </a:r>
+          </a:p>
+          <a:p>
+            <a:pPr marL="0" lvl="0" indent="0" algn="r">
+              <a:buNone/>
+            </a:pPr>
+            <a:r>
+              <a:rPr lang="en-AU" sz="3600" dirty="0" smtClean="0"/>
+              <a:t>their </a:t>
+            </a:r>
+            <a:r>
+              <a:rPr lang="en-AU" sz="3600" b="1" dirty="0"/>
+              <a:t>rating</a:t>
+            </a:r>
+            <a:r>
+              <a:rPr lang="en-AU" sz="3600" dirty="0"/>
+              <a:t> and </a:t>
+            </a:r>
+            <a:r>
+              <a:rPr lang="en-AU" sz="3600" b="1" dirty="0"/>
+              <a:t>badges</a:t>
+            </a:r>
+            <a:r>
+              <a:rPr lang="en-AU" sz="3600" dirty="0" smtClean="0"/>
+              <a:t>.			</a:t>
+            </a:r>
+            <a:endParaRPr lang="en-PH" sz="3600" dirty="0"/>
+          </a:p>
+          <a:p>
+            <a:pPr marL="0" lvl="0" indent="0">
+              <a:buNone/>
+            </a:pPr>
+            <a:endParaRPr lang="en-AU" sz="1800" dirty="0" smtClean="0"/>
+          </a:p>
+          <a:p>
+            <a:pPr marL="0" lvl="0" indent="0">
+              <a:buNone/>
+            </a:pPr>
+            <a:r>
+              <a:rPr lang="en-AU" sz="3600" b="1" dirty="0" smtClean="0"/>
+              <a:t>		  Lowest </a:t>
+            </a:r>
+            <a:r>
+              <a:rPr lang="en-AU" sz="3600" b="1" dirty="0"/>
+              <a:t>commission </a:t>
+            </a:r>
+            <a:r>
+              <a:rPr lang="en-AU" sz="3600" dirty="0"/>
+              <a:t>rate </a:t>
+            </a:r>
+            <a:endParaRPr lang="en-AU" sz="3600" dirty="0" smtClean="0"/>
+          </a:p>
+          <a:p>
+            <a:pPr marL="0" lvl="0" indent="0">
+              <a:buNone/>
+            </a:pPr>
+            <a:r>
+              <a:rPr lang="en-AU" sz="3600" dirty="0" smtClean="0"/>
+              <a:t>		  in </a:t>
+            </a:r>
+            <a:r>
+              <a:rPr lang="en-AU" sz="3600" dirty="0"/>
+              <a:t>the market.</a:t>
+            </a:r>
+            <a:endParaRPr lang="en-PH" sz="3600" dirty="0"/>
+          </a:p>
+        </p:txBody>
+      </p:sp>
+      <p:pic>
+        <p:nvPicPr>
+          <p:cNvPr id="4" name="Picture 3"/>
+          <p:cNvPicPr>
+            <a:picLocks noChangeAspect="1"/>
+          </p:cNvPicPr>
+          <p:nvPr/>
+        </p:nvPicPr>
+        <p:blipFill>
+          <a:blip r:embed="rId3">
+            <a:extLst>
+              <a:ext uri="{28A0092B-C50C-407E-A947-70E740481C1C}">
+                <a14:useLocalDpi xmlns:a14="http://schemas.microsoft.com/office/drawing/2010/main" val="0"/>
+              </a:ext>
+            </a:extLst>
+          </a:blip>
+          <a:stretch>
+            <a:fillRect/>
+          </a:stretch>
         </p:blipFill>
-        <p:spPr bwMode="auto">
+        <p:spPr>
           <a:xfrm>
-            <a:off x="2162166" y="3461656"/>
-            <a:ext cx="2448136" cy="2276767"/>
+            <a:off x="307280" y="1239416"/>
+            <a:ext cx="2343540" cy="2343540"/>
           </a:xfrm>
           <a:prstGeom prst="rect">
             <a:avLst/>
           </a:prstGeom>
-          <a:noFill/>
-          <a:extLst>
-            <a:ext uri="{909E8E84-426E-40DD-AFC4-6F175D3DCCD1}">
-              <a14:hiddenFill xmlns:a14="http://schemas.microsoft.com/office/drawing/2010/main">
-                <a:solidFill>
-                  <a:srgbClr val="FFFFFF"/>
-                </a:solidFill>
-              </a14:hiddenFill>
-            </a:ext>
-          </a:extLst>
         </p:spPr>
       </p:pic>
+      <p:pic>
+        <p:nvPicPr>
+          <p:cNvPr id="5" name="Picture 4"/>
+          <p:cNvPicPr>
+            <a:picLocks noChangeAspect="1"/>
+          </p:cNvPicPr>
+          <p:nvPr/>
+        </p:nvPicPr>
+        <p:blipFill>
+          <a:blip r:embed="rId4">
+            <a:extLst>
+              <a:ext uri="{28A0092B-C50C-407E-A947-70E740481C1C}">
+                <a14:useLocalDpi xmlns:a14="http://schemas.microsoft.com/office/drawing/2010/main" val="0"/>
+              </a:ext>
+            </a:extLst>
+          </a:blip>
+          <a:stretch>
+            <a:fillRect/>
+          </a:stretch>
+        </p:blipFill>
+        <p:spPr>
+          <a:xfrm>
+            <a:off x="8648870" y="2307760"/>
+            <a:ext cx="3543130" cy="3543130"/>
+          </a:xfrm>
+          <a:prstGeom prst="rect">
+            <a:avLst/>
+          </a:prstGeom>
+        </p:spPr>
+      </p:pic>
+      <p:pic>
+        <p:nvPicPr>
+          <p:cNvPr id="6" name="Picture 5"/>
+          <p:cNvPicPr>
+            <a:picLocks noChangeAspect="1"/>
+          </p:cNvPicPr>
+          <p:nvPr/>
+        </p:nvPicPr>
+        <p:blipFill>
+          <a:blip r:embed="rId5">
+            <a:extLst>
+              <a:ext uri="{28A0092B-C50C-407E-A947-70E740481C1C}">
+                <a14:useLocalDpi xmlns:a14="http://schemas.microsoft.com/office/drawing/2010/main" val="0"/>
+              </a:ext>
+            </a:extLst>
+          </a:blip>
+          <a:stretch>
+            <a:fillRect/>
+          </a:stretch>
+        </p:blipFill>
+        <p:spPr>
+          <a:xfrm>
+            <a:off x="251759" y="4281194"/>
+            <a:ext cx="2454582" cy="2454582"/>
+          </a:xfrm>
+          <a:prstGeom prst="rect">
+            <a:avLst/>
+          </a:prstGeom>
+        </p:spPr>
+      </p:pic>
+    </p:spTree>
+    <p:extLst>
+      <p:ext uri="{BB962C8B-B14F-4D97-AF65-F5344CB8AC3E}">
+        <p14:creationId xmlns:p14="http://schemas.microsoft.com/office/powerpoint/2010/main" val="2325037928"/>
+      </p:ext>
+    </p:extLst>
+  </p:cSld>
+  <p:clrMapOvr>
+    <a:masterClrMapping/>
+  </p:clrMapOvr>
+  <p:timing>
+    <p:tnLst>
+      <p:par>
+        <p:cTn id="1" dur="indefinite" restart="never" nodeType="tmRoot"/>
+      </p:par>
+    </p:tnLst>
+  </p:timing>
+</p:sld>
+</file>
+
+<file path=ppt/slides/slide4.xml><?xml version="1.0" encoding="utf-8"?>
+<p:sld xmlns:a="http://schemas.openxmlformats.org/drawingml/2006/main" xmlns:r="http://schemas.openxmlformats.org/officeDocument/2006/relationships" xmlns:p="http://schemas.openxmlformats.org/presentationml/2006/main">
+  <p:cSld>
+    <p:bg>
+      <p:bgPr>
+        <a:blipFill dpi="0" rotWithShape="1">
+          <a:blip r:embed="rId3">
+            <a:lum/>
+          </a:blip>
+          <a:srcRect/>
+          <a:stretch>
+            <a:fillRect/>
+          </a:stretch>
+        </a:blipFill>
+        <a:effectLst/>
+      </p:bgPr>
+    </p:bg>
+    <p:spTree>
+      <p:nvGrpSpPr>
+        <p:cNvPr id="1" name=""/>
+        <p:cNvGrpSpPr/>
+        <p:nvPr/>
+      </p:nvGrpSpPr>
+      <p:grpSpPr>
+        <a:xfrm>
+          <a:off x="0" y="0"/>
+          <a:ext cx="0" cy="0"/>
+          <a:chOff x="0" y="0"/>
+          <a:chExt cx="0" cy="0"/>
+        </a:xfrm>
+      </p:grpSpPr>
+      <p:sp>
+        <p:nvSpPr>
+          <p:cNvPr id="2" name="Title 1"/>
+          <p:cNvSpPr>
+            <a:spLocks noGrp="1"/>
+          </p:cNvSpPr>
+          <p:nvPr>
+            <p:ph type="title"/>
+          </p:nvPr>
+        </p:nvSpPr>
+        <p:spPr/>
+        <p:txBody>
+          <a:bodyPr/>
+          <a:lstStyle/>
+          <a:p>
+            <a:pPr algn="ctr"/>
+            <a:r>
+              <a:rPr lang="en-US" b="1" dirty="0" smtClean="0">
+                <a:solidFill>
+                  <a:schemeClr val="bg1"/>
+                </a:solidFill>
+                <a:effectLst>
+                  <a:outerShdw blurRad="38100" dist="38100" dir="2700000" algn="tl">
+                    <a:srgbClr val="000000">
+                      <a:alpha val="43137"/>
+                    </a:srgbClr>
+                  </a:outerShdw>
+                </a:effectLst>
+              </a:rPr>
+              <a:t>VIDEO DEMO</a:t>
+            </a:r>
+            <a:endParaRPr lang="en-PH" b="1" dirty="0">
+              <a:solidFill>
+                <a:schemeClr val="bg1"/>
+              </a:solidFill>
+              <a:effectLst>
+                <a:outerShdw blurRad="38100" dist="38100" dir="2700000" algn="tl">
+                  <a:srgbClr val="000000">
+                    <a:alpha val="43137"/>
+                  </a:srgbClr>
+                </a:outerShdw>
+              </a:effectLst>
+            </a:endParaRPr>
+          </a:p>
+        </p:txBody>
+      </p:sp>
+      <p:pic>
+        <p:nvPicPr>
+          <p:cNvPr id="5" name="s4LQTCrSZyU"/>
+          <p:cNvPicPr>
+            <a:picLocks noGrp="1" noRot="1" noChangeAspect="1"/>
+          </p:cNvPicPr>
+          <p:nvPr>
+            <p:ph idx="1"/>
+            <a:videoFile r:link="rId1"/>
+          </p:nvPr>
+        </p:nvPicPr>
+        <p:blipFill>
+          <a:blip r:embed="rId4"/>
+          <a:stretch>
+            <a:fillRect/>
+          </a:stretch>
+        </p:blipFill>
+        <p:spPr>
+          <a:xfrm>
+            <a:off x="0" y="0"/>
+            <a:ext cx="12191998" cy="6858000"/>
+          </a:xfrm>
+          <a:prstGeom prst="rect">
+            <a:avLst/>
+          </a:prstGeom>
+        </p:spPr>
+      </p:pic>
+    </p:spTree>
+    <p:extLst>
+      <p:ext uri="{BB962C8B-B14F-4D97-AF65-F5344CB8AC3E}">
+        <p14:creationId xmlns:p14="http://schemas.microsoft.com/office/powerpoint/2010/main" val="2510533427"/>
+      </p:ext>
+    </p:extLst>
+  </p:cSld>
+  <p:clrMapOvr>
+    <a:masterClrMapping/>
+  </p:clrMapOvr>
+  <p:timing>
+    <p:tnLst>
+      <p:par>
+        <p:cTn id="1" dur="indefinite" restart="never" nodeType="tmRoot">
+          <p:childTnLst>
+            <p:seq concurrent="1" nextAc="seek">
+              <p:cTn id="2" dur="indefinite" nodeType="mainSeq">
+                <p:childTnLst>
+                  <p:par>
+                    <p:cTn id="3" fill="hold">
+                      <p:stCondLst>
+                        <p:cond delay="indefinite"/>
+                        <p:cond evt="onBegin" delay="0">
+                          <p:tn val="2"/>
+                        </p:cond>
+                      </p:stCondLst>
+                      <p:childTnLst>
+                        <p:par>
+                          <p:cTn id="4" fill="hold">
+                            <p:stCondLst>
+                              <p:cond delay="0"/>
+                            </p:stCondLst>
+                            <p:childTnLst>
+                              <p:par>
+                                <p:cTn id="5" presetID="1" presetClass="mediacall" presetSubtype="0" fill="hold" nodeType="afterEffect">
+                                  <p:stCondLst>
+                                    <p:cond delay="0"/>
+                                  </p:stCondLst>
+                                  <p:childTnLst>
+                                    <p:cmd type="call" cmd="playFrom(0.0)">
+                                      <p:cBhvr>
+                                        <p:cTn id="6" dur="1" fill="hold"/>
+                                        <p:tgtEl>
+                                          <p:spTgt spid="5"/>
+                                        </p:tgtEl>
+                                      </p:cBhvr>
+                                    </p:cmd>
+                                  </p:childTnLst>
+                                </p:cTn>
+                              </p:par>
+                            </p:childTnLst>
+                          </p:cTn>
+                        </p:par>
+                      </p:childTnLst>
+                    </p:cTn>
+                  </p:par>
+                </p:childTnLst>
+              </p:cTn>
+              <p:prevCondLst>
+                <p:cond evt="onPrev" delay="0">
+                  <p:tgtEl>
+                    <p:sldTgt/>
+                  </p:tgtEl>
+                </p:cond>
+              </p:prevCondLst>
+              <p:nextCondLst>
+                <p:cond evt="onNext" delay="0">
+                  <p:tgtEl>
+                    <p:sldTgt/>
+                  </p:tgtEl>
+                </p:cond>
+              </p:nextCondLst>
+            </p:seq>
+            <p:video>
+              <p:cMediaNode>
+                <p:cTn id="7" fill="hold" display="0">
+                  <p:stCondLst>
+                    <p:cond delay="indefinite"/>
+                  </p:stCondLst>
+                </p:cTn>
+                <p:tgtEl>
+                  <p:spTgt spid="5"/>
+                </p:tgtEl>
+              </p:cMediaNode>
+            </p:video>
+            <p:seq concurrent="1" nextAc="seek">
+              <p:cTn id="8" restart="whenNotActive" fill="hold" evtFilter="cancelBubble" nodeType="interactiveSeq">
+                <p:stCondLst>
+                  <p:cond evt="onClick" delay="0">
+                    <p:tgtEl>
+                      <p:spTgt spid="5"/>
+                    </p:tgtEl>
+                  </p:cond>
+                </p:stCondLst>
+                <p:endSync evt="end" delay="0">
+                  <p:rtn val="all"/>
+                </p:endSync>
+                <p:childTnLst>
+                  <p:par>
+                    <p:cTn id="9" fill="hold">
+                      <p:stCondLst>
+                        <p:cond delay="0"/>
+                      </p:stCondLst>
+                      <p:childTnLst>
+                        <p:par>
+                          <p:cTn id="10" fill="hold">
+                            <p:stCondLst>
+                              <p:cond delay="0"/>
+                            </p:stCondLst>
+                            <p:childTnLst>
+                              <p:par>
+                                <p:cTn id="11" presetID="2" presetClass="mediacall" presetSubtype="0" fill="hold" nodeType="clickEffect">
+                                  <p:stCondLst>
+                                    <p:cond delay="0"/>
+                                  </p:stCondLst>
+                                  <p:childTnLst>
+                                    <p:cmd type="call" cmd="togglePause">
+                                      <p:cBhvr>
+                                        <p:cTn id="12" dur="1" fill="hold"/>
+                                        <p:tgtEl>
+                                          <p:spTgt spid="5"/>
+                                        </p:tgtEl>
+                                      </p:cBhvr>
+                                    </p:cmd>
+                                  </p:childTnLst>
+                                </p:cTn>
+                              </p:par>
+                            </p:childTnLst>
+                          </p:cTn>
+                        </p:par>
+                      </p:childTnLst>
+                    </p:cTn>
+                  </p:par>
+                </p:childTnLst>
+              </p:cTn>
+              <p:nextCondLst>
+                <p:cond evt="onClick" delay="0">
+                  <p:tgtEl>
+                    <p:spTgt spid="5"/>
+                  </p:tgtEl>
+                </p:cond>
+              </p:nextCondLst>
+            </p:seq>
+          </p:childTnLst>
+        </p:cTn>
+      </p:par>
+    </p:tnLst>
+  </p:timing>
+</p:sld>
+</file>
+
+<file path=ppt/slides/slide5.xml><?xml version="1.0" encoding="utf-8"?>
+<p:sld xmlns:a="http://schemas.openxmlformats.org/drawingml/2006/main" xmlns:r="http://schemas.openxmlformats.org/officeDocument/2006/relationships" xmlns:p="http://schemas.openxmlformats.org/presentationml/2006/main">
+  <p:cSld>
+    <p:bg>
+      <p:bgPr>
+        <a:blipFill dpi="0" rotWithShape="1">
+          <a:blip r:embed="rId2">
+            <a:lum/>
+          </a:blip>
+          <a:srcRect/>
+          <a:stretch>
+            <a:fillRect/>
+          </a:stretch>
+        </a:blipFill>
+        <a:effectLst/>
+      </p:bgPr>
+    </p:bg>
+    <p:spTree>
+      <p:nvGrpSpPr>
+        <p:cNvPr id="1" name=""/>
+        <p:cNvGrpSpPr/>
+        <p:nvPr/>
+      </p:nvGrpSpPr>
+      <p:grpSpPr>
+        <a:xfrm>
+          <a:off x="0" y="0"/>
+          <a:ext cx="0" cy="0"/>
+          <a:chOff x="0" y="0"/>
+          <a:chExt cx="0" cy="0"/>
+        </a:xfrm>
+      </p:grpSpPr>
+      <p:sp>
+        <p:nvSpPr>
+          <p:cNvPr id="2" name="Title 1"/>
+          <p:cNvSpPr>
+            <a:spLocks noGrp="1"/>
+          </p:cNvSpPr>
+          <p:nvPr>
+            <p:ph type="title"/>
+          </p:nvPr>
+        </p:nvSpPr>
+        <p:spPr/>
+        <p:txBody>
+          <a:bodyPr/>
+          <a:lstStyle/>
+          <a:p>
+            <a:pPr algn="ctr"/>
+            <a:r>
+              <a:rPr lang="en-US" b="1" dirty="0" smtClean="0">
+                <a:solidFill>
+                  <a:schemeClr val="bg1"/>
+                </a:solidFill>
+                <a:effectLst>
+                  <a:outerShdw blurRad="38100" dist="38100" dir="2700000" algn="tl">
+                    <a:srgbClr val="000000">
+                      <a:alpha val="43137"/>
+                    </a:srgbClr>
+                  </a:outerShdw>
+                </a:effectLst>
+              </a:rPr>
+              <a:t>MARKET VALIDATION</a:t>
+            </a:r>
+            <a:endParaRPr lang="en-PH" b="1" dirty="0">
+              <a:solidFill>
+                <a:schemeClr val="bg1"/>
+              </a:solidFill>
+              <a:effectLst>
+                <a:outerShdw blurRad="38100" dist="38100" dir="2700000" algn="tl">
+                  <a:srgbClr val="000000">
+                    <a:alpha val="43137"/>
+                  </a:srgbClr>
+                </a:outerShdw>
+              </a:effectLst>
+            </a:endParaRPr>
+          </a:p>
+        </p:txBody>
+      </p:sp>
+      <p:sp>
+        <p:nvSpPr>
+          <p:cNvPr id="3" name="Content Placeholder 2"/>
+          <p:cNvSpPr>
+            <a:spLocks noGrp="1"/>
+          </p:cNvSpPr>
+          <p:nvPr>
+            <p:ph idx="1"/>
+          </p:nvPr>
+        </p:nvSpPr>
+        <p:spPr>
+          <a:xfrm>
+            <a:off x="838200" y="1825625"/>
+            <a:ext cx="5096069" cy="4351338"/>
+          </a:xfrm>
+        </p:spPr>
+        <p:txBody>
+          <a:bodyPr>
+            <a:normAutofit/>
+          </a:bodyPr>
+          <a:lstStyle/>
+          <a:p>
+            <a:pPr marL="0" indent="0" algn="ctr">
+              <a:buNone/>
+            </a:pPr>
+            <a:r>
+              <a:rPr lang="en-AU" sz="5400" b="1" dirty="0"/>
+              <a:t>3,756,007</a:t>
+            </a:r>
+            <a:r>
+              <a:rPr lang="en-AU" sz="5400" dirty="0"/>
+              <a:t> </a:t>
+            </a:r>
+            <a:endParaRPr lang="en-AU" sz="5400" dirty="0" smtClean="0"/>
+          </a:p>
+          <a:p>
+            <a:pPr marL="0" indent="0" algn="ctr">
+              <a:buNone/>
+            </a:pPr>
+            <a:r>
+              <a:rPr lang="en-AU" sz="1800" dirty="0" smtClean="0"/>
+              <a:t>Total population</a:t>
+            </a:r>
+          </a:p>
+        </p:txBody>
+      </p:sp>
+      <p:sp>
+        <p:nvSpPr>
+          <p:cNvPr id="4" name="Content Placeholder 2"/>
+          <p:cNvSpPr txBox="1">
+            <a:spLocks/>
+          </p:cNvSpPr>
+          <p:nvPr/>
+        </p:nvSpPr>
+        <p:spPr>
+          <a:xfrm>
+            <a:off x="6257731" y="1825625"/>
+            <a:ext cx="5096069" cy="4351338"/>
+          </a:xfrm>
+          <a:prstGeom prst="rect">
+            <a:avLst/>
+          </a:prstGeom>
+        </p:spPr>
+        <p:txBody>
+          <a:bodyPr vert="horz" lIns="91440" tIns="45720" rIns="91440" bIns="45720" rtlCol="0">
+            <a:normAutofit/>
+          </a:bodyPr>
+          <a:lstStyle>
+            <a:lvl1pPr marL="228600" indent="-228600" algn="l" defTabSz="914400" rtl="0" eaLnBrk="1" latinLnBrk="0" hangingPunct="1">
+              <a:lnSpc>
+                <a:spcPct val="90000"/>
+              </a:lnSpc>
+              <a:spcBef>
+                <a:spcPts val="1000"/>
+              </a:spcBef>
+              <a:buFont typeface="Arial" panose="020B0604020202020204" pitchFamily="34" charset="0"/>
+              <a:buChar char="•"/>
+              <a:defRPr sz="2800" kern="1200">
+                <a:solidFill>
+                  <a:schemeClr val="tx1"/>
+                </a:solidFill>
+                <a:latin typeface="+mn-lt"/>
+                <a:ea typeface="+mn-ea"/>
+                <a:cs typeface="+mn-cs"/>
+              </a:defRPr>
+            </a:lvl1pPr>
+            <a:lvl2pPr marL="685800" indent="-228600" algn="l" defTabSz="914400" rtl="0" eaLnBrk="1" latinLnBrk="0" hangingPunct="1">
+              <a:lnSpc>
+                <a:spcPct val="90000"/>
+              </a:lnSpc>
+              <a:spcBef>
+                <a:spcPts val="500"/>
+              </a:spcBef>
+              <a:buFont typeface="Arial" panose="020B0604020202020204" pitchFamily="34" charset="0"/>
+              <a:buChar char="•"/>
+              <a:defRPr sz="2400" kern="1200">
+                <a:solidFill>
+                  <a:schemeClr val="tx1"/>
+                </a:solidFill>
+                <a:latin typeface="+mn-lt"/>
+                <a:ea typeface="+mn-ea"/>
+                <a:cs typeface="+mn-cs"/>
+              </a:defRPr>
+            </a:lvl2pPr>
+            <a:lvl3pPr marL="1143000" indent="-228600" algn="l" defTabSz="914400" rtl="0" eaLnBrk="1" latinLnBrk="0" hangingPunct="1">
+              <a:lnSpc>
+                <a:spcPct val="90000"/>
+              </a:lnSpc>
+              <a:spcBef>
+                <a:spcPts val="500"/>
+              </a:spcBef>
+              <a:buFont typeface="Arial" panose="020B0604020202020204" pitchFamily="34" charset="0"/>
+              <a:buChar char="•"/>
+              <a:defRPr sz="2000" kern="1200">
+                <a:solidFill>
+                  <a:schemeClr val="tx1"/>
+                </a:solidFill>
+                <a:latin typeface="+mn-lt"/>
+                <a:ea typeface="+mn-ea"/>
+                <a:cs typeface="+mn-cs"/>
+              </a:defRPr>
+            </a:lvl3pPr>
+            <a:lvl4pPr marL="1600200" indent="-228600" algn="l" defTabSz="914400" rtl="0" eaLnBrk="1" latinLnBrk="0" hangingPunct="1">
+              <a:lnSpc>
+                <a:spcPct val="90000"/>
+              </a:lnSpc>
+              <a:spcBef>
+                <a:spcPts val="500"/>
+              </a:spcBef>
+              <a:buFont typeface="Arial" panose="020B0604020202020204" pitchFamily="34" charset="0"/>
+              <a:buChar char="•"/>
+              <a:defRPr sz="1800" kern="1200">
+                <a:solidFill>
+                  <a:schemeClr val="tx1"/>
+                </a:solidFill>
+                <a:latin typeface="+mn-lt"/>
+                <a:ea typeface="+mn-ea"/>
+                <a:cs typeface="+mn-cs"/>
+              </a:defRPr>
+            </a:lvl4pPr>
+            <a:lvl5pPr marL="2057400" indent="-228600" algn="l" defTabSz="914400" rtl="0" eaLnBrk="1" latinLnBrk="0" hangingPunct="1">
+              <a:lnSpc>
+                <a:spcPct val="90000"/>
+              </a:lnSpc>
+              <a:spcBef>
+                <a:spcPts val="500"/>
+              </a:spcBef>
+              <a:buFont typeface="Arial" panose="020B0604020202020204" pitchFamily="34" charset="0"/>
+              <a:buChar char="•"/>
+              <a:defRPr sz="1800" kern="1200">
+                <a:solidFill>
+                  <a:schemeClr val="tx1"/>
+                </a:solidFill>
+                <a:latin typeface="+mn-lt"/>
+                <a:ea typeface="+mn-ea"/>
+                <a:cs typeface="+mn-cs"/>
+              </a:defRPr>
+            </a:lvl5pPr>
+            <a:lvl6pPr marL="2514600" indent="-228600" algn="l" defTabSz="914400" rtl="0" eaLnBrk="1" latinLnBrk="0" hangingPunct="1">
+              <a:lnSpc>
+                <a:spcPct val="90000"/>
+              </a:lnSpc>
+              <a:spcBef>
+                <a:spcPts val="500"/>
+              </a:spcBef>
+              <a:buFont typeface="Arial" panose="020B0604020202020204" pitchFamily="34" charset="0"/>
+              <a:buChar char="•"/>
+              <a:defRPr sz="1800" kern="1200">
+                <a:solidFill>
+                  <a:schemeClr val="tx1"/>
+                </a:solidFill>
+                <a:latin typeface="+mn-lt"/>
+                <a:ea typeface="+mn-ea"/>
+                <a:cs typeface="+mn-cs"/>
+              </a:defRPr>
+            </a:lvl6pPr>
+            <a:lvl7pPr marL="2971800" indent="-228600" algn="l" defTabSz="914400" rtl="0" eaLnBrk="1" latinLnBrk="0" hangingPunct="1">
+              <a:lnSpc>
+                <a:spcPct val="90000"/>
+              </a:lnSpc>
+              <a:spcBef>
+                <a:spcPts val="500"/>
+              </a:spcBef>
+              <a:buFont typeface="Arial" panose="020B0604020202020204" pitchFamily="34" charset="0"/>
+              <a:buChar char="•"/>
+              <a:defRPr sz="1800" kern="1200">
+                <a:solidFill>
+                  <a:schemeClr val="tx1"/>
+                </a:solidFill>
+                <a:latin typeface="+mn-lt"/>
+                <a:ea typeface="+mn-ea"/>
+                <a:cs typeface="+mn-cs"/>
+              </a:defRPr>
+            </a:lvl7pPr>
+            <a:lvl8pPr marL="3429000" indent="-228600" algn="l" defTabSz="914400" rtl="0" eaLnBrk="1" latinLnBrk="0" hangingPunct="1">
+              <a:lnSpc>
+                <a:spcPct val="90000"/>
+              </a:lnSpc>
+              <a:spcBef>
+                <a:spcPts val="500"/>
+              </a:spcBef>
+              <a:buFont typeface="Arial" panose="020B0604020202020204" pitchFamily="34" charset="0"/>
+              <a:buChar char="•"/>
+              <a:defRPr sz="1800" kern="1200">
+                <a:solidFill>
+                  <a:schemeClr val="tx1"/>
+                </a:solidFill>
+                <a:latin typeface="+mn-lt"/>
+                <a:ea typeface="+mn-ea"/>
+                <a:cs typeface="+mn-cs"/>
+              </a:defRPr>
+            </a:lvl8pPr>
+            <a:lvl9pPr marL="3886200" indent="-228600" algn="l" defTabSz="914400" rtl="0" eaLnBrk="1" latinLnBrk="0" hangingPunct="1">
+              <a:lnSpc>
+                <a:spcPct val="90000"/>
+              </a:lnSpc>
+              <a:spcBef>
+                <a:spcPts val="500"/>
+              </a:spcBef>
+              <a:buFont typeface="Arial" panose="020B0604020202020204" pitchFamily="34" charset="0"/>
+              <a:buChar char="•"/>
+              <a:defRPr sz="1800" kern="1200">
+                <a:solidFill>
+                  <a:schemeClr val="tx1"/>
+                </a:solidFill>
+                <a:latin typeface="+mn-lt"/>
+                <a:ea typeface="+mn-ea"/>
+                <a:cs typeface="+mn-cs"/>
+              </a:defRPr>
+            </a:lvl9pPr>
+          </a:lstStyle>
+          <a:p>
+            <a:pPr marL="0" indent="0" algn="ctr">
+              <a:buNone/>
+            </a:pPr>
+            <a:r>
+              <a:rPr lang="en-AU" sz="5400" b="1" dirty="0" smtClean="0"/>
+              <a:t>301,629</a:t>
+            </a:r>
+            <a:r>
+              <a:rPr lang="en-AU" sz="5400" dirty="0" smtClean="0"/>
+              <a:t> </a:t>
+            </a:r>
+          </a:p>
+          <a:p>
+            <a:pPr marL="0" indent="0" algn="ctr">
+              <a:buNone/>
+            </a:pPr>
+            <a:r>
+              <a:rPr lang="en-AU" sz="1800" dirty="0" smtClean="0"/>
+              <a:t>Food Delivery App User</a:t>
+            </a:r>
+            <a:endParaRPr lang="en-PH" sz="1800" dirty="0"/>
+          </a:p>
+        </p:txBody>
+      </p:sp>
       <p:pic>
         <p:nvPicPr>
           <p:cNvPr id="5" name="Picture 4"/>
@@ -5057,6 +6698,36 @@
           </a:prstGeom>
         </p:spPr>
       </p:pic>
+      <p:pic>
+        <p:nvPicPr>
+          <p:cNvPr id="6" name="Picture 5"/>
+          <p:cNvPicPr>
+            <a:picLocks noChangeAspect="1"/>
+          </p:cNvPicPr>
+          <p:nvPr/>
+        </p:nvPicPr>
+        <p:blipFill>
+          <a:blip r:embed="rId4">
+            <a:extLst>
+              <a:ext uri="{28A0092B-C50C-407E-A947-70E740481C1C}">
+                <a14:useLocalDpi xmlns:a14="http://schemas.microsoft.com/office/drawing/2010/main" val="0"/>
+              </a:ext>
+            </a:extLst>
+          </a:blip>
+          <a:stretch>
+            <a:fillRect/>
+          </a:stretch>
+        </p:blipFill>
+        <p:spPr>
+          <a:xfrm>
+            <a:off x="2004991" y="3218796"/>
+            <a:ext cx="2762485" cy="2762485"/>
+          </a:xfrm>
+          <a:prstGeom prst="rect">
+            <a:avLst/>
+          </a:prstGeom>
+        </p:spPr>
+      </p:pic>
     </p:spTree>
     <p:extLst>
       <p:ext uri="{BB962C8B-B14F-4D97-AF65-F5344CB8AC3E}">
@@ -5067,12 +6738,33 @@
   <p:clrMapOvr>
     <a:masterClrMapping/>
   </p:clrMapOvr>
+  <p:timing>
+    <p:tnLst>
+      <p:par>
+        <p:cTn id="1" dur="indefinite" restart="never" nodeType="tmRoot"/>
+      </p:par>
+    </p:tnLst>
+  </p:timing>
 </p:sld>
 </file>
 
 <file path=ppt/slides/slide6.xml><?xml version="1.0" encoding="utf-8"?>
 <p:sld xmlns:a="http://schemas.openxmlformats.org/drawingml/2006/main" xmlns:r="http://schemas.openxmlformats.org/officeDocument/2006/relationships" xmlns:p="http://schemas.openxmlformats.org/presentationml/2006/main">
   <p:cSld>
+    <p:bg>
+      <p:bgPr>
+        <a:blipFill dpi="0" rotWithShape="1">
+          <a:blip r:embed="rId2">
+            <a:lum/>
+          </a:blip>
+          <a:srcRect/>
+          <a:stretch>
+            <a:fillRect/>
+          </a:stretch>
+        </a:blipFill>
+        <a:effectLst/>
+      </p:bgPr>
+    </p:bg>
     <p:spTree>
       <p:nvGrpSpPr>
         <p:cNvPr id="1" name=""/>
@@ -5087,6 +6779,82 @@
           <a:chExt cx="0" cy="0"/>
         </a:xfrm>
       </p:grpSpPr>
+      <p:cxnSp>
+        <p:nvCxnSpPr>
+          <p:cNvPr id="12" name="Straight Connector 11"/>
+          <p:cNvCxnSpPr>
+            <a:stCxn id="9" idx="4"/>
+            <a:endCxn id="11" idx="4"/>
+          </p:cNvCxnSpPr>
+          <p:nvPr/>
+        </p:nvCxnSpPr>
+        <p:spPr>
+          <a:xfrm flipV="1">
+            <a:off x="3386234" y="4586896"/>
+            <a:ext cx="5419531" cy="938140"/>
+          </a:xfrm>
+          <a:prstGeom prst="line">
+            <a:avLst/>
+          </a:prstGeom>
+          <a:ln w="38100">
+            <a:solidFill>
+              <a:schemeClr val="bg1"/>
+            </a:solidFill>
+          </a:ln>
+        </p:spPr>
+        <p:style>
+          <a:lnRef idx="1">
+            <a:schemeClr val="accent1"/>
+          </a:lnRef>
+          <a:fillRef idx="0">
+            <a:schemeClr val="accent1"/>
+          </a:fillRef>
+          <a:effectRef idx="0">
+            <a:schemeClr val="accent1"/>
+          </a:effectRef>
+          <a:fontRef idx="minor">
+            <a:schemeClr val="tx1"/>
+          </a:fontRef>
+        </p:style>
+      </p:cxnSp>
+      <p:cxnSp>
+        <p:nvCxnSpPr>
+          <p:cNvPr id="8" name="Straight Connector 7"/>
+          <p:cNvCxnSpPr>
+            <a:stCxn id="9" idx="0"/>
+            <a:endCxn id="11" idx="0"/>
+          </p:cNvCxnSpPr>
+          <p:nvPr/>
+        </p:nvCxnSpPr>
+        <p:spPr>
+          <a:xfrm>
+            <a:off x="3386234" y="3245476"/>
+            <a:ext cx="5419531" cy="938139"/>
+          </a:xfrm>
+          <a:prstGeom prst="line">
+            <a:avLst/>
+          </a:prstGeom>
+          <a:ln w="38100">
+            <a:solidFill>
+              <a:schemeClr val="bg1"/>
+            </a:solidFill>
+          </a:ln>
+        </p:spPr>
+        <p:style>
+          <a:lnRef idx="1">
+            <a:schemeClr val="accent1"/>
+          </a:lnRef>
+          <a:fillRef idx="0">
+            <a:schemeClr val="accent1"/>
+          </a:fillRef>
+          <a:effectRef idx="0">
+            <a:schemeClr val="accent1"/>
+          </a:effectRef>
+          <a:fontRef idx="minor">
+            <a:schemeClr val="tx1"/>
+          </a:fontRef>
+        </p:style>
+      </p:cxnSp>
       <p:sp>
         <p:nvSpPr>
           <p:cNvPr id="2" name="Title 1"/>
@@ -5102,8 +6870,12 @@
           <a:bodyPr/>
           <a:lstStyle/>
           <a:p>
+            <a:pPr algn="ctr"/>
             <a:r>
               <a:rPr lang="en-AU" b="1" dirty="0">
+                <a:solidFill>
+                  <a:schemeClr val="bg1"/>
+                </a:solidFill>
                 <a:effectLst>
                   <a:outerShdw blurRad="38100" dist="38100" dir="2700000" algn="tl">
                     <a:srgbClr val="000000">
@@ -5115,6 +6887,9 @@
               <a:t>OVERALL MARKET SIZE</a:t>
             </a:r>
             <a:endParaRPr lang="en-PH" b="1" dirty="0">
+              <a:solidFill>
+                <a:schemeClr val="bg1"/>
+              </a:solidFill>
               <a:effectLst>
                 <a:outerShdw blurRad="38100" dist="38100" dir="2700000" algn="tl">
                   <a:srgbClr val="000000">
@@ -5449,18 +7224,23 @@
           <a:prstGeom prst="ellipse">
             <a:avLst/>
           </a:prstGeom>
+          <a:ln w="38100">
+            <a:solidFill>
+              <a:schemeClr val="bg1"/>
+            </a:solidFill>
+          </a:ln>
         </p:spPr>
         <p:style>
           <a:lnRef idx="2">
-            <a:schemeClr val="accent2">
+            <a:schemeClr val="accent5">
               <a:shade val="50000"/>
             </a:schemeClr>
           </a:lnRef>
           <a:fillRef idx="1">
-            <a:schemeClr val="accent2"/>
+            <a:schemeClr val="accent5"/>
           </a:fillRef>
           <a:effectRef idx="0">
-            <a:schemeClr val="accent2"/>
+            <a:schemeClr val="accent5"/>
           </a:effectRef>
           <a:fontRef idx="minor">
             <a:schemeClr val="lt1"/>
@@ -5489,18 +7269,17 @@
           <a:prstGeom prst="ellipse">
             <a:avLst/>
           </a:prstGeom>
+          <a:ln w="28575"/>
         </p:spPr>
         <p:style>
-          <a:lnRef idx="2">
-            <a:schemeClr val="accent4">
-              <a:shade val="50000"/>
-            </a:schemeClr>
+          <a:lnRef idx="3">
+            <a:schemeClr val="lt1"/>
           </a:lnRef>
           <a:fillRef idx="1">
-            <a:schemeClr val="accent4"/>
+            <a:schemeClr val="accent3"/>
           </a:fillRef>
-          <a:effectRef idx="0">
-            <a:schemeClr val="accent4"/>
+          <a:effectRef idx="1">
+            <a:schemeClr val="accent3"/>
           </a:effectRef>
           <a:fontRef idx="minor">
             <a:schemeClr val="lt1"/>
@@ -5525,12 +7304,33 @@
   <p:clrMapOvr>
     <a:masterClrMapping/>
   </p:clrMapOvr>
+  <p:timing>
+    <p:tnLst>
+      <p:par>
+        <p:cTn id="1" dur="indefinite" restart="never" nodeType="tmRoot"/>
+      </p:par>
+    </p:tnLst>
+  </p:timing>
 </p:sld>
 </file>
 
 <file path=ppt/slides/slide7.xml><?xml version="1.0" encoding="utf-8"?>
 <p:sld xmlns:a="http://schemas.openxmlformats.org/drawingml/2006/main" xmlns:r="http://schemas.openxmlformats.org/officeDocument/2006/relationships" xmlns:p="http://schemas.openxmlformats.org/presentationml/2006/main">
   <p:cSld>
+    <p:bg>
+      <p:bgPr>
+        <a:blipFill dpi="0" rotWithShape="1">
+          <a:blip r:embed="rId2">
+            <a:lum/>
+          </a:blip>
+          <a:srcRect/>
+          <a:stretch>
+            <a:fillRect/>
+          </a:stretch>
+        </a:blipFill>
+        <a:effectLst/>
+      </p:bgPr>
+    </p:bg>
     <p:spTree>
       <p:nvGrpSpPr>
         <p:cNvPr id="1" name=""/>
@@ -5557,11 +7357,17 @@
         </p:nvSpPr>
         <p:spPr/>
         <p:txBody>
-          <a:bodyPr/>
+          <a:bodyPr>
+            <a:normAutofit/>
+          </a:bodyPr>
           <a:lstStyle/>
           <a:p>
-            <a:r>
-              <a:rPr lang="en-AU" b="1" dirty="0">
+            <a:pPr algn="ctr"/>
+            <a:r>
+              <a:rPr lang="en-AU" sz="4000" b="1" dirty="0">
+                <a:solidFill>
+                  <a:schemeClr val="bg1"/>
+                </a:solidFill>
                 <a:effectLst>
                   <a:outerShdw blurRad="38100" dist="38100" dir="2700000" algn="tl">
                     <a:srgbClr val="000000">
@@ -5572,7 +7378,10 @@
               </a:rPr>
               <a:t>LOOKING FORWARD : POTENTIAL OUTCOME</a:t>
             </a:r>
-            <a:endParaRPr lang="en-PH" b="1" dirty="0">
+            <a:endParaRPr lang="en-PH" sz="4000" b="1" dirty="0">
+              <a:solidFill>
+                <a:schemeClr val="bg1"/>
+              </a:solidFill>
               <a:effectLst>
                 <a:outerShdw blurRad="38100" dist="38100" dir="2700000" algn="tl">
                   <a:srgbClr val="000000">
@@ -5633,6 +7442,12 @@
             <a:pPr marL="0" indent="0" algn="ctr">
               <a:buNone/>
             </a:pPr>
+            <a:endParaRPr lang="en-AU" sz="2000" b="1" dirty="0" smtClean="0"/>
+          </a:p>
+          <a:p>
+            <a:pPr marL="0" indent="0" algn="ctr">
+              <a:buNone/>
+            </a:pPr>
             <a:r>
               <a:rPr lang="en-AU" sz="2000" b="1" dirty="0" smtClean="0"/>
               <a:t>Worst </a:t>
@@ -5695,28 +7510,6 @@
               <a:buNone/>
             </a:pPr>
             <a:endParaRPr lang="en-AU" sz="1200" dirty="0" smtClean="0"/>
-          </a:p>
-          <a:p>
-            <a:pPr marL="0" indent="0" algn="ctr">
-              <a:buNone/>
-            </a:pPr>
-            <a:r>
-              <a:rPr lang="en-AU" sz="1600" i="1" dirty="0" smtClean="0"/>
-              <a:t>If </a:t>
-            </a:r>
-            <a:r>
-              <a:rPr lang="en-AU" sz="1600" i="1" dirty="0"/>
-              <a:t>we don’t spend on marketing and do not consistently find new partners</a:t>
-            </a:r>
-            <a:r>
-              <a:rPr lang="en-AU" sz="1600" i="1" dirty="0" smtClean="0"/>
-              <a:t>.</a:t>
-            </a:r>
-            <a:endParaRPr lang="en-PH" sz="1600" i="1" dirty="0" smtClean="0"/>
-          </a:p>
-          <a:p>
-            <a:pPr algn="ctr"/>
-            <a:endParaRPr lang="en-PH" sz="2000" dirty="0"/>
           </a:p>
         </p:txBody>
       </p:sp>
@@ -5933,9 +7726,19 @@
             <a:pPr marL="0" indent="0" algn="ctr">
               <a:buNone/>
             </a:pPr>
+            <a:endParaRPr lang="en-AU" sz="2000" b="1" dirty="0" smtClean="0"/>
+          </a:p>
+          <a:p>
+            <a:pPr marL="0" indent="0" algn="ctr">
+              <a:buNone/>
+            </a:pPr>
             <a:r>
               <a:rPr lang="en-AU" sz="2000" b="1" dirty="0" smtClean="0"/>
-              <a:t>Best Case Scenario</a:t>
+              <a:t>Best </a:t>
+            </a:r>
+            <a:r>
+              <a:rPr lang="en-AU" sz="2000" b="1" dirty="0" smtClean="0"/>
+              <a:t>Case Scenario</a:t>
             </a:r>
           </a:p>
           <a:p>
@@ -5966,8 +7769,12 @@
               <a:buNone/>
             </a:pPr>
             <a:r>
+              <a:rPr lang="en-AU" sz="1600" b="1" dirty="0"/>
+              <a:t>51% </a:t>
+            </a:r>
+            <a:r>
               <a:rPr lang="en-AU" sz="1600" dirty="0"/>
-              <a:t>51% of Serviceable Market</a:t>
+              <a:t>of Serviceable Market</a:t>
             </a:r>
           </a:p>
           <a:p>
@@ -5978,16 +7785,6 @@
               <a:rPr lang="en-AU" sz="1200" dirty="0" smtClean="0"/>
               <a:t> </a:t>
             </a:r>
-          </a:p>
-          <a:p>
-            <a:pPr marL="0" indent="0" algn="ctr">
-              <a:buNone/>
-            </a:pPr>
-            <a:r>
-              <a:rPr lang="en-AU" sz="1600" i="1" dirty="0" smtClean="0"/>
-              <a:t>Becomes the market Leader </a:t>
-            </a:r>
-            <a:endParaRPr lang="en-PH" sz="1600" i="1" dirty="0" smtClean="0"/>
           </a:p>
         </p:txBody>
       </p:sp>
@@ -6204,9 +8001,19 @@
             <a:pPr marL="0" indent="0" algn="ctr">
               <a:buNone/>
             </a:pPr>
+            <a:endParaRPr lang="en-AU" sz="2000" b="1" dirty="0" smtClean="0"/>
+          </a:p>
+          <a:p>
+            <a:pPr marL="0" indent="0" algn="ctr">
+              <a:buNone/>
+            </a:pPr>
             <a:r>
               <a:rPr lang="en-AU" sz="2000" b="1" dirty="0" smtClean="0"/>
-              <a:t>Realistic Scenario</a:t>
+              <a:t>Realistic </a:t>
+            </a:r>
+            <a:r>
+              <a:rPr lang="en-AU" sz="2000" b="1" dirty="0" smtClean="0"/>
+              <a:t>Scenario</a:t>
             </a:r>
           </a:p>
           <a:p>
@@ -6234,7 +8041,15 @@
             </a:pPr>
             <a:r>
               <a:rPr lang="en-AU" sz="1600" dirty="0"/>
-              <a:t>Gets 5% of Serviceable Market</a:t>
+              <a:t>Gets </a:t>
+            </a:r>
+            <a:r>
+              <a:rPr lang="en-AU" sz="1600" b="1" dirty="0"/>
+              <a:t>5% </a:t>
+            </a:r>
+            <a:r>
+              <a:rPr lang="en-AU" sz="1600" dirty="0"/>
+              <a:t>of Serviceable Market</a:t>
             </a:r>
           </a:p>
           <a:p>
@@ -6242,28 +8057,60 @@
               <a:buNone/>
             </a:pPr>
             <a:endParaRPr lang="en-AU" sz="1200" dirty="0"/>
-          </a:p>
-          <a:p>
-            <a:pPr marL="0" indent="0" algn="ctr">
-              <a:buNone/>
-            </a:pPr>
-            <a:r>
-              <a:rPr lang="en-AU" sz="1600" i="1" dirty="0" smtClean="0"/>
-              <a:t>Generates revenue per year</a:t>
-            </a:r>
           </a:p>
         </p:txBody>
       </p:sp>
       <p:pic>
         <p:nvPicPr>
-          <p:cNvPr id="6" name="Picture 5"/>
+          <p:cNvPr id="1026" name="Picture 2" descr="Free Thumbs Up Emoticon, Download Free Clip Art, Free Clip Art on ..."/>
+          <p:cNvPicPr>
+            <a:picLocks noChangeAspect="1" noChangeArrowheads="1"/>
+          </p:cNvPicPr>
+          <p:nvPr/>
+        </p:nvPicPr>
+        <p:blipFill>
+          <a:blip r:embed="rId3" cstate="print">
+            <a:extLst>
+              <a:ext uri="{28A0092B-C50C-407E-A947-70E740481C1C}">
+                <a14:useLocalDpi xmlns:a14="http://schemas.microsoft.com/office/drawing/2010/main" val="0"/>
+              </a:ext>
+            </a:extLst>
+          </a:blip>
+          <a:srcRect/>
+          <a:stretch>
+            <a:fillRect/>
+          </a:stretch>
+        </p:blipFill>
+        <p:spPr bwMode="auto">
+          <a:xfrm>
+            <a:off x="5207330" y="1988576"/>
+            <a:ext cx="1908710" cy="1603018"/>
+          </a:xfrm>
+          <a:prstGeom prst="rect">
+            <a:avLst/>
+          </a:prstGeom>
+          <a:noFill/>
+          <a:extLst>
+            <a:ext uri="{909E8E84-426E-40DD-AFC4-6F175D3DCCD1}">
+              <a14:hiddenFill xmlns:a14="http://schemas.microsoft.com/office/drawing/2010/main">
+                <a:solidFill>
+                  <a:srgbClr val="FFFFFF"/>
+                </a:solidFill>
+              </a14:hiddenFill>
+            </a:ext>
+          </a:extLst>
+        </p:spPr>
+      </p:pic>
+      <p:pic>
+        <p:nvPicPr>
+          <p:cNvPr id="8" name="Picture 7"/>
           <p:cNvPicPr>
             <a:picLocks noChangeAspect="1"/>
           </p:cNvPicPr>
           <p:nvPr/>
         </p:nvPicPr>
         <p:blipFill>
-          <a:blip r:embed="rId2">
+          <a:blip r:embed="rId4" cstate="print">
             <a:extLst>
               <a:ext uri="{28A0092B-C50C-407E-A947-70E740481C1C}">
                 <a14:useLocalDpi xmlns:a14="http://schemas.microsoft.com/office/drawing/2010/main" val="0"/>
@@ -6276,8 +8123,8 @@
         </p:blipFill>
         <p:spPr>
           <a:xfrm>
-            <a:off x="9035175" y="1825625"/>
-            <a:ext cx="1302051" cy="1302051"/>
+            <a:off x="1755470" y="1825625"/>
+            <a:ext cx="1900393" cy="1900393"/>
           </a:xfrm>
           <a:prstGeom prst="rect">
             <a:avLst/>
@@ -6286,7 +8133,229 @@
       </p:pic>
       <p:pic>
         <p:nvPicPr>
-          <p:cNvPr id="7" name="Picture 6"/>
+          <p:cNvPr id="9" name="Picture 8"/>
+          <p:cNvPicPr>
+            <a:picLocks noChangeAspect="1"/>
+          </p:cNvPicPr>
+          <p:nvPr/>
+        </p:nvPicPr>
+        <p:blipFill>
+          <a:blip r:embed="rId5" cstate="print">
+            <a:extLst>
+              <a:ext uri="{28A0092B-C50C-407E-A947-70E740481C1C}">
+                <a14:useLocalDpi xmlns:a14="http://schemas.microsoft.com/office/drawing/2010/main" val="0"/>
+              </a:ext>
+            </a:extLst>
+          </a:blip>
+          <a:stretch>
+            <a:fillRect/>
+          </a:stretch>
+        </p:blipFill>
+        <p:spPr>
+          <a:xfrm>
+            <a:off x="8739200" y="1825625"/>
+            <a:ext cx="1900393" cy="1900393"/>
+          </a:xfrm>
+          <a:prstGeom prst="rect">
+            <a:avLst/>
+          </a:prstGeom>
+        </p:spPr>
+      </p:pic>
+    </p:spTree>
+    <p:extLst>
+      <p:ext uri="{BB962C8B-B14F-4D97-AF65-F5344CB8AC3E}">
+        <p14:creationId xmlns:p14="http://schemas.microsoft.com/office/powerpoint/2010/main" val="2179262136"/>
+      </p:ext>
+    </p:extLst>
+  </p:cSld>
+  <p:clrMapOvr>
+    <a:masterClrMapping/>
+  </p:clrMapOvr>
+  <p:timing>
+    <p:tnLst>
+      <p:par>
+        <p:cTn id="1" dur="indefinite" restart="never" nodeType="tmRoot"/>
+      </p:par>
+    </p:tnLst>
+  </p:timing>
+</p:sld>
+</file>
+
+<file path=ppt/slides/slide8.xml><?xml version="1.0" encoding="utf-8"?>
+<p:sld xmlns:a="http://schemas.openxmlformats.org/drawingml/2006/main" xmlns:r="http://schemas.openxmlformats.org/officeDocument/2006/relationships" xmlns:p="http://schemas.openxmlformats.org/presentationml/2006/main">
+  <p:cSld>
+    <p:bg>
+      <p:bgPr>
+        <a:blipFill dpi="0" rotWithShape="1">
+          <a:blip r:embed="rId2">
+            <a:lum/>
+          </a:blip>
+          <a:srcRect/>
+          <a:stretch>
+            <a:fillRect/>
+          </a:stretch>
+        </a:blipFill>
+        <a:effectLst/>
+      </p:bgPr>
+    </p:bg>
+    <p:spTree>
+      <p:nvGrpSpPr>
+        <p:cNvPr id="1" name=""/>
+        <p:cNvGrpSpPr/>
+        <p:nvPr/>
+      </p:nvGrpSpPr>
+      <p:grpSpPr>
+        <a:xfrm>
+          <a:off x="0" y="0"/>
+          <a:ext cx="0" cy="0"/>
+          <a:chOff x="0" y="0"/>
+          <a:chExt cx="0" cy="0"/>
+        </a:xfrm>
+      </p:grpSpPr>
+      <p:sp>
+        <p:nvSpPr>
+          <p:cNvPr id="2" name="Title 1"/>
+          <p:cNvSpPr>
+            <a:spLocks noGrp="1"/>
+          </p:cNvSpPr>
+          <p:nvPr>
+            <p:ph type="title"/>
+          </p:nvPr>
+        </p:nvSpPr>
+        <p:spPr/>
+        <p:txBody>
+          <a:bodyPr/>
+          <a:lstStyle/>
+          <a:p>
+            <a:pPr algn="ctr"/>
+            <a:r>
+              <a:rPr lang="en-AU" b="1" dirty="0">
+                <a:solidFill>
+                  <a:schemeClr val="bg1"/>
+                </a:solidFill>
+                <a:effectLst>
+                  <a:outerShdw blurRad="38100" dist="38100" dir="2700000" algn="tl">
+                    <a:srgbClr val="000000">
+                      <a:alpha val="43137"/>
+                    </a:srgbClr>
+                  </a:outerShdw>
+                </a:effectLst>
+              </a:rPr>
+              <a:t>BUSINESS MODEL </a:t>
+            </a:r>
+            <a:endParaRPr lang="en-PH" b="1" dirty="0">
+              <a:solidFill>
+                <a:schemeClr val="bg1"/>
+              </a:solidFill>
+              <a:effectLst>
+                <a:outerShdw blurRad="38100" dist="38100" dir="2700000" algn="tl">
+                  <a:srgbClr val="000000">
+                    <a:alpha val="43137"/>
+                  </a:srgbClr>
+                </a:outerShdw>
+              </a:effectLst>
+            </a:endParaRPr>
+          </a:p>
+        </p:txBody>
+      </p:sp>
+      <p:sp>
+        <p:nvSpPr>
+          <p:cNvPr id="3" name="Content Placeholder 2"/>
+          <p:cNvSpPr>
+            <a:spLocks noGrp="1"/>
+          </p:cNvSpPr>
+          <p:nvPr>
+            <p:ph idx="1"/>
+          </p:nvPr>
+        </p:nvSpPr>
+        <p:spPr/>
+        <p:txBody>
+          <a:bodyPr>
+            <a:normAutofit/>
+          </a:bodyPr>
+          <a:lstStyle/>
+          <a:p>
+            <a:r>
+              <a:rPr lang="en-AU" sz="3200" dirty="0" smtClean="0"/>
+              <a:t>We </a:t>
+            </a:r>
+            <a:r>
+              <a:rPr lang="en-AU" sz="3200" dirty="0"/>
+              <a:t>take </a:t>
+            </a:r>
+            <a:r>
+              <a:rPr lang="en-AU" sz="3200" b="1" dirty="0"/>
+              <a:t>20%-25% </a:t>
+            </a:r>
+            <a:r>
+              <a:rPr lang="en-AU" sz="3200" dirty="0"/>
+              <a:t>on each </a:t>
+            </a:r>
+            <a:r>
+              <a:rPr lang="en-AU" sz="3200" dirty="0" smtClean="0"/>
+              <a:t>Partner’s </a:t>
+            </a:r>
+            <a:r>
+              <a:rPr lang="en-AU" sz="3200" dirty="0"/>
+              <a:t>food delivery transaction and </a:t>
+            </a:r>
+            <a:r>
+              <a:rPr lang="en-AU" sz="3200" b="1" dirty="0"/>
+              <a:t>10%-15% </a:t>
+            </a:r>
+            <a:r>
+              <a:rPr lang="en-AU" sz="3200" dirty="0"/>
+              <a:t>on </a:t>
+            </a:r>
+            <a:r>
+              <a:rPr lang="en-AU" sz="3200" dirty="0" smtClean="0"/>
+              <a:t>all </a:t>
+            </a:r>
+            <a:r>
+              <a:rPr lang="en-AU" sz="3200" dirty="0"/>
+              <a:t>normal delivery transaction</a:t>
+            </a:r>
+            <a:r>
+              <a:rPr lang="en-AU" sz="3200" dirty="0" smtClean="0"/>
+              <a:t>.</a:t>
+            </a:r>
+          </a:p>
+          <a:p>
+            <a:endParaRPr lang="en-PH" sz="1800" dirty="0"/>
+          </a:p>
+          <a:p>
+            <a:r>
+              <a:rPr lang="en-AU" sz="3200" dirty="0" smtClean="0"/>
+              <a:t>Featured </a:t>
+            </a:r>
+            <a:r>
+              <a:rPr lang="en-AU" sz="3200" dirty="0"/>
+              <a:t>ads of our partners</a:t>
+            </a:r>
+            <a:r>
+              <a:rPr lang="en-AU" sz="3200" dirty="0" smtClean="0"/>
+              <a:t>.</a:t>
+            </a:r>
+          </a:p>
+          <a:p>
+            <a:endParaRPr lang="en-PH" sz="1800" dirty="0"/>
+          </a:p>
+          <a:p>
+            <a:r>
+              <a:rPr lang="en-AU" sz="3200" dirty="0" smtClean="0"/>
+              <a:t>paid </a:t>
+            </a:r>
+            <a:r>
+              <a:rPr lang="en-AU" sz="3200" dirty="0"/>
+              <a:t>ads for those who wants promote their products.</a:t>
+            </a:r>
+            <a:endParaRPr lang="en-PH" sz="3200" dirty="0"/>
+          </a:p>
+        </p:txBody>
+      </p:sp>
+      <p:pic>
+        <p:nvPicPr>
+          <p:cNvPr id="4" name="Picture 3"/>
           <p:cNvPicPr>
             <a:picLocks noChangeAspect="1"/>
           </p:cNvPicPr>
@@ -6306,59 +8375,18 @@
         </p:blipFill>
         <p:spPr>
           <a:xfrm>
-            <a:off x="1791835" y="1690688"/>
-            <a:ext cx="1569690" cy="1569690"/>
+            <a:off x="838200" y="4562264"/>
+            <a:ext cx="10198100" cy="1614699"/>
           </a:xfrm>
           <a:prstGeom prst="rect">
             <a:avLst/>
           </a:prstGeom>
         </p:spPr>
       </p:pic>
-      <p:pic>
-        <p:nvPicPr>
-          <p:cNvPr id="1026" name="Picture 2" descr="Free Thumbs Up Emoticon, Download Free Clip Art, Free Clip Art on ..."/>
-          <p:cNvPicPr>
-            <a:picLocks noChangeAspect="1" noChangeArrowheads="1"/>
-          </p:cNvPicPr>
-          <p:nvPr/>
-        </p:nvPicPr>
-        <p:blipFill>
-          <a:blip r:embed="rId4" cstate="print">
-            <a:extLst>
-              <a:ext uri="{28A0092B-C50C-407E-A947-70E740481C1C}">
-                <a14:useLocalDpi xmlns:a14="http://schemas.microsoft.com/office/drawing/2010/main" val="0"/>
-              </a:ext>
-            </a:extLst>
-          </a:blip>
-          <a:srcRect/>
-          <a:stretch>
-            <a:fillRect/>
-          </a:stretch>
-        </p:blipFill>
-        <p:spPr bwMode="auto">
-          <a:xfrm>
-            <a:off x="5065487" y="1639808"/>
-            <a:ext cx="2074529" cy="1742280"/>
-          </a:xfrm>
-          <a:prstGeom prst="rect">
-            <a:avLst/>
-          </a:prstGeom>
-          <a:noFill/>
-          <a:extLst>
-            <a:ext uri="{909E8E84-426E-40DD-AFC4-6F175D3DCCD1}">
-              <a14:hiddenFill xmlns:a14="http://schemas.microsoft.com/office/drawing/2010/main">
-                <a:solidFill>
-                  <a:srgbClr val="FFFFFF"/>
-                </a:solidFill>
-              </a14:hiddenFill>
-            </a:ext>
-          </a:extLst>
-        </p:spPr>
-      </p:pic>
     </p:spTree>
     <p:extLst>
       <p:ext uri="{BB962C8B-B14F-4D97-AF65-F5344CB8AC3E}">
-        <p14:creationId xmlns:p14="http://schemas.microsoft.com/office/powerpoint/2010/main" val="3415509148"/>
+        <p14:creationId xmlns:p14="http://schemas.microsoft.com/office/powerpoint/2010/main" val="701424322"/>
       </p:ext>
     </p:extLst>
   </p:cSld>
@@ -6375,9 +8403,23 @@
 </p:sld>
 </file>
 
-<file path=ppt/slides/slide8.xml><?xml version="1.0" encoding="utf-8"?>
+<file path=ppt/slides/slide9.xml><?xml version="1.0" encoding="utf-8"?>
 <p:sld xmlns:a="http://schemas.openxmlformats.org/drawingml/2006/main" xmlns:r="http://schemas.openxmlformats.org/officeDocument/2006/relationships" xmlns:p="http://schemas.openxmlformats.org/presentationml/2006/main">
   <p:cSld>
+    <p:bg>
+      <p:bgPr>
+        <a:blipFill dpi="0" rotWithShape="1">
+          <a:blip r:embed="rId2">
+            <a:lum/>
+          </a:blip>
+          <a:srcRect/>
+          <a:stretch>
+            <a:fillRect/>
+          </a:stretch>
+        </a:blipFill>
+        <a:effectLst/>
+      </p:bgPr>
+    </p:bg>
     <p:spTree>
       <p:nvGrpSpPr>
         <p:cNvPr id="1" name=""/>
@@ -6407,128 +8449,12 @@
           <a:bodyPr/>
           <a:lstStyle/>
           <a:p>
-            <a:r>
-              <a:rPr lang="en-AU" b="1" dirty="0">
-                <a:effectLst>
-                  <a:outerShdw blurRad="38100" dist="38100" dir="2700000" algn="tl">
-                    <a:srgbClr val="000000">
-                      <a:alpha val="43137"/>
-                    </a:srgbClr>
-                  </a:outerShdw>
-                </a:effectLst>
-              </a:rPr>
-              <a:t>BUSINESS MODEL </a:t>
-            </a:r>
-            <a:endParaRPr lang="en-PH" b="1" dirty="0">
-              <a:effectLst>
-                <a:outerShdw blurRad="38100" dist="38100" dir="2700000" algn="tl">
-                  <a:srgbClr val="000000">
-                    <a:alpha val="43137"/>
-                  </a:srgbClr>
-                </a:outerShdw>
-              </a:effectLst>
-            </a:endParaRPr>
-          </a:p>
-        </p:txBody>
-      </p:sp>
-      <p:sp>
-        <p:nvSpPr>
-          <p:cNvPr id="3" name="Content Placeholder 2"/>
-          <p:cNvSpPr>
-            <a:spLocks noGrp="1"/>
-          </p:cNvSpPr>
-          <p:nvPr>
-            <p:ph idx="1"/>
-          </p:nvPr>
-        </p:nvSpPr>
-        <p:spPr/>
-        <p:txBody>
-          <a:bodyPr>
-            <a:normAutofit/>
-          </a:bodyPr>
-          <a:lstStyle/>
-          <a:p>
-            <a:r>
-              <a:rPr lang="en-AU" sz="3200" dirty="0" smtClean="0"/>
-              <a:t>We </a:t>
-            </a:r>
-            <a:r>
-              <a:rPr lang="en-AU" sz="3200" dirty="0"/>
-              <a:t>take 20%-25% on each partner’s food delivery transaction and 10%-15% on all    normal delivery transaction.</a:t>
-            </a:r>
-            <a:endParaRPr lang="en-PH" sz="3200" dirty="0"/>
-          </a:p>
-          <a:p>
-            <a:r>
-              <a:rPr lang="en-AU" sz="3200" dirty="0" smtClean="0"/>
-              <a:t>Featured </a:t>
-            </a:r>
-            <a:r>
-              <a:rPr lang="en-AU" sz="3200" dirty="0"/>
-              <a:t>ads of our partners.</a:t>
-            </a:r>
-            <a:endParaRPr lang="en-PH" sz="3200" dirty="0"/>
-          </a:p>
-          <a:p>
-            <a:r>
-              <a:rPr lang="en-AU" sz="3200" dirty="0" smtClean="0"/>
-              <a:t>paid </a:t>
-            </a:r>
-            <a:r>
-              <a:rPr lang="en-AU" sz="3200" dirty="0"/>
-              <a:t>ads for those who wants promote their products.</a:t>
-            </a:r>
-            <a:endParaRPr lang="en-PH" sz="3200" dirty="0"/>
-          </a:p>
-        </p:txBody>
-      </p:sp>
-    </p:spTree>
-    <p:extLst>
-      <p:ext uri="{BB962C8B-B14F-4D97-AF65-F5344CB8AC3E}">
-        <p14:creationId xmlns:p14="http://schemas.microsoft.com/office/powerpoint/2010/main" val="701424322"/>
-      </p:ext>
-    </p:extLst>
-  </p:cSld>
-  <p:clrMapOvr>
-    <a:masterClrMapping/>
-  </p:clrMapOvr>
-</p:sld>
-</file>
-
-<file path=ppt/slides/slide9.xml><?xml version="1.0" encoding="utf-8"?>
-<p:sld xmlns:a="http://schemas.openxmlformats.org/drawingml/2006/main" xmlns:r="http://schemas.openxmlformats.org/officeDocument/2006/relationships" xmlns:p="http://schemas.openxmlformats.org/presentationml/2006/main">
-  <p:cSld>
-    <p:spTree>
-      <p:nvGrpSpPr>
-        <p:cNvPr id="1" name=""/>
-        <p:cNvGrpSpPr/>
-        <p:nvPr/>
-      </p:nvGrpSpPr>
-      <p:grpSpPr>
-        <a:xfrm>
-          <a:off x="0" y="0"/>
-          <a:ext cx="0" cy="0"/>
-          <a:chOff x="0" y="0"/>
-          <a:chExt cx="0" cy="0"/>
-        </a:xfrm>
-      </p:grpSpPr>
-      <p:sp>
-        <p:nvSpPr>
-          <p:cNvPr id="2" name="Title 1"/>
-          <p:cNvSpPr>
-            <a:spLocks noGrp="1"/>
-          </p:cNvSpPr>
-          <p:nvPr>
-            <p:ph type="title"/>
-          </p:nvPr>
-        </p:nvSpPr>
-        <p:spPr/>
-        <p:txBody>
-          <a:bodyPr/>
-          <a:lstStyle/>
-          <a:p>
+            <a:pPr algn="ctr"/>
             <a:r>
               <a:rPr lang="en-AU" b="1" dirty="0" smtClean="0">
+                <a:solidFill>
+                  <a:schemeClr val="bg1"/>
+                </a:solidFill>
                 <a:effectLst>
                   <a:outerShdw blurRad="38100" dist="38100" dir="2700000" algn="tl">
                     <a:srgbClr val="000000">
@@ -6540,6 +8466,9 @@
               <a:t>COMPETITION</a:t>
             </a:r>
             <a:endParaRPr lang="en-PH" b="1" dirty="0">
+              <a:solidFill>
+                <a:schemeClr val="bg1"/>
+              </a:solidFill>
               <a:effectLst>
                 <a:outerShdw blurRad="38100" dist="38100" dir="2700000" algn="tl">
                   <a:srgbClr val="000000">
@@ -6553,14 +8482,14 @@
       </p:sp>
       <p:pic>
         <p:nvPicPr>
-          <p:cNvPr id="7" name="Picture 6"/>
+          <p:cNvPr id="3" name="Picture 2"/>
           <p:cNvPicPr>
             <a:picLocks noChangeAspect="1"/>
           </p:cNvPicPr>
           <p:nvPr/>
         </p:nvPicPr>
         <p:blipFill>
-          <a:blip r:embed="rId2">
+          <a:blip r:embed="rId3">
             <a:extLst>
               <a:ext uri="{28A0092B-C50C-407E-A947-70E740481C1C}">
                 <a14:useLocalDpi xmlns:a14="http://schemas.microsoft.com/office/drawing/2010/main" val="0"/>
@@ -6573,8 +8502,8 @@
         </p:blipFill>
         <p:spPr>
           <a:xfrm>
-            <a:off x="1837897" y="1690688"/>
-            <a:ext cx="8516206" cy="4790366"/>
+            <a:off x="1556109" y="1549400"/>
+            <a:ext cx="9079781" cy="5107377"/>
           </a:xfrm>
           <a:prstGeom prst="rect">
             <a:avLst/>
@@ -6591,6 +8520,13 @@
   <p:clrMapOvr>
     <a:masterClrMapping/>
   </p:clrMapOvr>
+  <p:timing>
+    <p:tnLst>
+      <p:par>
+        <p:cTn id="1" dur="indefinite" restart="never" nodeType="tmRoot"/>
+      </p:par>
+    </p:tnLst>
+  </p:timing>
 </p:sld>
 </file>
 

</xml_diff>

<commit_message>
Updated the final Power point pitch for Investor.
</commit_message>
<xml_diff>
--- a/docs/Project-Investor-Pitch.pptx
+++ b/docs/Project-Investor-Pitch.pptx
@@ -4,6 +4,9 @@
   <p:sldMasterIdLst>
     <p:sldMasterId id="2147483648" r:id="rId1"/>
   </p:sldMasterIdLst>
+  <p:notesMasterIdLst>
+    <p:notesMasterId r:id="rId17"/>
+  </p:notesMasterIdLst>
   <p:sldIdLst>
     <p:sldId id="256" r:id="rId2"/>
     <p:sldId id="264" r:id="rId3"/>
@@ -126,6 +129,451 @@
 </p:presentation>
 </file>
 
+<file path=ppt/commentAuthors.xml><?xml version="1.0" encoding="utf-8"?>
+<p:cmAuthorLst xmlns:a="http://schemas.openxmlformats.org/drawingml/2006/main" xmlns:r="http://schemas.openxmlformats.org/officeDocument/2006/relationships" xmlns:p="http://schemas.openxmlformats.org/presentationml/2006/main">
+  <p:cmAuthor id="1" name="Microsoft Office User" initials="MOU" lastIdx="4" clrIdx="0">
+    <p:extLst>
+      <p:ext uri="{19B8F6BF-5375-455C-9EA6-DF929625EA0E}">
+        <p15:presenceInfo xmlns:p15="http://schemas.microsoft.com/office/powerpoint/2012/main" userId="Microsoft Office User" providerId="None"/>
+      </p:ext>
+    </p:extLst>
+  </p:cmAuthor>
+</p:cmAuthorLst>
+</file>
+
+<file path=ppt/notesMasters/notesMaster1.xml><?xml version="1.0" encoding="utf-8"?>
+<p:notesMaster xmlns:a="http://schemas.openxmlformats.org/drawingml/2006/main" xmlns:r="http://schemas.openxmlformats.org/officeDocument/2006/relationships" xmlns:p="http://schemas.openxmlformats.org/presentationml/2006/main">
+  <p:cSld>
+    <p:bg>
+      <p:bgRef idx="1001">
+        <a:schemeClr val="bg1"/>
+      </p:bgRef>
+    </p:bg>
+    <p:spTree>
+      <p:nvGrpSpPr>
+        <p:cNvPr id="1" name=""/>
+        <p:cNvGrpSpPr/>
+        <p:nvPr/>
+      </p:nvGrpSpPr>
+      <p:grpSpPr>
+        <a:xfrm>
+          <a:off x="0" y="0"/>
+          <a:ext cx="0" cy="0"/>
+          <a:chOff x="0" y="0"/>
+          <a:chExt cx="0" cy="0"/>
+        </a:xfrm>
+      </p:grpSpPr>
+      <p:sp>
+        <p:nvSpPr>
+          <p:cNvPr id="2" name="Header Placeholder 1"/>
+          <p:cNvSpPr>
+            <a:spLocks noGrp="1"/>
+          </p:cNvSpPr>
+          <p:nvPr>
+            <p:ph type="hdr" sz="quarter"/>
+          </p:nvPr>
+        </p:nvSpPr>
+        <p:spPr>
+          <a:xfrm>
+            <a:off x="0" y="0"/>
+            <a:ext cx="2971800" cy="458788"/>
+          </a:xfrm>
+          <a:prstGeom prst="rect">
+            <a:avLst/>
+          </a:prstGeom>
+        </p:spPr>
+        <p:txBody>
+          <a:bodyPr vert="horz" lIns="91440" tIns="45720" rIns="91440" bIns="45720" rtlCol="0"/>
+          <a:lstStyle>
+            <a:lvl1pPr algn="l">
+              <a:defRPr sz="1200"/>
+            </a:lvl1pPr>
+          </a:lstStyle>
+          <a:p>
+            <a:endParaRPr lang="en-US"/>
+          </a:p>
+        </p:txBody>
+      </p:sp>
+      <p:sp>
+        <p:nvSpPr>
+          <p:cNvPr id="3" name="Date Placeholder 2"/>
+          <p:cNvSpPr>
+            <a:spLocks noGrp="1"/>
+          </p:cNvSpPr>
+          <p:nvPr>
+            <p:ph type="dt" idx="1"/>
+          </p:nvPr>
+        </p:nvSpPr>
+        <p:spPr>
+          <a:xfrm>
+            <a:off x="3884613" y="0"/>
+            <a:ext cx="2971800" cy="458788"/>
+          </a:xfrm>
+          <a:prstGeom prst="rect">
+            <a:avLst/>
+          </a:prstGeom>
+        </p:spPr>
+        <p:txBody>
+          <a:bodyPr vert="horz" lIns="91440" tIns="45720" rIns="91440" bIns="45720" rtlCol="0"/>
+          <a:lstStyle>
+            <a:lvl1pPr algn="r">
+              <a:defRPr sz="1200"/>
+            </a:lvl1pPr>
+          </a:lstStyle>
+          <a:p>
+            <a:fld id="{A0B32479-D2A7-C447-A79D-920DF8E394A4}" type="datetimeFigureOut">
+              <a:rPr lang="en-US" smtClean="0"/>
+              <a:t>7/5/2020</a:t>
+            </a:fld>
+            <a:endParaRPr lang="en-US"/>
+          </a:p>
+        </p:txBody>
+      </p:sp>
+      <p:sp>
+        <p:nvSpPr>
+          <p:cNvPr id="4" name="Slide Image Placeholder 3"/>
+          <p:cNvSpPr>
+            <a:spLocks noGrp="1" noRot="1" noChangeAspect="1"/>
+          </p:cNvSpPr>
+          <p:nvPr>
+            <p:ph type="sldImg" idx="2"/>
+          </p:nvPr>
+        </p:nvSpPr>
+        <p:spPr>
+          <a:xfrm>
+            <a:off x="685800" y="1143000"/>
+            <a:ext cx="5486400" cy="3086100"/>
+          </a:xfrm>
+          <a:prstGeom prst="rect">
+            <a:avLst/>
+          </a:prstGeom>
+          <a:noFill/>
+          <a:ln w="12700">
+            <a:solidFill>
+              <a:prstClr val="black"/>
+            </a:solidFill>
+          </a:ln>
+        </p:spPr>
+        <p:txBody>
+          <a:bodyPr vert="horz" lIns="91440" tIns="45720" rIns="91440" bIns="45720" rtlCol="0" anchor="ctr"/>
+          <a:lstStyle/>
+          <a:p>
+            <a:endParaRPr lang="en-US"/>
+          </a:p>
+        </p:txBody>
+      </p:sp>
+      <p:sp>
+        <p:nvSpPr>
+          <p:cNvPr id="5" name="Notes Placeholder 4"/>
+          <p:cNvSpPr>
+            <a:spLocks noGrp="1"/>
+          </p:cNvSpPr>
+          <p:nvPr>
+            <p:ph type="body" sz="quarter" idx="3"/>
+          </p:nvPr>
+        </p:nvSpPr>
+        <p:spPr>
+          <a:xfrm>
+            <a:off x="685800" y="4400550"/>
+            <a:ext cx="5486400" cy="3600450"/>
+          </a:xfrm>
+          <a:prstGeom prst="rect">
+            <a:avLst/>
+          </a:prstGeom>
+        </p:spPr>
+        <p:txBody>
+          <a:bodyPr vert="horz" lIns="91440" tIns="45720" rIns="91440" bIns="45720" rtlCol="0"/>
+          <a:lstStyle/>
+          <a:p>
+            <a:pPr lvl="0"/>
+            <a:r>
+              <a:rPr lang="en-US"/>
+              <a:t>Edit Master text styles</a:t>
+            </a:r>
+          </a:p>
+          <a:p>
+            <a:pPr lvl="1"/>
+            <a:r>
+              <a:rPr lang="en-US"/>
+              <a:t>Second level</a:t>
+            </a:r>
+          </a:p>
+          <a:p>
+            <a:pPr lvl="2"/>
+            <a:r>
+              <a:rPr lang="en-US"/>
+              <a:t>Third level</a:t>
+            </a:r>
+          </a:p>
+          <a:p>
+            <a:pPr lvl="3"/>
+            <a:r>
+              <a:rPr lang="en-US"/>
+              <a:t>Fourth level</a:t>
+            </a:r>
+          </a:p>
+          <a:p>
+            <a:pPr lvl="4"/>
+            <a:r>
+              <a:rPr lang="en-US"/>
+              <a:t>Fifth level</a:t>
+            </a:r>
+          </a:p>
+        </p:txBody>
+      </p:sp>
+      <p:sp>
+        <p:nvSpPr>
+          <p:cNvPr id="6" name="Footer Placeholder 5"/>
+          <p:cNvSpPr>
+            <a:spLocks noGrp="1"/>
+          </p:cNvSpPr>
+          <p:nvPr>
+            <p:ph type="ftr" sz="quarter" idx="4"/>
+          </p:nvPr>
+        </p:nvSpPr>
+        <p:spPr>
+          <a:xfrm>
+            <a:off x="0" y="8685213"/>
+            <a:ext cx="2971800" cy="458787"/>
+          </a:xfrm>
+          <a:prstGeom prst="rect">
+            <a:avLst/>
+          </a:prstGeom>
+        </p:spPr>
+        <p:txBody>
+          <a:bodyPr vert="horz" lIns="91440" tIns="45720" rIns="91440" bIns="45720" rtlCol="0" anchor="b"/>
+          <a:lstStyle>
+            <a:lvl1pPr algn="l">
+              <a:defRPr sz="1200"/>
+            </a:lvl1pPr>
+          </a:lstStyle>
+          <a:p>
+            <a:endParaRPr lang="en-US"/>
+          </a:p>
+        </p:txBody>
+      </p:sp>
+      <p:sp>
+        <p:nvSpPr>
+          <p:cNvPr id="7" name="Slide Number Placeholder 6"/>
+          <p:cNvSpPr>
+            <a:spLocks noGrp="1"/>
+          </p:cNvSpPr>
+          <p:nvPr>
+            <p:ph type="sldNum" sz="quarter" idx="5"/>
+          </p:nvPr>
+        </p:nvSpPr>
+        <p:spPr>
+          <a:xfrm>
+            <a:off x="3884613" y="8685213"/>
+            <a:ext cx="2971800" cy="458787"/>
+          </a:xfrm>
+          <a:prstGeom prst="rect">
+            <a:avLst/>
+          </a:prstGeom>
+        </p:spPr>
+        <p:txBody>
+          <a:bodyPr vert="horz" lIns="91440" tIns="45720" rIns="91440" bIns="45720" rtlCol="0" anchor="b"/>
+          <a:lstStyle>
+            <a:lvl1pPr algn="r">
+              <a:defRPr sz="1200"/>
+            </a:lvl1pPr>
+          </a:lstStyle>
+          <a:p>
+            <a:fld id="{DDA4A774-18CB-774E-B216-CD4330747D48}" type="slidenum">
+              <a:rPr lang="en-US" smtClean="0"/>
+              <a:t>‹#›</a:t>
+            </a:fld>
+            <a:endParaRPr lang="en-US"/>
+          </a:p>
+        </p:txBody>
+      </p:sp>
+    </p:spTree>
+    <p:extLst>
+      <p:ext uri="{BB962C8B-B14F-4D97-AF65-F5344CB8AC3E}">
+        <p14:creationId xmlns:p14="http://schemas.microsoft.com/office/powerpoint/2010/main" val="2309879512"/>
+      </p:ext>
+    </p:extLst>
+  </p:cSld>
+  <p:clrMap bg1="lt1" tx1="dk1" bg2="lt2" tx2="dk2" accent1="accent1" accent2="accent2" accent3="accent3" accent4="accent4" accent5="accent5" accent6="accent6" hlink="hlink" folHlink="folHlink"/>
+  <p:notesStyle>
+    <a:lvl1pPr marL="0" algn="l" defTabSz="914400" rtl="0" eaLnBrk="1" latinLnBrk="0" hangingPunct="1">
+      <a:defRPr sz="1200" kern="1200">
+        <a:solidFill>
+          <a:schemeClr val="tx1"/>
+        </a:solidFill>
+        <a:latin typeface="+mn-lt"/>
+        <a:ea typeface="+mn-ea"/>
+        <a:cs typeface="+mn-cs"/>
+      </a:defRPr>
+    </a:lvl1pPr>
+    <a:lvl2pPr marL="457200" algn="l" defTabSz="914400" rtl="0" eaLnBrk="1" latinLnBrk="0" hangingPunct="1">
+      <a:defRPr sz="1200" kern="1200">
+        <a:solidFill>
+          <a:schemeClr val="tx1"/>
+        </a:solidFill>
+        <a:latin typeface="+mn-lt"/>
+        <a:ea typeface="+mn-ea"/>
+        <a:cs typeface="+mn-cs"/>
+      </a:defRPr>
+    </a:lvl2pPr>
+    <a:lvl3pPr marL="914400" algn="l" defTabSz="914400" rtl="0" eaLnBrk="1" latinLnBrk="0" hangingPunct="1">
+      <a:defRPr sz="1200" kern="1200">
+        <a:solidFill>
+          <a:schemeClr val="tx1"/>
+        </a:solidFill>
+        <a:latin typeface="+mn-lt"/>
+        <a:ea typeface="+mn-ea"/>
+        <a:cs typeface="+mn-cs"/>
+      </a:defRPr>
+    </a:lvl3pPr>
+    <a:lvl4pPr marL="1371600" algn="l" defTabSz="914400" rtl="0" eaLnBrk="1" latinLnBrk="0" hangingPunct="1">
+      <a:defRPr sz="1200" kern="1200">
+        <a:solidFill>
+          <a:schemeClr val="tx1"/>
+        </a:solidFill>
+        <a:latin typeface="+mn-lt"/>
+        <a:ea typeface="+mn-ea"/>
+        <a:cs typeface="+mn-cs"/>
+      </a:defRPr>
+    </a:lvl4pPr>
+    <a:lvl5pPr marL="1828800" algn="l" defTabSz="914400" rtl="0" eaLnBrk="1" latinLnBrk="0" hangingPunct="1">
+      <a:defRPr sz="1200" kern="1200">
+        <a:solidFill>
+          <a:schemeClr val="tx1"/>
+        </a:solidFill>
+        <a:latin typeface="+mn-lt"/>
+        <a:ea typeface="+mn-ea"/>
+        <a:cs typeface="+mn-cs"/>
+      </a:defRPr>
+    </a:lvl5pPr>
+    <a:lvl6pPr marL="2286000" algn="l" defTabSz="914400" rtl="0" eaLnBrk="1" latinLnBrk="0" hangingPunct="1">
+      <a:defRPr sz="1200" kern="1200">
+        <a:solidFill>
+          <a:schemeClr val="tx1"/>
+        </a:solidFill>
+        <a:latin typeface="+mn-lt"/>
+        <a:ea typeface="+mn-ea"/>
+        <a:cs typeface="+mn-cs"/>
+      </a:defRPr>
+    </a:lvl6pPr>
+    <a:lvl7pPr marL="2743200" algn="l" defTabSz="914400" rtl="0" eaLnBrk="1" latinLnBrk="0" hangingPunct="1">
+      <a:defRPr sz="1200" kern="1200">
+        <a:solidFill>
+          <a:schemeClr val="tx1"/>
+        </a:solidFill>
+        <a:latin typeface="+mn-lt"/>
+        <a:ea typeface="+mn-ea"/>
+        <a:cs typeface="+mn-cs"/>
+      </a:defRPr>
+    </a:lvl7pPr>
+    <a:lvl8pPr marL="3200400" algn="l" defTabSz="914400" rtl="0" eaLnBrk="1" latinLnBrk="0" hangingPunct="1">
+      <a:defRPr sz="1200" kern="1200">
+        <a:solidFill>
+          <a:schemeClr val="tx1"/>
+        </a:solidFill>
+        <a:latin typeface="+mn-lt"/>
+        <a:ea typeface="+mn-ea"/>
+        <a:cs typeface="+mn-cs"/>
+      </a:defRPr>
+    </a:lvl8pPr>
+    <a:lvl9pPr marL="3657600" algn="l" defTabSz="914400" rtl="0" eaLnBrk="1" latinLnBrk="0" hangingPunct="1">
+      <a:defRPr sz="1200" kern="1200">
+        <a:solidFill>
+          <a:schemeClr val="tx1"/>
+        </a:solidFill>
+        <a:latin typeface="+mn-lt"/>
+        <a:ea typeface="+mn-ea"/>
+        <a:cs typeface="+mn-cs"/>
+      </a:defRPr>
+    </a:lvl9pPr>
+  </p:notesStyle>
+</p:notesMaster>
+</file>
+
+<file path=ppt/notesSlides/notesSlide1.xml><?xml version="1.0" encoding="utf-8"?>
+<p:notes xmlns:a="http://schemas.openxmlformats.org/drawingml/2006/main" xmlns:r="http://schemas.openxmlformats.org/officeDocument/2006/relationships" xmlns:p="http://schemas.openxmlformats.org/presentationml/2006/main">
+  <p:cSld>
+    <p:spTree>
+      <p:nvGrpSpPr>
+        <p:cNvPr id="1" name=""/>
+        <p:cNvGrpSpPr/>
+        <p:nvPr/>
+      </p:nvGrpSpPr>
+      <p:grpSpPr>
+        <a:xfrm>
+          <a:off x="0" y="0"/>
+          <a:ext cx="0" cy="0"/>
+          <a:chOff x="0" y="0"/>
+          <a:chExt cx="0" cy="0"/>
+        </a:xfrm>
+      </p:grpSpPr>
+      <p:sp>
+        <p:nvSpPr>
+          <p:cNvPr id="2" name="Slide Image Placeholder 1"/>
+          <p:cNvSpPr>
+            <a:spLocks noGrp="1" noRot="1" noChangeAspect="1"/>
+          </p:cNvSpPr>
+          <p:nvPr>
+            <p:ph type="sldImg"/>
+          </p:nvPr>
+        </p:nvSpPr>
+        <p:spPr/>
+      </p:sp>
+      <p:sp>
+        <p:nvSpPr>
+          <p:cNvPr id="3" name="Notes Placeholder 2"/>
+          <p:cNvSpPr>
+            <a:spLocks noGrp="1"/>
+          </p:cNvSpPr>
+          <p:nvPr>
+            <p:ph type="body" idx="1"/>
+          </p:nvPr>
+        </p:nvSpPr>
+        <p:spPr/>
+        <p:txBody>
+          <a:bodyPr/>
+          <a:lstStyle/>
+          <a:p>
+            <a:endParaRPr lang="en-US" dirty="0"/>
+          </a:p>
+        </p:txBody>
+      </p:sp>
+      <p:sp>
+        <p:nvSpPr>
+          <p:cNvPr id="4" name="Slide Number Placeholder 3"/>
+          <p:cNvSpPr>
+            <a:spLocks noGrp="1"/>
+          </p:cNvSpPr>
+          <p:nvPr>
+            <p:ph type="sldNum" sz="quarter" idx="5"/>
+          </p:nvPr>
+        </p:nvSpPr>
+        <p:spPr/>
+        <p:txBody>
+          <a:bodyPr/>
+          <a:lstStyle/>
+          <a:p>
+            <a:fld id="{DDA4A774-18CB-774E-B216-CD4330747D48}" type="slidenum">
+              <a:rPr lang="en-US" smtClean="0"/>
+              <a:t>2</a:t>
+            </a:fld>
+            <a:endParaRPr lang="en-US"/>
+          </a:p>
+        </p:txBody>
+      </p:sp>
+    </p:spTree>
+    <p:extLst>
+      <p:ext uri="{BB962C8B-B14F-4D97-AF65-F5344CB8AC3E}">
+        <p14:creationId xmlns:p14="http://schemas.microsoft.com/office/powerpoint/2010/main" val="353484075"/>
+      </p:ext>
+    </p:extLst>
+  </p:cSld>
+  <p:clrMapOvr>
+    <a:masterClrMapping/>
+  </p:clrMapOvr>
+</p:notes>
+</file>
+
 <file path=ppt/slideLayouts/slideLayout1.xml><?xml version="1.0" encoding="utf-8"?>
 <p:sldLayout xmlns:a="http://schemas.openxmlformats.org/drawingml/2006/main" xmlns:r="http://schemas.openxmlformats.org/officeDocument/2006/relationships" xmlns:p="http://schemas.openxmlformats.org/presentationml/2006/main" type="title" preserve="1">
   <p:cSld name="Title Slide">
@@ -168,7 +616,7 @@
           </a:lstStyle>
           <a:p>
             <a:r>
-              <a:rPr lang="en-US" smtClean="0"/>
+              <a:rPr lang="en-US"/>
               <a:t>Click to edit Master title style</a:t>
             </a:r>
             <a:endParaRPr lang="en-PH"/>
@@ -233,7 +681,7 @@
           </a:lstStyle>
           <a:p>
             <a:r>
-              <a:rPr lang="en-US" smtClean="0"/>
+              <a:rPr lang="en-US"/>
               <a:t>Click to edit Master subtitle style</a:t>
             </a:r>
             <a:endParaRPr lang="en-PH"/>
@@ -257,7 +705,7 @@
           <a:p>
             <a:fld id="{913D867D-D97B-4959-B47F-FD9CEDE44328}" type="datetimeFigureOut">
               <a:rPr lang="en-PH" smtClean="0"/>
-              <a:t>04/07/2020</a:t>
+              <a:t>05/07/2020</a:t>
             </a:fld>
             <a:endParaRPr lang="en-PH"/>
           </a:p>
@@ -351,7 +799,7 @@
           <a:lstStyle/>
           <a:p>
             <a:r>
-              <a:rPr lang="en-US" smtClean="0"/>
+              <a:rPr lang="en-US"/>
               <a:t>Click to edit Master title style</a:t>
             </a:r>
             <a:endParaRPr lang="en-PH"/>
@@ -375,35 +823,35 @@
           <a:p>
             <a:pPr lvl="0"/>
             <a:r>
-              <a:rPr lang="en-US" smtClean="0"/>
+              <a:rPr lang="en-US"/>
               <a:t>Edit Master text styles</a:t>
             </a:r>
           </a:p>
           <a:p>
             <a:pPr lvl="1"/>
             <a:r>
-              <a:rPr lang="en-US" smtClean="0"/>
+              <a:rPr lang="en-US"/>
               <a:t>Second level</a:t>
             </a:r>
           </a:p>
           <a:p>
             <a:pPr lvl="2"/>
             <a:r>
-              <a:rPr lang="en-US" smtClean="0"/>
+              <a:rPr lang="en-US"/>
               <a:t>Third level</a:t>
             </a:r>
           </a:p>
           <a:p>
             <a:pPr lvl="3"/>
             <a:r>
-              <a:rPr lang="en-US" smtClean="0"/>
+              <a:rPr lang="en-US"/>
               <a:t>Fourth level</a:t>
             </a:r>
           </a:p>
           <a:p>
             <a:pPr lvl="4"/>
             <a:r>
-              <a:rPr lang="en-US" smtClean="0"/>
+              <a:rPr lang="en-US"/>
               <a:t>Fifth level</a:t>
             </a:r>
             <a:endParaRPr lang="en-PH"/>
@@ -427,7 +875,7 @@
           <a:p>
             <a:fld id="{913D867D-D97B-4959-B47F-FD9CEDE44328}" type="datetimeFigureOut">
               <a:rPr lang="en-PH" smtClean="0"/>
-              <a:t>04/07/2020</a:t>
+              <a:t>05/07/2020</a:t>
             </a:fld>
             <a:endParaRPr lang="en-PH"/>
           </a:p>
@@ -526,7 +974,7 @@
           <a:lstStyle/>
           <a:p>
             <a:r>
-              <a:rPr lang="en-US" smtClean="0"/>
+              <a:rPr lang="en-US"/>
               <a:t>Click to edit Master title style</a:t>
             </a:r>
             <a:endParaRPr lang="en-PH"/>
@@ -555,35 +1003,35 @@
           <a:p>
             <a:pPr lvl="0"/>
             <a:r>
-              <a:rPr lang="en-US" smtClean="0"/>
+              <a:rPr lang="en-US"/>
               <a:t>Edit Master text styles</a:t>
             </a:r>
           </a:p>
           <a:p>
             <a:pPr lvl="1"/>
             <a:r>
-              <a:rPr lang="en-US" smtClean="0"/>
+              <a:rPr lang="en-US"/>
               <a:t>Second level</a:t>
             </a:r>
           </a:p>
           <a:p>
             <a:pPr lvl="2"/>
             <a:r>
-              <a:rPr lang="en-US" smtClean="0"/>
+              <a:rPr lang="en-US"/>
               <a:t>Third level</a:t>
             </a:r>
           </a:p>
           <a:p>
             <a:pPr lvl="3"/>
             <a:r>
-              <a:rPr lang="en-US" smtClean="0"/>
+              <a:rPr lang="en-US"/>
               <a:t>Fourth level</a:t>
             </a:r>
           </a:p>
           <a:p>
             <a:pPr lvl="4"/>
             <a:r>
-              <a:rPr lang="en-US" smtClean="0"/>
+              <a:rPr lang="en-US"/>
               <a:t>Fifth level</a:t>
             </a:r>
             <a:endParaRPr lang="en-PH"/>
@@ -607,7 +1055,7 @@
           <a:p>
             <a:fld id="{913D867D-D97B-4959-B47F-FD9CEDE44328}" type="datetimeFigureOut">
               <a:rPr lang="en-PH" smtClean="0"/>
-              <a:t>04/07/2020</a:t>
+              <a:t>05/07/2020</a:t>
             </a:fld>
             <a:endParaRPr lang="en-PH"/>
           </a:p>
@@ -701,7 +1149,7 @@
           <a:lstStyle/>
           <a:p>
             <a:r>
-              <a:rPr lang="en-US" smtClean="0"/>
+              <a:rPr lang="en-US"/>
               <a:t>Click to edit Master title style</a:t>
             </a:r>
             <a:endParaRPr lang="en-PH"/>
@@ -725,35 +1173,35 @@
           <a:p>
             <a:pPr lvl="0"/>
             <a:r>
-              <a:rPr lang="en-US" smtClean="0"/>
+              <a:rPr lang="en-US"/>
               <a:t>Edit Master text styles</a:t>
             </a:r>
           </a:p>
           <a:p>
             <a:pPr lvl="1"/>
             <a:r>
-              <a:rPr lang="en-US" smtClean="0"/>
+              <a:rPr lang="en-US"/>
               <a:t>Second level</a:t>
             </a:r>
           </a:p>
           <a:p>
             <a:pPr lvl="2"/>
             <a:r>
-              <a:rPr lang="en-US" smtClean="0"/>
+              <a:rPr lang="en-US"/>
               <a:t>Third level</a:t>
             </a:r>
           </a:p>
           <a:p>
             <a:pPr lvl="3"/>
             <a:r>
-              <a:rPr lang="en-US" smtClean="0"/>
+              <a:rPr lang="en-US"/>
               <a:t>Fourth level</a:t>
             </a:r>
           </a:p>
           <a:p>
             <a:pPr lvl="4"/>
             <a:r>
-              <a:rPr lang="en-US" smtClean="0"/>
+              <a:rPr lang="en-US"/>
               <a:t>Fifth level</a:t>
             </a:r>
             <a:endParaRPr lang="en-PH"/>
@@ -777,7 +1225,7 @@
           <a:p>
             <a:fld id="{913D867D-D97B-4959-B47F-FD9CEDE44328}" type="datetimeFigureOut">
               <a:rPr lang="en-PH" smtClean="0"/>
-              <a:t>04/07/2020</a:t>
+              <a:t>05/07/2020</a:t>
             </a:fld>
             <a:endParaRPr lang="en-PH"/>
           </a:p>
@@ -880,7 +1328,7 @@
           </a:lstStyle>
           <a:p>
             <a:r>
-              <a:rPr lang="en-US" smtClean="0"/>
+              <a:rPr lang="en-US"/>
               <a:t>Click to edit Master title style</a:t>
             </a:r>
             <a:endParaRPr lang="en-PH"/>
@@ -1000,7 +1448,7 @@
           <a:p>
             <a:pPr lvl="0"/>
             <a:r>
-              <a:rPr lang="en-US" smtClean="0"/>
+              <a:rPr lang="en-US"/>
               <a:t>Edit Master text styles</a:t>
             </a:r>
           </a:p>
@@ -1023,7 +1471,7 @@
           <a:p>
             <a:fld id="{913D867D-D97B-4959-B47F-FD9CEDE44328}" type="datetimeFigureOut">
               <a:rPr lang="en-PH" smtClean="0"/>
-              <a:t>04/07/2020</a:t>
+              <a:t>05/07/2020</a:t>
             </a:fld>
             <a:endParaRPr lang="en-PH"/>
           </a:p>
@@ -1117,7 +1565,7 @@
           <a:lstStyle/>
           <a:p>
             <a:r>
-              <a:rPr lang="en-US" smtClean="0"/>
+              <a:rPr lang="en-US"/>
               <a:t>Click to edit Master title style</a:t>
             </a:r>
             <a:endParaRPr lang="en-PH"/>
@@ -1146,35 +1594,35 @@
           <a:p>
             <a:pPr lvl="0"/>
             <a:r>
-              <a:rPr lang="en-US" smtClean="0"/>
+              <a:rPr lang="en-US"/>
               <a:t>Edit Master text styles</a:t>
             </a:r>
           </a:p>
           <a:p>
             <a:pPr lvl="1"/>
             <a:r>
-              <a:rPr lang="en-US" smtClean="0"/>
+              <a:rPr lang="en-US"/>
               <a:t>Second level</a:t>
             </a:r>
           </a:p>
           <a:p>
             <a:pPr lvl="2"/>
             <a:r>
-              <a:rPr lang="en-US" smtClean="0"/>
+              <a:rPr lang="en-US"/>
               <a:t>Third level</a:t>
             </a:r>
           </a:p>
           <a:p>
             <a:pPr lvl="3"/>
             <a:r>
-              <a:rPr lang="en-US" smtClean="0"/>
+              <a:rPr lang="en-US"/>
               <a:t>Fourth level</a:t>
             </a:r>
           </a:p>
           <a:p>
             <a:pPr lvl="4"/>
             <a:r>
-              <a:rPr lang="en-US" smtClean="0"/>
+              <a:rPr lang="en-US"/>
               <a:t>Fifth level</a:t>
             </a:r>
             <a:endParaRPr lang="en-PH"/>
@@ -1203,35 +1651,35 @@
           <a:p>
             <a:pPr lvl="0"/>
             <a:r>
-              <a:rPr lang="en-US" smtClean="0"/>
+              <a:rPr lang="en-US"/>
               <a:t>Edit Master text styles</a:t>
             </a:r>
           </a:p>
           <a:p>
             <a:pPr lvl="1"/>
             <a:r>
-              <a:rPr lang="en-US" smtClean="0"/>
+              <a:rPr lang="en-US"/>
               <a:t>Second level</a:t>
             </a:r>
           </a:p>
           <a:p>
             <a:pPr lvl="2"/>
             <a:r>
-              <a:rPr lang="en-US" smtClean="0"/>
+              <a:rPr lang="en-US"/>
               <a:t>Third level</a:t>
             </a:r>
           </a:p>
           <a:p>
             <a:pPr lvl="3"/>
             <a:r>
-              <a:rPr lang="en-US" smtClean="0"/>
+              <a:rPr lang="en-US"/>
               <a:t>Fourth level</a:t>
             </a:r>
           </a:p>
           <a:p>
             <a:pPr lvl="4"/>
             <a:r>
-              <a:rPr lang="en-US" smtClean="0"/>
+              <a:rPr lang="en-US"/>
               <a:t>Fifth level</a:t>
             </a:r>
             <a:endParaRPr lang="en-PH"/>
@@ -1255,7 +1703,7 @@
           <a:p>
             <a:fld id="{913D867D-D97B-4959-B47F-FD9CEDE44328}" type="datetimeFigureOut">
               <a:rPr lang="en-PH" smtClean="0"/>
-              <a:t>04/07/2020</a:t>
+              <a:t>05/07/2020</a:t>
             </a:fld>
             <a:endParaRPr lang="en-PH"/>
           </a:p>
@@ -1354,7 +1802,7 @@
           <a:lstStyle/>
           <a:p>
             <a:r>
-              <a:rPr lang="en-US" smtClean="0"/>
+              <a:rPr lang="en-US"/>
               <a:t>Click to edit Master title style</a:t>
             </a:r>
             <a:endParaRPr lang="en-PH"/>
@@ -1420,7 +1868,7 @@
           <a:p>
             <a:pPr lvl="0"/>
             <a:r>
-              <a:rPr lang="en-US" smtClean="0"/>
+              <a:rPr lang="en-US"/>
               <a:t>Edit Master text styles</a:t>
             </a:r>
           </a:p>
@@ -1448,35 +1896,35 @@
           <a:p>
             <a:pPr lvl="0"/>
             <a:r>
-              <a:rPr lang="en-US" smtClean="0"/>
+              <a:rPr lang="en-US"/>
               <a:t>Edit Master text styles</a:t>
             </a:r>
           </a:p>
           <a:p>
             <a:pPr lvl="1"/>
             <a:r>
-              <a:rPr lang="en-US" smtClean="0"/>
+              <a:rPr lang="en-US"/>
               <a:t>Second level</a:t>
             </a:r>
           </a:p>
           <a:p>
             <a:pPr lvl="2"/>
             <a:r>
-              <a:rPr lang="en-US" smtClean="0"/>
+              <a:rPr lang="en-US"/>
               <a:t>Third level</a:t>
             </a:r>
           </a:p>
           <a:p>
             <a:pPr lvl="3"/>
             <a:r>
-              <a:rPr lang="en-US" smtClean="0"/>
+              <a:rPr lang="en-US"/>
               <a:t>Fourth level</a:t>
             </a:r>
           </a:p>
           <a:p>
             <a:pPr lvl="4"/>
             <a:r>
-              <a:rPr lang="en-US" smtClean="0"/>
+              <a:rPr lang="en-US"/>
               <a:t>Fifth level</a:t>
             </a:r>
             <a:endParaRPr lang="en-PH"/>
@@ -1542,7 +1990,7 @@
           <a:p>
             <a:pPr lvl="0"/>
             <a:r>
-              <a:rPr lang="en-US" smtClean="0"/>
+              <a:rPr lang="en-US"/>
               <a:t>Edit Master text styles</a:t>
             </a:r>
           </a:p>
@@ -1570,35 +2018,35 @@
           <a:p>
             <a:pPr lvl="0"/>
             <a:r>
-              <a:rPr lang="en-US" smtClean="0"/>
+              <a:rPr lang="en-US"/>
               <a:t>Edit Master text styles</a:t>
             </a:r>
           </a:p>
           <a:p>
             <a:pPr lvl="1"/>
             <a:r>
-              <a:rPr lang="en-US" smtClean="0"/>
+              <a:rPr lang="en-US"/>
               <a:t>Second level</a:t>
             </a:r>
           </a:p>
           <a:p>
             <a:pPr lvl="2"/>
             <a:r>
-              <a:rPr lang="en-US" smtClean="0"/>
+              <a:rPr lang="en-US"/>
               <a:t>Third level</a:t>
             </a:r>
           </a:p>
           <a:p>
             <a:pPr lvl="3"/>
             <a:r>
-              <a:rPr lang="en-US" smtClean="0"/>
+              <a:rPr lang="en-US"/>
               <a:t>Fourth level</a:t>
             </a:r>
           </a:p>
           <a:p>
             <a:pPr lvl="4"/>
             <a:r>
-              <a:rPr lang="en-US" smtClean="0"/>
+              <a:rPr lang="en-US"/>
               <a:t>Fifth level</a:t>
             </a:r>
             <a:endParaRPr lang="en-PH"/>
@@ -1622,7 +2070,7 @@
           <a:p>
             <a:fld id="{913D867D-D97B-4959-B47F-FD9CEDE44328}" type="datetimeFigureOut">
               <a:rPr lang="en-PH" smtClean="0"/>
-              <a:t>04/07/2020</a:t>
+              <a:t>05/07/2020</a:t>
             </a:fld>
             <a:endParaRPr lang="en-PH"/>
           </a:p>
@@ -1716,7 +2164,7 @@
           <a:lstStyle/>
           <a:p>
             <a:r>
-              <a:rPr lang="en-US" smtClean="0"/>
+              <a:rPr lang="en-US"/>
               <a:t>Click to edit Master title style</a:t>
             </a:r>
             <a:endParaRPr lang="en-PH"/>
@@ -1740,7 +2188,7 @@
           <a:p>
             <a:fld id="{913D867D-D97B-4959-B47F-FD9CEDE44328}" type="datetimeFigureOut">
               <a:rPr lang="en-PH" smtClean="0"/>
-              <a:t>04/07/2020</a:t>
+              <a:t>05/07/2020</a:t>
             </a:fld>
             <a:endParaRPr lang="en-PH"/>
           </a:p>
@@ -1835,7 +2283,7 @@
           <a:p>
             <a:fld id="{913D867D-D97B-4959-B47F-FD9CEDE44328}" type="datetimeFigureOut">
               <a:rPr lang="en-PH" smtClean="0"/>
-              <a:t>04/07/2020</a:t>
+              <a:t>05/07/2020</a:t>
             </a:fld>
             <a:endParaRPr lang="en-PH"/>
           </a:p>
@@ -1938,7 +2386,7 @@
           </a:lstStyle>
           <a:p>
             <a:r>
-              <a:rPr lang="en-US" smtClean="0"/>
+              <a:rPr lang="en-US"/>
               <a:t>Click to edit Master title style</a:t>
             </a:r>
             <a:endParaRPr lang="en-PH"/>
@@ -1995,35 +2443,35 @@
           <a:p>
             <a:pPr lvl="0"/>
             <a:r>
-              <a:rPr lang="en-US" smtClean="0"/>
+              <a:rPr lang="en-US"/>
               <a:t>Edit Master text styles</a:t>
             </a:r>
           </a:p>
           <a:p>
             <a:pPr lvl="1"/>
             <a:r>
-              <a:rPr lang="en-US" smtClean="0"/>
+              <a:rPr lang="en-US"/>
               <a:t>Second level</a:t>
             </a:r>
           </a:p>
           <a:p>
             <a:pPr lvl="2"/>
             <a:r>
-              <a:rPr lang="en-US" smtClean="0"/>
+              <a:rPr lang="en-US"/>
               <a:t>Third level</a:t>
             </a:r>
           </a:p>
           <a:p>
             <a:pPr lvl="3"/>
             <a:r>
-              <a:rPr lang="en-US" smtClean="0"/>
+              <a:rPr lang="en-US"/>
               <a:t>Fourth level</a:t>
             </a:r>
           </a:p>
           <a:p>
             <a:pPr lvl="4"/>
             <a:r>
-              <a:rPr lang="en-US" smtClean="0"/>
+              <a:rPr lang="en-US"/>
               <a:t>Fifth level</a:t>
             </a:r>
             <a:endParaRPr lang="en-PH"/>
@@ -2089,7 +2537,7 @@
           <a:p>
             <a:pPr lvl="0"/>
             <a:r>
-              <a:rPr lang="en-US" smtClean="0"/>
+              <a:rPr lang="en-US"/>
               <a:t>Edit Master text styles</a:t>
             </a:r>
           </a:p>
@@ -2112,7 +2560,7 @@
           <a:p>
             <a:fld id="{913D867D-D97B-4959-B47F-FD9CEDE44328}" type="datetimeFigureOut">
               <a:rPr lang="en-PH" smtClean="0"/>
-              <a:t>04/07/2020</a:t>
+              <a:t>05/07/2020</a:t>
             </a:fld>
             <a:endParaRPr lang="en-PH"/>
           </a:p>
@@ -2215,7 +2663,7 @@
           </a:lstStyle>
           <a:p>
             <a:r>
-              <a:rPr lang="en-US" smtClean="0"/>
+              <a:rPr lang="en-US"/>
               <a:t>Click to edit Master title style</a:t>
             </a:r>
             <a:endParaRPr lang="en-PH"/>
@@ -2342,7 +2790,7 @@
           <a:p>
             <a:pPr lvl="0"/>
             <a:r>
-              <a:rPr lang="en-US" smtClean="0"/>
+              <a:rPr lang="en-US"/>
               <a:t>Edit Master text styles</a:t>
             </a:r>
           </a:p>
@@ -2365,7 +2813,7 @@
           <a:p>
             <a:fld id="{913D867D-D97B-4959-B47F-FD9CEDE44328}" type="datetimeFigureOut">
               <a:rPr lang="en-PH" smtClean="0"/>
-              <a:t>04/07/2020</a:t>
+              <a:t>05/07/2020</a:t>
             </a:fld>
             <a:endParaRPr lang="en-PH"/>
           </a:p>
@@ -2474,7 +2922,7 @@
           <a:lstStyle/>
           <a:p>
             <a:r>
-              <a:rPr lang="en-US" smtClean="0"/>
+              <a:rPr lang="en-US"/>
               <a:t>Click to edit Master title style</a:t>
             </a:r>
             <a:endParaRPr lang="en-PH"/>
@@ -2508,35 +2956,35 @@
           <a:p>
             <a:pPr lvl="0"/>
             <a:r>
-              <a:rPr lang="en-US" smtClean="0"/>
+              <a:rPr lang="en-US"/>
               <a:t>Edit Master text styles</a:t>
             </a:r>
           </a:p>
           <a:p>
             <a:pPr lvl="1"/>
             <a:r>
-              <a:rPr lang="en-US" smtClean="0"/>
+              <a:rPr lang="en-US"/>
               <a:t>Second level</a:t>
             </a:r>
           </a:p>
           <a:p>
             <a:pPr lvl="2"/>
             <a:r>
-              <a:rPr lang="en-US" smtClean="0"/>
+              <a:rPr lang="en-US"/>
               <a:t>Third level</a:t>
             </a:r>
           </a:p>
           <a:p>
             <a:pPr lvl="3"/>
             <a:r>
-              <a:rPr lang="en-US" smtClean="0"/>
+              <a:rPr lang="en-US"/>
               <a:t>Fourth level</a:t>
             </a:r>
           </a:p>
           <a:p>
             <a:pPr lvl="4"/>
             <a:r>
-              <a:rPr lang="en-US" smtClean="0"/>
+              <a:rPr lang="en-US"/>
               <a:t>Fifth level</a:t>
             </a:r>
             <a:endParaRPr lang="en-PH"/>
@@ -2578,7 +3026,7 @@
           <a:p>
             <a:fld id="{913D867D-D97B-4959-B47F-FD9CEDE44328}" type="datetimeFigureOut">
               <a:rPr lang="en-PH" smtClean="0"/>
-              <a:t>04/07/2020</a:t>
+              <a:t>05/07/2020</a:t>
             </a:fld>
             <a:endParaRPr lang="en-PH"/>
           </a:p>
@@ -3009,8 +3457,8 @@
         </p:nvSpPr>
         <p:spPr>
           <a:xfrm>
-            <a:off x="1523998" y="2687216"/>
-            <a:ext cx="9144000" cy="3083347"/>
+            <a:off x="732260" y="2787577"/>
+            <a:ext cx="10727474" cy="3083347"/>
           </a:xfrm>
         </p:spPr>
         <p:txBody>
@@ -3020,37 +3468,18 @@
           <a:lstStyle/>
           <a:p>
             <a:r>
-              <a:rPr lang="en-US" sz="4800" i="1" dirty="0" smtClean="0"/>
+              <a:rPr lang="en-US" sz="4800" i="1" dirty="0"/>
               <a:t> </a:t>
             </a:r>
             <a:r>
-              <a:rPr lang="en-US" sz="4800" i="1" dirty="0" smtClean="0"/>
+              <a:rPr lang="en-US" sz="6600" i="1" dirty="0"/>
               <a:t>“</a:t>
             </a:r>
             <a:r>
-              <a:rPr lang="en-US" sz="5400" i="1" dirty="0" smtClean="0"/>
-              <a:t>Your </a:t>
-            </a:r>
-            <a:r>
-              <a:rPr lang="en-US" sz="5400" i="1" dirty="0" smtClean="0"/>
-              <a:t>On-demand </a:t>
-            </a:r>
-            <a:r>
-              <a:rPr lang="en-US" sz="5400" i="1" dirty="0" smtClean="0"/>
-              <a:t>Social </a:t>
-            </a:r>
-            <a:r>
-              <a:rPr lang="en-US" sz="5400" i="1" dirty="0" smtClean="0"/>
-              <a:t>Media </a:t>
-            </a:r>
-            <a:endParaRPr lang="en-US" sz="5400" i="1" dirty="0" smtClean="0"/>
-          </a:p>
-          <a:p>
-            <a:r>
-              <a:rPr lang="en-US" sz="5400" i="1" dirty="0" smtClean="0"/>
-              <a:t>Delivery App”</a:t>
-            </a:r>
-            <a:endParaRPr lang="en-PH" sz="4800" i="1" dirty="0"/>
+              <a:rPr lang="en-US" sz="7200" i="1" dirty="0"/>
+              <a:t>Your On-demand Social Media Delivery App”</a:t>
+            </a:r>
+            <a:endParaRPr lang="en-PH" sz="6600" i="1" dirty="0"/>
           </a:p>
         </p:txBody>
       </p:sp>
@@ -3094,13 +3523,6 @@
   <p:clrMapOvr>
     <a:masterClrMapping/>
   </p:clrMapOvr>
-  <p:timing>
-    <p:tnLst>
-      <p:par>
-        <p:cTn id="1" dur="indefinite" restart="never" nodeType="tmRoot"/>
-      </p:par>
-    </p:tnLst>
-  </p:timing>
 </p:sld>
 </file>
 
@@ -3204,12 +3626,8 @@
               <a:t>First in the Market </a:t>
             </a:r>
             <a:r>
-              <a:rPr lang="en-AU" sz="3600" dirty="0" smtClean="0"/>
-              <a:t>– for </a:t>
-            </a:r>
-            <a:r>
               <a:rPr lang="en-AU" sz="3600" dirty="0"/>
-              <a:t>being social media on-demand app</a:t>
+              <a:t>– For being the social media on-demand app.</a:t>
             </a:r>
             <a:endParaRPr lang="en-PH" sz="3600" dirty="0"/>
           </a:p>
@@ -3221,15 +3639,7 @@
             </a:r>
             <a:r>
               <a:rPr lang="en-AU" sz="3600" dirty="0"/>
-              <a:t>– Movers &amp; Shops owners doesn’t need to download different </a:t>
-            </a:r>
-            <a:r>
-              <a:rPr lang="en-AU" sz="3600" dirty="0" smtClean="0"/>
-              <a:t>apps</a:t>
-            </a:r>
-            <a:r>
-              <a:rPr lang="en-AU" sz="3600" dirty="0"/>
-              <a:t>.</a:t>
+              <a:t>– Movers &amp; Shops owners don’t need to download different apps.</a:t>
             </a:r>
             <a:endParaRPr lang="en-PH" sz="3600" dirty="0"/>
           </a:p>
@@ -3241,7 +3651,7 @@
             </a:r>
             <a:r>
               <a:rPr lang="en-AU" sz="3600" dirty="0"/>
-              <a:t>– go to news feed and order.</a:t>
+              <a:t>– Go to news feed and order.</a:t>
             </a:r>
             <a:endParaRPr lang="en-PH" sz="3600" dirty="0"/>
           </a:p>
@@ -3253,32 +3663,19 @@
             </a:r>
             <a:r>
               <a:rPr lang="en-AU" sz="3600" dirty="0"/>
-              <a:t>– Get vouch by others and get validated by us</a:t>
-            </a:r>
-            <a:r>
-              <a:rPr lang="en-AU" sz="3600" dirty="0" smtClean="0"/>
-              <a:t>.</a:t>
+              <a:t>– Get vouched by others and get validated by us.</a:t>
             </a:r>
           </a:p>
           <a:p>
             <a:pPr lvl="0"/>
             <a:r>
-              <a:rPr lang="en-PH" sz="3600" b="1" dirty="0" smtClean="0"/>
+              <a:rPr lang="en-PH" sz="3600" b="1" dirty="0"/>
               <a:t>Secured Virtual Wallet </a:t>
             </a:r>
             <a:r>
-              <a:rPr lang="en-PH" sz="3600" dirty="0" smtClean="0"/>
-              <a:t>- using </a:t>
-            </a:r>
-            <a:r>
-              <a:rPr lang="en-PH" sz="3600" dirty="0" err="1" smtClean="0"/>
-              <a:t>Blockchain</a:t>
-            </a:r>
-            <a:r>
-              <a:rPr lang="en-PH" sz="3600" dirty="0" smtClean="0"/>
-              <a:t> Technology.</a:t>
-            </a:r>
-            <a:endParaRPr lang="en-PH" sz="3600" dirty="0"/>
+              <a:rPr lang="en-PH" sz="3600" dirty="0"/>
+              <a:t>- Using Blockchain Technology.</a:t>
+            </a:r>
           </a:p>
         </p:txBody>
       </p:sp>
@@ -3292,13 +3689,6 @@
   <p:clrMapOvr>
     <a:masterClrMapping/>
   </p:clrMapOvr>
-  <p:timing>
-    <p:tnLst>
-      <p:par>
-        <p:cTn id="1" dur="indefinite" restart="never" nodeType="tmRoot"/>
-      </p:par>
-    </p:tnLst>
-  </p:timing>
 </p:sld>
 </file>
 
@@ -3389,73 +3779,68 @@
             <p:ph idx="1"/>
           </p:nvPr>
         </p:nvSpPr>
-        <p:spPr/>
+        <p:spPr>
+          <a:xfrm>
+            <a:off x="838200" y="1562100"/>
+            <a:ext cx="10891838" cy="4981575"/>
+          </a:xfrm>
+        </p:spPr>
         <p:txBody>
           <a:bodyPr>
-            <a:normAutofit/>
+            <a:noAutofit/>
           </a:bodyPr>
           <a:lstStyle/>
           <a:p>
             <a:r>
-              <a:rPr lang="en-AU" sz="3200" b="1" dirty="0" smtClean="0"/>
-              <a:t>Referral </a:t>
-            </a:r>
-            <a:r>
-              <a:rPr lang="en-AU" sz="3200" b="1" dirty="0"/>
-              <a:t>System </a:t>
-            </a:r>
-            <a:r>
-              <a:rPr lang="en-AU" sz="3200" dirty="0"/>
-              <a:t>– User refers the app to another user to get Discounts/Vouchers</a:t>
-            </a:r>
-            <a:endParaRPr lang="en-PH" sz="3200" dirty="0"/>
-          </a:p>
-          <a:p>
-            <a:r>
-              <a:rPr lang="en-AU" sz="3200" b="1" dirty="0"/>
+              <a:rPr lang="en-AU" sz="3500" b="1" dirty="0"/>
+              <a:t>Referral System </a:t>
+            </a:r>
+            <a:r>
+              <a:rPr lang="en-AU" sz="3500" dirty="0"/>
+              <a:t>– User refers the app to another user to get Discounts/Vouchers.</a:t>
+            </a:r>
+            <a:endParaRPr lang="en-PH" sz="3500" dirty="0"/>
+          </a:p>
+          <a:p>
+            <a:r>
+              <a:rPr lang="en-AU" sz="3500" b="1" dirty="0"/>
               <a:t>Social Media </a:t>
             </a:r>
             <a:r>
-              <a:rPr lang="en-AU" sz="3200" dirty="0"/>
-              <a:t>– Partnerships with </a:t>
-            </a:r>
-            <a:r>
-              <a:rPr lang="en-AU" sz="3200" dirty="0" smtClean="0"/>
-              <a:t>Influencers, </a:t>
-            </a:r>
-            <a:r>
-              <a:rPr lang="en-AU" sz="3200" dirty="0"/>
-              <a:t>Page </a:t>
-            </a:r>
-            <a:r>
-              <a:rPr lang="en-AU" sz="3200" dirty="0" smtClean="0"/>
-              <a:t>Groups, Facebook and Google Ads. </a:t>
-            </a:r>
-            <a:endParaRPr lang="en-PH" sz="3200" dirty="0"/>
-          </a:p>
-          <a:p>
-            <a:r>
-              <a:rPr lang="en-AU" sz="3200" b="1" dirty="0"/>
+              <a:rPr lang="en-AU" sz="3500" dirty="0"/>
+              <a:t>– Partnerships with Influencers, Page Groups and Facebook.</a:t>
+            </a:r>
+            <a:endParaRPr lang="en-PH" sz="3500" dirty="0"/>
+          </a:p>
+          <a:p>
+            <a:r>
+              <a:rPr lang="en-AU" sz="3500" b="1" dirty="0"/>
               <a:t>Partners Page </a:t>
             </a:r>
             <a:r>
-              <a:rPr lang="en-AU" sz="3200" dirty="0"/>
+              <a:rPr lang="en-AU" sz="3500" dirty="0"/>
               <a:t>– Creating a deal with our Partner to make us their Cover Photo.</a:t>
             </a:r>
-            <a:endParaRPr lang="en-PH" sz="3200" dirty="0"/>
-          </a:p>
-          <a:p>
-            <a:r>
-              <a:rPr lang="en-AU" sz="3200" b="1" dirty="0"/>
+            <a:endParaRPr lang="en-PH" sz="3500" dirty="0"/>
+          </a:p>
+          <a:p>
+            <a:r>
+              <a:rPr lang="en-AU" sz="3500" b="1" dirty="0"/>
               <a:t>Posters &amp; Sticker </a:t>
             </a:r>
             <a:r>
-              <a:rPr lang="en-AU" sz="3200" dirty="0"/>
-              <a:t>– on Tricycles and Partners </a:t>
-            </a:r>
-            <a:r>
-              <a:rPr lang="en-AU" sz="3200" dirty="0" smtClean="0"/>
-              <a:t>Shops</a:t>
+              <a:rPr lang="en-AU" sz="3500" dirty="0"/>
+              <a:t>– on Tricycles and Partners Shops</a:t>
+            </a:r>
+          </a:p>
+          <a:p>
+            <a:r>
+              <a:rPr lang="en-AU" sz="3500" b="1" dirty="0"/>
+              <a:t>Digital Marketing </a:t>
+            </a:r>
+            <a:r>
+              <a:rPr lang="en-AU" sz="3500" dirty="0"/>
+              <a:t>– Search Engine Optimization and Pay-Per-Click (Google Ads)</a:t>
             </a:r>
           </a:p>
         </p:txBody>
@@ -3470,13 +3855,6 @@
   <p:clrMapOvr>
     <a:masterClrMapping/>
   </p:clrMapOvr>
-  <p:timing>
-    <p:tnLst>
-      <p:par>
-        <p:cTn id="1" dur="indefinite" restart="never" nodeType="tmRoot"/>
-      </p:par>
-    </p:tnLst>
-  </p:timing>
 </p:sld>
 </file>
 
@@ -3569,134 +3947,588 @@
         </p:nvSpPr>
         <p:spPr>
           <a:xfrm>
-            <a:off x="838200" y="3656077"/>
-            <a:ext cx="3451860" cy="2520886"/>
+            <a:off x="407510" y="3743176"/>
+            <a:ext cx="3711015" cy="785758"/>
           </a:xfrm>
         </p:spPr>
         <p:txBody>
           <a:bodyPr>
-            <a:normAutofit fontScale="47500" lnSpcReduction="20000"/>
+            <a:noAutofit/>
           </a:bodyPr>
           <a:lstStyle/>
           <a:p>
             <a:pPr marL="0" indent="0" algn="ctr">
               <a:buNone/>
             </a:pPr>
-            <a:endParaRPr lang="en-AU" sz="1800" b="1" dirty="0" smtClean="0"/>
+            <a:r>
+              <a:rPr lang="en-PH" sz="1600" b="1" dirty="0" smtClean="0">
+                <a:effectLst>
+                  <a:outerShdw blurRad="38100" dist="38100" dir="2700000" algn="tl">
+                    <a:srgbClr val="000000">
+                      <a:alpha val="43137"/>
+                    </a:srgbClr>
+                  </a:outerShdw>
+                </a:effectLst>
+              </a:rPr>
+              <a:t>Joseph </a:t>
+            </a:r>
+            <a:r>
+              <a:rPr lang="en-PH" sz="1600" b="1" dirty="0">
+                <a:effectLst>
+                  <a:outerShdw blurRad="38100" dist="38100" dir="2700000" algn="tl">
+                    <a:srgbClr val="000000">
+                      <a:alpha val="43137"/>
+                    </a:srgbClr>
+                  </a:outerShdw>
+                </a:effectLst>
+              </a:rPr>
+              <a:t>Ronald </a:t>
+            </a:r>
+            <a:r>
+              <a:rPr lang="en-PH" sz="1600" b="1" dirty="0" err="1">
+                <a:effectLst>
+                  <a:outerShdw blurRad="38100" dist="38100" dir="2700000" algn="tl">
+                    <a:srgbClr val="000000">
+                      <a:alpha val="43137"/>
+                    </a:srgbClr>
+                  </a:outerShdw>
+                </a:effectLst>
+              </a:rPr>
+              <a:t>Calara</a:t>
+            </a:r>
+            <a:endParaRPr lang="en-PH" sz="1600" b="1" dirty="0">
+              <a:effectLst>
+                <a:outerShdw blurRad="38100" dist="38100" dir="2700000" algn="tl">
+                  <a:srgbClr val="000000">
+                    <a:alpha val="43137"/>
+                  </a:srgbClr>
+                </a:outerShdw>
+              </a:effectLst>
+            </a:endParaRPr>
           </a:p>
           <a:p>
             <a:pPr marL="0" indent="0" algn="ctr">
               <a:buNone/>
             </a:pPr>
             <a:r>
-              <a:rPr lang="en-PH" sz="1800" dirty="0" smtClean="0"/>
-              <a:t>Joseph Ronald </a:t>
-            </a:r>
-            <a:r>
-              <a:rPr lang="en-PH" sz="1800" dirty="0" err="1" smtClean="0"/>
-              <a:t>Calara</a:t>
-            </a:r>
-            <a:endParaRPr lang="en-PH" sz="1800" dirty="0" smtClean="0"/>
-          </a:p>
+              <a:rPr lang="en-PH" sz="1200" dirty="0"/>
+              <a:t>Founder / Chief Executive </a:t>
+            </a:r>
+            <a:r>
+              <a:rPr lang="en-PH" sz="1200" dirty="0" smtClean="0"/>
+              <a:t>Officer</a:t>
+            </a:r>
+            <a:endParaRPr lang="en-PH" sz="1200" dirty="0"/>
+          </a:p>
+        </p:txBody>
+      </p:sp>
+      <p:sp>
+        <p:nvSpPr>
+          <p:cNvPr id="15" name="Content Placeholder 2"/>
+          <p:cNvSpPr txBox="1">
+            <a:spLocks/>
+          </p:cNvSpPr>
+          <p:nvPr/>
+        </p:nvSpPr>
+        <p:spPr>
+          <a:xfrm>
+            <a:off x="8242097" y="3735630"/>
+            <a:ext cx="3449782" cy="768366"/>
+          </a:xfrm>
+          <a:prstGeom prst="rect">
+            <a:avLst/>
+          </a:prstGeom>
+        </p:spPr>
+        <p:txBody>
+          <a:bodyPr vert="horz" lIns="91440" tIns="45720" rIns="91440" bIns="45720" rtlCol="0">
+            <a:normAutofit/>
+          </a:bodyPr>
+          <a:lstStyle>
+            <a:lvl1pPr marL="228600" indent="-228600" algn="l" defTabSz="914400" rtl="0" eaLnBrk="1" latinLnBrk="0" hangingPunct="1">
+              <a:lnSpc>
+                <a:spcPct val="90000"/>
+              </a:lnSpc>
+              <a:spcBef>
+                <a:spcPts val="1000"/>
+              </a:spcBef>
+              <a:buFont typeface="Arial" panose="020B0604020202020204" pitchFamily="34" charset="0"/>
+              <a:buChar char="•"/>
+              <a:defRPr sz="2800" kern="1200">
+                <a:solidFill>
+                  <a:schemeClr val="tx1"/>
+                </a:solidFill>
+                <a:latin typeface="+mn-lt"/>
+                <a:ea typeface="+mn-ea"/>
+                <a:cs typeface="+mn-cs"/>
+              </a:defRPr>
+            </a:lvl1pPr>
+            <a:lvl2pPr marL="685800" indent="-228600" algn="l" defTabSz="914400" rtl="0" eaLnBrk="1" latinLnBrk="0" hangingPunct="1">
+              <a:lnSpc>
+                <a:spcPct val="90000"/>
+              </a:lnSpc>
+              <a:spcBef>
+                <a:spcPts val="500"/>
+              </a:spcBef>
+              <a:buFont typeface="Arial" panose="020B0604020202020204" pitchFamily="34" charset="0"/>
+              <a:buChar char="•"/>
+              <a:defRPr sz="2400" kern="1200">
+                <a:solidFill>
+                  <a:schemeClr val="tx1"/>
+                </a:solidFill>
+                <a:latin typeface="+mn-lt"/>
+                <a:ea typeface="+mn-ea"/>
+                <a:cs typeface="+mn-cs"/>
+              </a:defRPr>
+            </a:lvl2pPr>
+            <a:lvl3pPr marL="1143000" indent="-228600" algn="l" defTabSz="914400" rtl="0" eaLnBrk="1" latinLnBrk="0" hangingPunct="1">
+              <a:lnSpc>
+                <a:spcPct val="90000"/>
+              </a:lnSpc>
+              <a:spcBef>
+                <a:spcPts val="500"/>
+              </a:spcBef>
+              <a:buFont typeface="Arial" panose="020B0604020202020204" pitchFamily="34" charset="0"/>
+              <a:buChar char="•"/>
+              <a:defRPr sz="2000" kern="1200">
+                <a:solidFill>
+                  <a:schemeClr val="tx1"/>
+                </a:solidFill>
+                <a:latin typeface="+mn-lt"/>
+                <a:ea typeface="+mn-ea"/>
+                <a:cs typeface="+mn-cs"/>
+              </a:defRPr>
+            </a:lvl3pPr>
+            <a:lvl4pPr marL="1600200" indent="-228600" algn="l" defTabSz="914400" rtl="0" eaLnBrk="1" latinLnBrk="0" hangingPunct="1">
+              <a:lnSpc>
+                <a:spcPct val="90000"/>
+              </a:lnSpc>
+              <a:spcBef>
+                <a:spcPts val="500"/>
+              </a:spcBef>
+              <a:buFont typeface="Arial" panose="020B0604020202020204" pitchFamily="34" charset="0"/>
+              <a:buChar char="•"/>
+              <a:defRPr sz="1800" kern="1200">
+                <a:solidFill>
+                  <a:schemeClr val="tx1"/>
+                </a:solidFill>
+                <a:latin typeface="+mn-lt"/>
+                <a:ea typeface="+mn-ea"/>
+                <a:cs typeface="+mn-cs"/>
+              </a:defRPr>
+            </a:lvl4pPr>
+            <a:lvl5pPr marL="2057400" indent="-228600" algn="l" defTabSz="914400" rtl="0" eaLnBrk="1" latinLnBrk="0" hangingPunct="1">
+              <a:lnSpc>
+                <a:spcPct val="90000"/>
+              </a:lnSpc>
+              <a:spcBef>
+                <a:spcPts val="500"/>
+              </a:spcBef>
+              <a:buFont typeface="Arial" panose="020B0604020202020204" pitchFamily="34" charset="0"/>
+              <a:buChar char="•"/>
+              <a:defRPr sz="1800" kern="1200">
+                <a:solidFill>
+                  <a:schemeClr val="tx1"/>
+                </a:solidFill>
+                <a:latin typeface="+mn-lt"/>
+                <a:ea typeface="+mn-ea"/>
+                <a:cs typeface="+mn-cs"/>
+              </a:defRPr>
+            </a:lvl5pPr>
+            <a:lvl6pPr marL="2514600" indent="-228600" algn="l" defTabSz="914400" rtl="0" eaLnBrk="1" latinLnBrk="0" hangingPunct="1">
+              <a:lnSpc>
+                <a:spcPct val="90000"/>
+              </a:lnSpc>
+              <a:spcBef>
+                <a:spcPts val="500"/>
+              </a:spcBef>
+              <a:buFont typeface="Arial" panose="020B0604020202020204" pitchFamily="34" charset="0"/>
+              <a:buChar char="•"/>
+              <a:defRPr sz="1800" kern="1200">
+                <a:solidFill>
+                  <a:schemeClr val="tx1"/>
+                </a:solidFill>
+                <a:latin typeface="+mn-lt"/>
+                <a:ea typeface="+mn-ea"/>
+                <a:cs typeface="+mn-cs"/>
+              </a:defRPr>
+            </a:lvl6pPr>
+            <a:lvl7pPr marL="2971800" indent="-228600" algn="l" defTabSz="914400" rtl="0" eaLnBrk="1" latinLnBrk="0" hangingPunct="1">
+              <a:lnSpc>
+                <a:spcPct val="90000"/>
+              </a:lnSpc>
+              <a:spcBef>
+                <a:spcPts val="500"/>
+              </a:spcBef>
+              <a:buFont typeface="Arial" panose="020B0604020202020204" pitchFamily="34" charset="0"/>
+              <a:buChar char="•"/>
+              <a:defRPr sz="1800" kern="1200">
+                <a:solidFill>
+                  <a:schemeClr val="tx1"/>
+                </a:solidFill>
+                <a:latin typeface="+mn-lt"/>
+                <a:ea typeface="+mn-ea"/>
+                <a:cs typeface="+mn-cs"/>
+              </a:defRPr>
+            </a:lvl7pPr>
+            <a:lvl8pPr marL="3429000" indent="-228600" algn="l" defTabSz="914400" rtl="0" eaLnBrk="1" latinLnBrk="0" hangingPunct="1">
+              <a:lnSpc>
+                <a:spcPct val="90000"/>
+              </a:lnSpc>
+              <a:spcBef>
+                <a:spcPts val="500"/>
+              </a:spcBef>
+              <a:buFont typeface="Arial" panose="020B0604020202020204" pitchFamily="34" charset="0"/>
+              <a:buChar char="•"/>
+              <a:defRPr sz="1800" kern="1200">
+                <a:solidFill>
+                  <a:schemeClr val="tx1"/>
+                </a:solidFill>
+                <a:latin typeface="+mn-lt"/>
+                <a:ea typeface="+mn-ea"/>
+                <a:cs typeface="+mn-cs"/>
+              </a:defRPr>
+            </a:lvl8pPr>
+            <a:lvl9pPr marL="3886200" indent="-228600" algn="l" defTabSz="914400" rtl="0" eaLnBrk="1" latinLnBrk="0" hangingPunct="1">
+              <a:lnSpc>
+                <a:spcPct val="90000"/>
+              </a:lnSpc>
+              <a:spcBef>
+                <a:spcPts val="500"/>
+              </a:spcBef>
+              <a:buFont typeface="Arial" panose="020B0604020202020204" pitchFamily="34" charset="0"/>
+              <a:buChar char="•"/>
+              <a:defRPr sz="1800" kern="1200">
+                <a:solidFill>
+                  <a:schemeClr val="tx1"/>
+                </a:solidFill>
+                <a:latin typeface="+mn-lt"/>
+                <a:ea typeface="+mn-ea"/>
+                <a:cs typeface="+mn-cs"/>
+              </a:defRPr>
+            </a:lvl9pPr>
+          </a:lstStyle>
           <a:p>
             <a:pPr marL="0" indent="0" algn="ctr">
+              <a:buFont typeface="Arial" panose="020B0604020202020204" pitchFamily="34" charset="0"/>
               <a:buNone/>
             </a:pPr>
             <a:r>
+              <a:rPr lang="en-PH" sz="1600" b="1" dirty="0" smtClean="0">
+                <a:effectLst>
+                  <a:outerShdw blurRad="38100" dist="38100" dir="2700000" algn="tl">
+                    <a:srgbClr val="000000">
+                      <a:alpha val="43137"/>
+                    </a:srgbClr>
+                  </a:outerShdw>
+                </a:effectLst>
+              </a:rPr>
+              <a:t>Caezar </a:t>
+            </a:r>
+            <a:r>
+              <a:rPr lang="en-PH" sz="1600" b="1" dirty="0">
+                <a:effectLst>
+                  <a:outerShdw blurRad="38100" dist="38100" dir="2700000" algn="tl">
+                    <a:srgbClr val="000000">
+                      <a:alpha val="43137"/>
+                    </a:srgbClr>
+                  </a:outerShdw>
+                </a:effectLst>
+              </a:rPr>
+              <a:t>De Castro II</a:t>
+            </a:r>
+          </a:p>
+          <a:p>
+            <a:pPr marL="0" indent="0" algn="ctr">
+              <a:buNone/>
+            </a:pPr>
+            <a:r>
+              <a:rPr lang="en-PH" sz="1400" dirty="0"/>
+              <a:t>Co-Founder / Chief Technical </a:t>
+            </a:r>
+            <a:r>
               <a:rPr lang="en-PH" sz="1400" dirty="0" smtClean="0"/>
-              <a:t>Founder / Chief Executive Officer</a:t>
-            </a:r>
-          </a:p>
+              <a:t>Officer</a:t>
+            </a:r>
+            <a:endParaRPr lang="en-PH" sz="1400" dirty="0"/>
+          </a:p>
+        </p:txBody>
+      </p:sp>
+      <p:sp>
+        <p:nvSpPr>
+          <p:cNvPr id="16" name="Content Placeholder 2"/>
+          <p:cNvSpPr txBox="1">
+            <a:spLocks/>
+          </p:cNvSpPr>
+          <p:nvPr/>
+        </p:nvSpPr>
+        <p:spPr>
+          <a:xfrm>
+            <a:off x="4224634" y="3743176"/>
+            <a:ext cx="3654005" cy="760820"/>
+          </a:xfrm>
+          <a:prstGeom prst="rect">
+            <a:avLst/>
+          </a:prstGeom>
+        </p:spPr>
+        <p:txBody>
+          <a:bodyPr vert="horz" lIns="91440" tIns="45720" rIns="91440" bIns="45720" rtlCol="0">
+            <a:normAutofit/>
+          </a:bodyPr>
+          <a:lstStyle>
+            <a:lvl1pPr marL="228600" indent="-228600" algn="l" defTabSz="914400" rtl="0" eaLnBrk="1" latinLnBrk="0" hangingPunct="1">
+              <a:lnSpc>
+                <a:spcPct val="90000"/>
+              </a:lnSpc>
+              <a:spcBef>
+                <a:spcPts val="1000"/>
+              </a:spcBef>
+              <a:buFont typeface="Arial" panose="020B0604020202020204" pitchFamily="34" charset="0"/>
+              <a:buChar char="•"/>
+              <a:defRPr sz="2800" kern="1200">
+                <a:solidFill>
+                  <a:schemeClr val="tx1"/>
+                </a:solidFill>
+                <a:latin typeface="+mn-lt"/>
+                <a:ea typeface="+mn-ea"/>
+                <a:cs typeface="+mn-cs"/>
+              </a:defRPr>
+            </a:lvl1pPr>
+            <a:lvl2pPr marL="685800" indent="-228600" algn="l" defTabSz="914400" rtl="0" eaLnBrk="1" latinLnBrk="0" hangingPunct="1">
+              <a:lnSpc>
+                <a:spcPct val="90000"/>
+              </a:lnSpc>
+              <a:spcBef>
+                <a:spcPts val="500"/>
+              </a:spcBef>
+              <a:buFont typeface="Arial" panose="020B0604020202020204" pitchFamily="34" charset="0"/>
+              <a:buChar char="•"/>
+              <a:defRPr sz="2400" kern="1200">
+                <a:solidFill>
+                  <a:schemeClr val="tx1"/>
+                </a:solidFill>
+                <a:latin typeface="+mn-lt"/>
+                <a:ea typeface="+mn-ea"/>
+                <a:cs typeface="+mn-cs"/>
+              </a:defRPr>
+            </a:lvl2pPr>
+            <a:lvl3pPr marL="1143000" indent="-228600" algn="l" defTabSz="914400" rtl="0" eaLnBrk="1" latinLnBrk="0" hangingPunct="1">
+              <a:lnSpc>
+                <a:spcPct val="90000"/>
+              </a:lnSpc>
+              <a:spcBef>
+                <a:spcPts val="500"/>
+              </a:spcBef>
+              <a:buFont typeface="Arial" panose="020B0604020202020204" pitchFamily="34" charset="0"/>
+              <a:buChar char="•"/>
+              <a:defRPr sz="2000" kern="1200">
+                <a:solidFill>
+                  <a:schemeClr val="tx1"/>
+                </a:solidFill>
+                <a:latin typeface="+mn-lt"/>
+                <a:ea typeface="+mn-ea"/>
+                <a:cs typeface="+mn-cs"/>
+              </a:defRPr>
+            </a:lvl3pPr>
+            <a:lvl4pPr marL="1600200" indent="-228600" algn="l" defTabSz="914400" rtl="0" eaLnBrk="1" latinLnBrk="0" hangingPunct="1">
+              <a:lnSpc>
+                <a:spcPct val="90000"/>
+              </a:lnSpc>
+              <a:spcBef>
+                <a:spcPts val="500"/>
+              </a:spcBef>
+              <a:buFont typeface="Arial" panose="020B0604020202020204" pitchFamily="34" charset="0"/>
+              <a:buChar char="•"/>
+              <a:defRPr sz="1800" kern="1200">
+                <a:solidFill>
+                  <a:schemeClr val="tx1"/>
+                </a:solidFill>
+                <a:latin typeface="+mn-lt"/>
+                <a:ea typeface="+mn-ea"/>
+                <a:cs typeface="+mn-cs"/>
+              </a:defRPr>
+            </a:lvl4pPr>
+            <a:lvl5pPr marL="2057400" indent="-228600" algn="l" defTabSz="914400" rtl="0" eaLnBrk="1" latinLnBrk="0" hangingPunct="1">
+              <a:lnSpc>
+                <a:spcPct val="90000"/>
+              </a:lnSpc>
+              <a:spcBef>
+                <a:spcPts val="500"/>
+              </a:spcBef>
+              <a:buFont typeface="Arial" panose="020B0604020202020204" pitchFamily="34" charset="0"/>
+              <a:buChar char="•"/>
+              <a:defRPr sz="1800" kern="1200">
+                <a:solidFill>
+                  <a:schemeClr val="tx1"/>
+                </a:solidFill>
+                <a:latin typeface="+mn-lt"/>
+                <a:ea typeface="+mn-ea"/>
+                <a:cs typeface="+mn-cs"/>
+              </a:defRPr>
+            </a:lvl5pPr>
+            <a:lvl6pPr marL="2514600" indent="-228600" algn="l" defTabSz="914400" rtl="0" eaLnBrk="1" latinLnBrk="0" hangingPunct="1">
+              <a:lnSpc>
+                <a:spcPct val="90000"/>
+              </a:lnSpc>
+              <a:spcBef>
+                <a:spcPts val="500"/>
+              </a:spcBef>
+              <a:buFont typeface="Arial" panose="020B0604020202020204" pitchFamily="34" charset="0"/>
+              <a:buChar char="•"/>
+              <a:defRPr sz="1800" kern="1200">
+                <a:solidFill>
+                  <a:schemeClr val="tx1"/>
+                </a:solidFill>
+                <a:latin typeface="+mn-lt"/>
+                <a:ea typeface="+mn-ea"/>
+                <a:cs typeface="+mn-cs"/>
+              </a:defRPr>
+            </a:lvl6pPr>
+            <a:lvl7pPr marL="2971800" indent="-228600" algn="l" defTabSz="914400" rtl="0" eaLnBrk="1" latinLnBrk="0" hangingPunct="1">
+              <a:lnSpc>
+                <a:spcPct val="90000"/>
+              </a:lnSpc>
+              <a:spcBef>
+                <a:spcPts val="500"/>
+              </a:spcBef>
+              <a:buFont typeface="Arial" panose="020B0604020202020204" pitchFamily="34" charset="0"/>
+              <a:buChar char="•"/>
+              <a:defRPr sz="1800" kern="1200">
+                <a:solidFill>
+                  <a:schemeClr val="tx1"/>
+                </a:solidFill>
+                <a:latin typeface="+mn-lt"/>
+                <a:ea typeface="+mn-ea"/>
+                <a:cs typeface="+mn-cs"/>
+              </a:defRPr>
+            </a:lvl7pPr>
+            <a:lvl8pPr marL="3429000" indent="-228600" algn="l" defTabSz="914400" rtl="0" eaLnBrk="1" latinLnBrk="0" hangingPunct="1">
+              <a:lnSpc>
+                <a:spcPct val="90000"/>
+              </a:lnSpc>
+              <a:spcBef>
+                <a:spcPts val="500"/>
+              </a:spcBef>
+              <a:buFont typeface="Arial" panose="020B0604020202020204" pitchFamily="34" charset="0"/>
+              <a:buChar char="•"/>
+              <a:defRPr sz="1800" kern="1200">
+                <a:solidFill>
+                  <a:schemeClr val="tx1"/>
+                </a:solidFill>
+                <a:latin typeface="+mn-lt"/>
+                <a:ea typeface="+mn-ea"/>
+                <a:cs typeface="+mn-cs"/>
+              </a:defRPr>
+            </a:lvl8pPr>
+            <a:lvl9pPr marL="3886200" indent="-228600" algn="l" defTabSz="914400" rtl="0" eaLnBrk="1" latinLnBrk="0" hangingPunct="1">
+              <a:lnSpc>
+                <a:spcPct val="90000"/>
+              </a:lnSpc>
+              <a:spcBef>
+                <a:spcPts val="500"/>
+              </a:spcBef>
+              <a:buFont typeface="Arial" panose="020B0604020202020204" pitchFamily="34" charset="0"/>
+              <a:buChar char="•"/>
+              <a:defRPr sz="1800" kern="1200">
+                <a:solidFill>
+                  <a:schemeClr val="tx1"/>
+                </a:solidFill>
+                <a:latin typeface="+mn-lt"/>
+                <a:ea typeface="+mn-ea"/>
+                <a:cs typeface="+mn-cs"/>
+              </a:defRPr>
+            </a:lvl9pPr>
+          </a:lstStyle>
           <a:p>
             <a:pPr marL="0" indent="0" algn="ctr">
+              <a:buFont typeface="Arial" panose="020B0604020202020204" pitchFamily="34" charset="0"/>
               <a:buNone/>
             </a:pPr>
-            <a:endParaRPr lang="en-US" sz="1400" dirty="0" smtClean="0"/>
+            <a:r>
+              <a:rPr lang="en-PH" sz="1600" b="1" dirty="0" smtClean="0">
+                <a:effectLst>
+                  <a:outerShdw blurRad="38100" dist="38100" dir="2700000" algn="tl">
+                    <a:srgbClr val="000000">
+                      <a:alpha val="43137"/>
+                    </a:srgbClr>
+                  </a:outerShdw>
+                </a:effectLst>
+              </a:rPr>
+              <a:t>Michael </a:t>
+            </a:r>
+            <a:r>
+              <a:rPr lang="en-PH" sz="1600" b="1" dirty="0">
+                <a:effectLst>
+                  <a:outerShdw blurRad="38100" dist="38100" dir="2700000" algn="tl">
+                    <a:srgbClr val="000000">
+                      <a:alpha val="43137"/>
+                    </a:srgbClr>
+                  </a:outerShdw>
+                </a:effectLst>
+              </a:rPr>
+              <a:t>Ian </a:t>
+            </a:r>
+            <a:r>
+              <a:rPr lang="en-PH" sz="1600" b="1" dirty="0" err="1">
+                <a:effectLst>
+                  <a:outerShdw blurRad="38100" dist="38100" dir="2700000" algn="tl">
+                    <a:srgbClr val="000000">
+                      <a:alpha val="43137"/>
+                    </a:srgbClr>
+                  </a:outerShdw>
+                </a:effectLst>
+              </a:rPr>
+              <a:t>Belaguin</a:t>
+            </a:r>
+            <a:endParaRPr lang="en-PH" sz="1600" b="1" dirty="0">
+              <a:effectLst>
+                <a:outerShdw blurRad="38100" dist="38100" dir="2700000" algn="tl">
+                  <a:srgbClr val="000000">
+                    <a:alpha val="43137"/>
+                  </a:srgbClr>
+                </a:outerShdw>
+              </a:effectLst>
+            </a:endParaRPr>
           </a:p>
           <a:p>
             <a:pPr marL="0" indent="0" algn="ctr">
               <a:buNone/>
             </a:pPr>
             <a:r>
-              <a:rPr lang="en-US" sz="2900" i="1" dirty="0"/>
-              <a:t>- Registered Electrical Engineer</a:t>
-            </a:r>
-          </a:p>
-          <a:p>
-            <a:pPr marL="0" indent="0" algn="ctr">
-              <a:buNone/>
-            </a:pPr>
-            <a:r>
-              <a:rPr lang="en-US" sz="2900" i="1" dirty="0" smtClean="0"/>
-              <a:t>- Registered </a:t>
-            </a:r>
-            <a:r>
-              <a:rPr lang="en-US" sz="2900" i="1" dirty="0"/>
-              <a:t>Master Electrician</a:t>
-            </a:r>
-          </a:p>
-          <a:p>
-            <a:pPr marL="0" indent="0" algn="ctr">
-              <a:buNone/>
-            </a:pPr>
-            <a:r>
-              <a:rPr lang="en-US" sz="2900" i="1" dirty="0" smtClean="0"/>
-              <a:t>- 11 </a:t>
-            </a:r>
-            <a:r>
-              <a:rPr lang="en-US" sz="2900" i="1" dirty="0" err="1" smtClean="0"/>
-              <a:t>yrs</a:t>
-            </a:r>
-            <a:r>
-              <a:rPr lang="en-US" sz="2900" i="1" dirty="0" smtClean="0"/>
-              <a:t> Experience on</a:t>
-            </a:r>
-          </a:p>
-          <a:p>
-            <a:pPr marL="0" indent="0" algn="ctr">
-              <a:buNone/>
-            </a:pPr>
-            <a:r>
-              <a:rPr lang="en-US" sz="2900" i="1" dirty="0" smtClean="0"/>
-              <a:t>Project Management.</a:t>
-            </a:r>
-          </a:p>
-          <a:p>
-            <a:pPr algn="ctr">
-              <a:buFontTx/>
-              <a:buChar char="-"/>
-            </a:pPr>
-            <a:r>
-              <a:rPr lang="en-US" sz="2900" i="1" dirty="0" smtClean="0"/>
-              <a:t>Completed Project Management Professional Course at Cambridge University.</a:t>
-            </a:r>
-          </a:p>
-          <a:p>
-            <a:pPr marL="0" indent="0" algn="ctr">
-              <a:buNone/>
-            </a:pPr>
-            <a:endParaRPr lang="en-US" sz="2000" i="1" dirty="0" smtClean="0"/>
+              <a:rPr lang="en-PH" sz="1200" dirty="0"/>
+              <a:t>Co-Founder / Chief Operation </a:t>
+            </a:r>
+            <a:r>
+              <a:rPr lang="en-PH" sz="1200" dirty="0" smtClean="0"/>
+              <a:t>Officer</a:t>
+            </a:r>
+            <a:endParaRPr lang="en-PH" sz="1200" dirty="0"/>
           </a:p>
         </p:txBody>
       </p:sp>
       <p:pic>
         <p:nvPicPr>
-          <p:cNvPr id="11" name="Picture 10"/>
+          <p:cNvPr id="4" name="Picture 3"/>
           <p:cNvPicPr>
             <a:picLocks noChangeAspect="1"/>
           </p:cNvPicPr>
           <p:nvPr/>
         </p:nvPicPr>
         <p:blipFill>
-          <a:blip r:embed="rId3"/>
+          <a:blip r:embed="rId3" cstate="print">
+            <a:extLst>
+              <a:ext uri="{28A0092B-C50C-407E-A947-70E740481C1C}">
+                <a14:useLocalDpi xmlns:a14="http://schemas.microsoft.com/office/drawing/2010/main" val="0"/>
+              </a:ext>
+            </a:extLst>
+          </a:blip>
           <a:stretch>
             <a:fillRect/>
           </a:stretch>
         </p:blipFill>
         <p:spPr>
           <a:xfrm>
-            <a:off x="1680061" y="1606489"/>
-            <a:ext cx="1768138" cy="2133787"/>
+            <a:off x="5138233" y="1690688"/>
+            <a:ext cx="1826808" cy="1826808"/>
           </a:xfrm>
           <a:prstGeom prst="rect">
             <a:avLst/>
@@ -3705,22 +4537,28 @@
       </p:pic>
       <p:pic>
         <p:nvPicPr>
-          <p:cNvPr id="12" name="Picture 11"/>
+          <p:cNvPr id="5" name="Picture 4"/>
           <p:cNvPicPr>
             <a:picLocks noChangeAspect="1"/>
           </p:cNvPicPr>
           <p:nvPr/>
         </p:nvPicPr>
         <p:blipFill>
-          <a:blip r:embed="rId4"/>
+          <a:blip r:embed="rId4" cstate="print">
+            <a:extLst>
+              <a:ext uri="{28A0092B-C50C-407E-A947-70E740481C1C}">
+                <a14:useLocalDpi xmlns:a14="http://schemas.microsoft.com/office/drawing/2010/main" val="0"/>
+              </a:ext>
+            </a:extLst>
+          </a:blip>
           <a:stretch>
             <a:fillRect/>
           </a:stretch>
         </p:blipFill>
         <p:spPr>
           <a:xfrm>
-            <a:off x="5051777" y="1579541"/>
-            <a:ext cx="1920884" cy="2076536"/>
+            <a:off x="9053583" y="1690688"/>
+            <a:ext cx="1826808" cy="1826808"/>
           </a:xfrm>
           <a:prstGeom prst="rect">
             <a:avLst/>
@@ -3729,22 +4567,28 @@
       </p:pic>
       <p:pic>
         <p:nvPicPr>
-          <p:cNvPr id="13" name="Picture 12"/>
+          <p:cNvPr id="6" name="Picture 5"/>
           <p:cNvPicPr>
             <a:picLocks noChangeAspect="1"/>
           </p:cNvPicPr>
           <p:nvPr/>
         </p:nvPicPr>
         <p:blipFill>
-          <a:blip r:embed="rId5"/>
+          <a:blip r:embed="rId5" cstate="print">
+            <a:extLst>
+              <a:ext uri="{28A0092B-C50C-407E-A947-70E740481C1C}">
+                <a14:useLocalDpi xmlns:a14="http://schemas.microsoft.com/office/drawing/2010/main" val="0"/>
+              </a:ext>
+            </a:extLst>
+          </a:blip>
           <a:stretch>
             <a:fillRect/>
           </a:stretch>
         </p:blipFill>
         <p:spPr>
           <a:xfrm>
-            <a:off x="8696395" y="1579541"/>
-            <a:ext cx="1862950" cy="2076536"/>
+            <a:off x="1373972" y="1690688"/>
+            <a:ext cx="1826808" cy="1826808"/>
           </a:xfrm>
           <a:prstGeom prst="rect">
             <a:avLst/>
@@ -3753,7 +4597,7 @@
       </p:pic>
       <p:sp>
         <p:nvSpPr>
-          <p:cNvPr id="15" name="Content Placeholder 2"/>
+          <p:cNvPr id="9" name="Content Placeholder 2"/>
           <p:cNvSpPr txBox="1">
             <a:spLocks/>
           </p:cNvSpPr>
@@ -3761,8 +4605,8 @@
         </p:nvSpPr>
         <p:spPr>
           <a:xfrm>
-            <a:off x="7768197" y="3656076"/>
-            <a:ext cx="3451860" cy="2474859"/>
+            <a:off x="838200" y="4194244"/>
+            <a:ext cx="3135284" cy="2464251"/>
           </a:xfrm>
           <a:prstGeom prst="rect">
             <a:avLst/>
@@ -3770,7 +4614,7 @@
         </p:spPr>
         <p:txBody>
           <a:bodyPr vert="horz" lIns="91440" tIns="45720" rIns="91440" bIns="45720" rtlCol="0">
-            <a:normAutofit fontScale="77500" lnSpcReduction="20000"/>
+            <a:noAutofit/>
           </a:bodyPr>
           <a:lstStyle>
             <a:lvl1pPr marL="228600" indent="-228600" algn="l" defTabSz="914400" rtl="0" eaLnBrk="1" latinLnBrk="0" hangingPunct="1">
@@ -3941,99 +4785,52 @@
               <a:buFont typeface="Arial" panose="020B0604020202020204" pitchFamily="34" charset="0"/>
               <a:buNone/>
             </a:pPr>
-            <a:endParaRPr lang="en-AU" sz="1800" b="1" dirty="0"/>
+            <a:endParaRPr lang="en-AU" sz="1800" b="1" dirty="0" smtClean="0"/>
+          </a:p>
+          <a:p>
+            <a:r>
+              <a:rPr lang="en-US" sz="1400" i="1" dirty="0" smtClean="0"/>
+              <a:t>Registered Electrical Engineer</a:t>
+            </a:r>
+          </a:p>
+          <a:p>
+            <a:r>
+              <a:rPr lang="en-US" sz="1400" i="1" dirty="0" smtClean="0"/>
+              <a:t>Registered Master Electrician</a:t>
+            </a:r>
+          </a:p>
+          <a:p>
+            <a:r>
+              <a:rPr lang="en-US" sz="1400" i="1" dirty="0" smtClean="0"/>
+              <a:t>11 </a:t>
+            </a:r>
+            <a:r>
+              <a:rPr lang="en-US" sz="1400" i="1" dirty="0" err="1" smtClean="0"/>
+              <a:t>yrs</a:t>
+            </a:r>
+            <a:r>
+              <a:rPr lang="en-US" sz="1400" i="1" dirty="0" smtClean="0"/>
+              <a:t> Experience on Project Management</a:t>
+            </a:r>
+          </a:p>
+          <a:p>
+            <a:r>
+              <a:rPr lang="en-US" sz="1400" i="1" dirty="0" smtClean="0"/>
+              <a:t>Completed Project Management Professional Course at Cambridge University</a:t>
+            </a:r>
           </a:p>
           <a:p>
             <a:pPr marL="0" indent="0" algn="ctr">
               <a:buFont typeface="Arial" panose="020B0604020202020204" pitchFamily="34" charset="0"/>
               <a:buNone/>
             </a:pPr>
-            <a:r>
-              <a:rPr lang="en-PH" sz="1800" dirty="0" smtClean="0"/>
-              <a:t>Caezar De Castro II</a:t>
-            </a:r>
-          </a:p>
-          <a:p>
-            <a:pPr marL="0" indent="0" algn="ctr">
-              <a:buNone/>
-            </a:pPr>
-            <a:r>
-              <a:rPr lang="en-PH" sz="1400" dirty="0"/>
-              <a:t>Co-Founder / Chief </a:t>
-            </a:r>
-            <a:r>
-              <a:rPr lang="en-PH" sz="1400" dirty="0" smtClean="0"/>
-              <a:t>Technical </a:t>
-            </a:r>
-            <a:r>
-              <a:rPr lang="en-PH" sz="1400" dirty="0" smtClean="0"/>
-              <a:t>Officer</a:t>
-            </a:r>
-          </a:p>
-          <a:p>
-            <a:pPr marL="0" indent="0" algn="ctr">
-              <a:buNone/>
-            </a:pPr>
-            <a:endParaRPr lang="en-US" sz="1400" dirty="0" smtClean="0"/>
-          </a:p>
-          <a:p>
-            <a:pPr marL="0" indent="0" algn="ctr">
-              <a:buNone/>
-            </a:pPr>
-            <a:r>
-              <a:rPr lang="en-US" sz="1800" i="1" dirty="0" smtClean="0"/>
-              <a:t>- 6 </a:t>
-            </a:r>
-            <a:r>
-              <a:rPr lang="en-US" sz="1800" i="1" dirty="0" err="1" smtClean="0"/>
-              <a:t>yrs</a:t>
-            </a:r>
-            <a:r>
-              <a:rPr lang="en-US" sz="1800" i="1" dirty="0" smtClean="0"/>
-              <a:t> Experience as</a:t>
-            </a:r>
-          </a:p>
-          <a:p>
-            <a:pPr marL="0" indent="0" algn="ctr">
-              <a:buNone/>
-            </a:pPr>
-            <a:r>
-              <a:rPr lang="en-US" sz="1800" i="1" dirty="0" smtClean="0"/>
-              <a:t>Software Developer.</a:t>
-            </a:r>
-          </a:p>
-          <a:p>
-            <a:pPr algn="ctr">
-              <a:buFontTx/>
-              <a:buChar char="-"/>
-            </a:pPr>
-            <a:r>
-              <a:rPr lang="en-US" sz="1800" i="1" dirty="0" smtClean="0"/>
-              <a:t>Published dozens of Company</a:t>
-            </a:r>
-            <a:r>
-              <a:rPr lang="en-PH" sz="1800" i="1" dirty="0"/>
-              <a:t> </a:t>
-            </a:r>
-            <a:r>
-              <a:rPr lang="en-PH" sz="1800" i="1" dirty="0" smtClean="0"/>
-              <a:t>website as Freelance.</a:t>
-            </a:r>
-          </a:p>
-          <a:p>
-            <a:pPr marL="0" indent="0" algn="ctr">
-              <a:buNone/>
-            </a:pPr>
-            <a:r>
-              <a:rPr lang="en-US" sz="1800" i="1" dirty="0" smtClean="0"/>
-              <a:t>- Integrate Network Firewall in a BPO Company.</a:t>
-            </a:r>
-          </a:p>
-        </p:txBody>
-      </p:sp>
-      <p:sp>
-        <p:nvSpPr>
-          <p:cNvPr id="16" name="Content Placeholder 2"/>
+            <a:endParaRPr lang="en-US" sz="2000" i="1" dirty="0"/>
+          </a:p>
+        </p:txBody>
+      </p:sp>
+      <p:sp>
+        <p:nvSpPr>
+          <p:cNvPr id="10" name="Content Placeholder 2"/>
           <p:cNvSpPr txBox="1">
             <a:spLocks/>
           </p:cNvSpPr>
@@ -4041,8 +4838,8 @@
         </p:nvSpPr>
         <p:spPr>
           <a:xfrm>
-            <a:off x="4438689" y="3656077"/>
-            <a:ext cx="3451860" cy="2673286"/>
+            <a:off x="4224633" y="4194244"/>
+            <a:ext cx="3157069" cy="1606538"/>
           </a:xfrm>
           <a:prstGeom prst="rect">
             <a:avLst/>
@@ -4050,7 +4847,7 @@
         </p:spPr>
         <p:txBody>
           <a:bodyPr vert="horz" lIns="91440" tIns="45720" rIns="91440" bIns="45720" rtlCol="0">
-            <a:normAutofit fontScale="77500" lnSpcReduction="20000"/>
+            <a:normAutofit lnSpcReduction="10000"/>
           </a:bodyPr>
           <a:lstStyle>
             <a:lvl1pPr marL="228600" indent="-228600" algn="l" defTabSz="914400" rtl="0" eaLnBrk="1" latinLnBrk="0" hangingPunct="1">
@@ -4221,131 +5018,318 @@
               <a:buFont typeface="Arial" panose="020B0604020202020204" pitchFamily="34" charset="0"/>
               <a:buNone/>
             </a:pPr>
-            <a:endParaRPr lang="en-AU" sz="1800" b="1" dirty="0" smtClean="0"/>
+            <a:endParaRPr lang="en-AU" sz="1800" b="1" dirty="0"/>
+          </a:p>
+          <a:p>
+            <a:r>
+              <a:rPr lang="en-US" sz="1400" i="1" dirty="0" smtClean="0"/>
+              <a:t>Electronics </a:t>
+            </a:r>
+            <a:r>
+              <a:rPr lang="en-US" sz="1400" i="1" dirty="0"/>
+              <a:t>and Communication Engineer</a:t>
+            </a:r>
+          </a:p>
+          <a:p>
+            <a:r>
+              <a:rPr lang="en-US" sz="1400" i="1" dirty="0"/>
+              <a:t>14 </a:t>
+            </a:r>
+            <a:r>
+              <a:rPr lang="en-US" sz="1400" i="1" dirty="0" err="1"/>
+              <a:t>yrs</a:t>
+            </a:r>
+            <a:r>
+              <a:rPr lang="en-US" sz="1400" i="1" dirty="0"/>
+              <a:t> Experience as Process Engineer</a:t>
+            </a:r>
+          </a:p>
+          <a:p>
+            <a:r>
+              <a:rPr lang="en-US" sz="1400" i="1" dirty="0"/>
+              <a:t>Project Operation Lead at AMKOR Tech </a:t>
+            </a:r>
+            <a:r>
+              <a:rPr lang="en-US" sz="1400" i="1" dirty="0" smtClean="0"/>
+              <a:t>Philippines.</a:t>
+            </a:r>
+            <a:endParaRPr lang="en-US" sz="1400" i="1" dirty="0"/>
           </a:p>
           <a:p>
             <a:pPr marL="0" indent="0" algn="ctr">
               <a:buFont typeface="Arial" panose="020B0604020202020204" pitchFamily="34" charset="0"/>
               <a:buNone/>
             </a:pPr>
-            <a:r>
-              <a:rPr lang="en-PH" sz="1800" dirty="0" smtClean="0"/>
-              <a:t>Michael Ian </a:t>
-            </a:r>
-            <a:r>
-              <a:rPr lang="en-PH" sz="1800" dirty="0" err="1" smtClean="0"/>
-              <a:t>Belaguin</a:t>
-            </a:r>
-            <a:endParaRPr lang="en-PH" sz="1800" dirty="0" smtClean="0"/>
-          </a:p>
+            <a:endParaRPr lang="en-PH" sz="1300" dirty="0"/>
+          </a:p>
+        </p:txBody>
+      </p:sp>
+      <p:sp>
+        <p:nvSpPr>
+          <p:cNvPr id="11" name="Content Placeholder 2"/>
+          <p:cNvSpPr txBox="1">
+            <a:spLocks/>
+          </p:cNvSpPr>
+          <p:nvPr/>
+        </p:nvSpPr>
+        <p:spPr>
+          <a:xfrm>
+            <a:off x="8301198" y="4344663"/>
+            <a:ext cx="3331579" cy="2130159"/>
+          </a:xfrm>
+          <a:prstGeom prst="rect">
+            <a:avLst/>
+          </a:prstGeom>
+        </p:spPr>
+        <p:txBody>
+          <a:bodyPr vert="horz" lIns="91440" tIns="45720" rIns="91440" bIns="45720" rtlCol="0">
+            <a:normAutofit/>
+          </a:bodyPr>
+          <a:lstStyle>
+            <a:lvl1pPr marL="228600" indent="-228600" algn="l" defTabSz="914400" rtl="0" eaLnBrk="1" latinLnBrk="0" hangingPunct="1">
+              <a:lnSpc>
+                <a:spcPct val="90000"/>
+              </a:lnSpc>
+              <a:spcBef>
+                <a:spcPts val="1000"/>
+              </a:spcBef>
+              <a:buFont typeface="Arial" panose="020B0604020202020204" pitchFamily="34" charset="0"/>
+              <a:buChar char="•"/>
+              <a:defRPr sz="2800" kern="1200">
+                <a:solidFill>
+                  <a:schemeClr val="tx1"/>
+                </a:solidFill>
+                <a:latin typeface="+mn-lt"/>
+                <a:ea typeface="+mn-ea"/>
+                <a:cs typeface="+mn-cs"/>
+              </a:defRPr>
+            </a:lvl1pPr>
+            <a:lvl2pPr marL="685800" indent="-228600" algn="l" defTabSz="914400" rtl="0" eaLnBrk="1" latinLnBrk="0" hangingPunct="1">
+              <a:lnSpc>
+                <a:spcPct val="90000"/>
+              </a:lnSpc>
+              <a:spcBef>
+                <a:spcPts val="500"/>
+              </a:spcBef>
+              <a:buFont typeface="Arial" panose="020B0604020202020204" pitchFamily="34" charset="0"/>
+              <a:buChar char="•"/>
+              <a:defRPr sz="2400" kern="1200">
+                <a:solidFill>
+                  <a:schemeClr val="tx1"/>
+                </a:solidFill>
+                <a:latin typeface="+mn-lt"/>
+                <a:ea typeface="+mn-ea"/>
+                <a:cs typeface="+mn-cs"/>
+              </a:defRPr>
+            </a:lvl2pPr>
+            <a:lvl3pPr marL="1143000" indent="-228600" algn="l" defTabSz="914400" rtl="0" eaLnBrk="1" latinLnBrk="0" hangingPunct="1">
+              <a:lnSpc>
+                <a:spcPct val="90000"/>
+              </a:lnSpc>
+              <a:spcBef>
+                <a:spcPts val="500"/>
+              </a:spcBef>
+              <a:buFont typeface="Arial" panose="020B0604020202020204" pitchFamily="34" charset="0"/>
+              <a:buChar char="•"/>
+              <a:defRPr sz="2000" kern="1200">
+                <a:solidFill>
+                  <a:schemeClr val="tx1"/>
+                </a:solidFill>
+                <a:latin typeface="+mn-lt"/>
+                <a:ea typeface="+mn-ea"/>
+                <a:cs typeface="+mn-cs"/>
+              </a:defRPr>
+            </a:lvl3pPr>
+            <a:lvl4pPr marL="1600200" indent="-228600" algn="l" defTabSz="914400" rtl="0" eaLnBrk="1" latinLnBrk="0" hangingPunct="1">
+              <a:lnSpc>
+                <a:spcPct val="90000"/>
+              </a:lnSpc>
+              <a:spcBef>
+                <a:spcPts val="500"/>
+              </a:spcBef>
+              <a:buFont typeface="Arial" panose="020B0604020202020204" pitchFamily="34" charset="0"/>
+              <a:buChar char="•"/>
+              <a:defRPr sz="1800" kern="1200">
+                <a:solidFill>
+                  <a:schemeClr val="tx1"/>
+                </a:solidFill>
+                <a:latin typeface="+mn-lt"/>
+                <a:ea typeface="+mn-ea"/>
+                <a:cs typeface="+mn-cs"/>
+              </a:defRPr>
+            </a:lvl4pPr>
+            <a:lvl5pPr marL="2057400" indent="-228600" algn="l" defTabSz="914400" rtl="0" eaLnBrk="1" latinLnBrk="0" hangingPunct="1">
+              <a:lnSpc>
+                <a:spcPct val="90000"/>
+              </a:lnSpc>
+              <a:spcBef>
+                <a:spcPts val="500"/>
+              </a:spcBef>
+              <a:buFont typeface="Arial" panose="020B0604020202020204" pitchFamily="34" charset="0"/>
+              <a:buChar char="•"/>
+              <a:defRPr sz="1800" kern="1200">
+                <a:solidFill>
+                  <a:schemeClr val="tx1"/>
+                </a:solidFill>
+                <a:latin typeface="+mn-lt"/>
+                <a:ea typeface="+mn-ea"/>
+                <a:cs typeface="+mn-cs"/>
+              </a:defRPr>
+            </a:lvl5pPr>
+            <a:lvl6pPr marL="2514600" indent="-228600" algn="l" defTabSz="914400" rtl="0" eaLnBrk="1" latinLnBrk="0" hangingPunct="1">
+              <a:lnSpc>
+                <a:spcPct val="90000"/>
+              </a:lnSpc>
+              <a:spcBef>
+                <a:spcPts val="500"/>
+              </a:spcBef>
+              <a:buFont typeface="Arial" panose="020B0604020202020204" pitchFamily="34" charset="0"/>
+              <a:buChar char="•"/>
+              <a:defRPr sz="1800" kern="1200">
+                <a:solidFill>
+                  <a:schemeClr val="tx1"/>
+                </a:solidFill>
+                <a:latin typeface="+mn-lt"/>
+                <a:ea typeface="+mn-ea"/>
+                <a:cs typeface="+mn-cs"/>
+              </a:defRPr>
+            </a:lvl6pPr>
+            <a:lvl7pPr marL="2971800" indent="-228600" algn="l" defTabSz="914400" rtl="0" eaLnBrk="1" latinLnBrk="0" hangingPunct="1">
+              <a:lnSpc>
+                <a:spcPct val="90000"/>
+              </a:lnSpc>
+              <a:spcBef>
+                <a:spcPts val="500"/>
+              </a:spcBef>
+              <a:buFont typeface="Arial" panose="020B0604020202020204" pitchFamily="34" charset="0"/>
+              <a:buChar char="•"/>
+              <a:defRPr sz="1800" kern="1200">
+                <a:solidFill>
+                  <a:schemeClr val="tx1"/>
+                </a:solidFill>
+                <a:latin typeface="+mn-lt"/>
+                <a:ea typeface="+mn-ea"/>
+                <a:cs typeface="+mn-cs"/>
+              </a:defRPr>
+            </a:lvl7pPr>
+            <a:lvl8pPr marL="3429000" indent="-228600" algn="l" defTabSz="914400" rtl="0" eaLnBrk="1" latinLnBrk="0" hangingPunct="1">
+              <a:lnSpc>
+                <a:spcPct val="90000"/>
+              </a:lnSpc>
+              <a:spcBef>
+                <a:spcPts val="500"/>
+              </a:spcBef>
+              <a:buFont typeface="Arial" panose="020B0604020202020204" pitchFamily="34" charset="0"/>
+              <a:buChar char="•"/>
+              <a:defRPr sz="1800" kern="1200">
+                <a:solidFill>
+                  <a:schemeClr val="tx1"/>
+                </a:solidFill>
+                <a:latin typeface="+mn-lt"/>
+                <a:ea typeface="+mn-ea"/>
+                <a:cs typeface="+mn-cs"/>
+              </a:defRPr>
+            </a:lvl8pPr>
+            <a:lvl9pPr marL="3886200" indent="-228600" algn="l" defTabSz="914400" rtl="0" eaLnBrk="1" latinLnBrk="0" hangingPunct="1">
+              <a:lnSpc>
+                <a:spcPct val="90000"/>
+              </a:lnSpc>
+              <a:spcBef>
+                <a:spcPts val="500"/>
+              </a:spcBef>
+              <a:buFont typeface="Arial" panose="020B0604020202020204" pitchFamily="34" charset="0"/>
+              <a:buChar char="•"/>
+              <a:defRPr sz="1800" kern="1200">
+                <a:solidFill>
+                  <a:schemeClr val="tx1"/>
+                </a:solidFill>
+                <a:latin typeface="+mn-lt"/>
+                <a:ea typeface="+mn-ea"/>
+                <a:cs typeface="+mn-cs"/>
+              </a:defRPr>
+            </a:lvl9pPr>
+          </a:lstStyle>
           <a:p>
             <a:pPr marL="0" indent="0" algn="ctr">
+              <a:buFont typeface="Arial" panose="020B0604020202020204" pitchFamily="34" charset="0"/>
               <a:buNone/>
             </a:pPr>
-            <a:r>
-              <a:rPr lang="en-PH" sz="1400" dirty="0" smtClean="0"/>
-              <a:t>Co-Founder </a:t>
-            </a:r>
-            <a:r>
-              <a:rPr lang="en-PH" sz="1400" dirty="0"/>
-              <a:t>/ Chief </a:t>
-            </a:r>
-            <a:r>
-              <a:rPr lang="en-PH" sz="1400" dirty="0" smtClean="0"/>
-              <a:t>Operation </a:t>
-            </a:r>
-            <a:r>
-              <a:rPr lang="en-PH" sz="1400" dirty="0"/>
-              <a:t>Officer</a:t>
-            </a:r>
-          </a:p>
-          <a:p>
-            <a:pPr marL="0" indent="0" algn="ctr">
-              <a:buNone/>
+            <a:endParaRPr lang="en-AU" sz="400" b="1" dirty="0"/>
+          </a:p>
+          <a:p>
+            <a:r>
+              <a:rPr lang="en-US" sz="1400" i="1" dirty="0" smtClean="0"/>
+              <a:t>6 </a:t>
+            </a:r>
+            <a:r>
+              <a:rPr lang="en-US" sz="1400" i="1" dirty="0" err="1"/>
+              <a:t>yrs</a:t>
+            </a:r>
+            <a:r>
+              <a:rPr lang="en-US" sz="1400" i="1" dirty="0"/>
+              <a:t> Experience </a:t>
+            </a:r>
+            <a:r>
+              <a:rPr lang="en-US" sz="1400" i="1" dirty="0" smtClean="0"/>
+              <a:t>in</a:t>
+            </a:r>
+            <a:r>
+              <a:rPr lang="en-US" sz="1400" i="1" dirty="0" smtClean="0"/>
+              <a:t> </a:t>
+            </a:r>
+            <a:r>
+              <a:rPr lang="en-US" sz="1400" i="1" dirty="0"/>
+              <a:t>Software </a:t>
+            </a:r>
+            <a:r>
+              <a:rPr lang="en-US" sz="1400" i="1" dirty="0" smtClean="0"/>
+              <a:t>Engineering</a:t>
+            </a:r>
+            <a:endParaRPr lang="en-US" sz="1400" i="1" dirty="0"/>
+          </a:p>
+          <a:p>
+            <a:pPr>
+              <a:lnSpc>
+                <a:spcPct val="120000"/>
+              </a:lnSpc>
             </a:pPr>
-            <a:endParaRPr lang="en-US" sz="1200" i="1" dirty="0" smtClean="0"/>
-          </a:p>
-          <a:p>
-            <a:pPr marL="0" indent="0" algn="ctr">
-              <a:buNone/>
+            <a:r>
+              <a:rPr lang="en-US" sz="1400" i="1" dirty="0"/>
+              <a:t>Published dozens of Company</a:t>
+            </a:r>
+            <a:r>
+              <a:rPr lang="en-PH" sz="1400" i="1" dirty="0"/>
+              <a:t> website </a:t>
+            </a:r>
+            <a:r>
+              <a:rPr lang="en-PH" sz="1400" i="1" dirty="0" smtClean="0"/>
+              <a:t>and applications.</a:t>
+            </a:r>
+            <a:endParaRPr lang="en-PH" sz="1400" i="1" dirty="0"/>
+          </a:p>
+          <a:p>
+            <a:pPr>
+              <a:lnSpc>
+                <a:spcPct val="120000"/>
+              </a:lnSpc>
             </a:pPr>
             <a:r>
-              <a:rPr lang="en-US" sz="2000" i="1" dirty="0"/>
-              <a:t>- </a:t>
-            </a:r>
-            <a:r>
-              <a:rPr lang="en-US" sz="2000" i="1" dirty="0" smtClean="0"/>
-              <a:t>Electronics </a:t>
-            </a:r>
-            <a:r>
-              <a:rPr lang="en-US" sz="2000" i="1" dirty="0"/>
-              <a:t>and Communication </a:t>
-            </a:r>
-            <a:r>
-              <a:rPr lang="en-US" sz="2000" i="1" dirty="0" smtClean="0"/>
-              <a:t>Engineer.</a:t>
-            </a:r>
-          </a:p>
-          <a:p>
-            <a:pPr marL="0" indent="0" algn="ctr">
-              <a:buFont typeface="Arial" panose="020B0604020202020204" pitchFamily="34" charset="0"/>
-              <a:buNone/>
-            </a:pPr>
-            <a:r>
-              <a:rPr lang="en-US" sz="2000" i="1" dirty="0" smtClean="0"/>
-              <a:t>- </a:t>
-            </a:r>
-            <a:r>
-              <a:rPr lang="en-US" sz="2000" i="1" dirty="0" smtClean="0"/>
-              <a:t>14 </a:t>
-            </a:r>
-            <a:r>
-              <a:rPr lang="en-US" sz="2000" i="1" dirty="0" err="1" smtClean="0"/>
-              <a:t>yrs</a:t>
-            </a:r>
-            <a:r>
-              <a:rPr lang="en-US" sz="2000" i="1" dirty="0" smtClean="0"/>
-              <a:t> Experience as</a:t>
-            </a:r>
-          </a:p>
-          <a:p>
-            <a:pPr marL="0" indent="0" algn="ctr">
-              <a:buFont typeface="Arial" panose="020B0604020202020204" pitchFamily="34" charset="0"/>
-              <a:buNone/>
-            </a:pPr>
-            <a:r>
-              <a:rPr lang="en-US" sz="2000" i="1" dirty="0" smtClean="0"/>
-              <a:t>Process Engineer.</a:t>
-            </a:r>
-          </a:p>
-          <a:p>
-            <a:pPr marL="0" indent="0" algn="ctr">
-              <a:buNone/>
-            </a:pPr>
-            <a:r>
-              <a:rPr lang="en-US" sz="2000" i="1" dirty="0" smtClean="0"/>
-              <a:t>-  </a:t>
-            </a:r>
-            <a:r>
-              <a:rPr lang="en-US" sz="2000" i="1" dirty="0"/>
-              <a:t>Project Operation Manager </a:t>
-            </a:r>
-          </a:p>
-          <a:p>
-            <a:pPr marL="0" indent="0" algn="ctr">
-              <a:buNone/>
-            </a:pPr>
-            <a:r>
-              <a:rPr lang="en-US" sz="2000" i="1" dirty="0"/>
-              <a:t>at AMKOR Tech Phil.</a:t>
-            </a:r>
-          </a:p>
-          <a:p>
-            <a:pPr marL="0" indent="0" algn="ctr">
-              <a:buFont typeface="Arial" panose="020B0604020202020204" pitchFamily="34" charset="0"/>
-              <a:buNone/>
-            </a:pPr>
-            <a:endParaRPr lang="en-PH" sz="2000" dirty="0"/>
+              <a:rPr lang="en-US" sz="1400" i="1" dirty="0"/>
+              <a:t>Integrate Network </a:t>
+            </a:r>
+            <a:r>
+              <a:rPr lang="en-US" sz="1400" i="1" dirty="0" smtClean="0"/>
+              <a:t>Security in a Business Process </a:t>
+            </a:r>
+            <a:r>
+              <a:rPr lang="en-US" sz="1400" i="1" dirty="0" smtClean="0"/>
+              <a:t>Outsourcing</a:t>
+            </a:r>
+            <a:r>
+              <a:rPr lang="en-US" sz="1400" i="1" dirty="0" smtClean="0"/>
+              <a:t>.</a:t>
+            </a:r>
+            <a:endParaRPr lang="en-US" sz="1400" i="1" dirty="0"/>
           </a:p>
         </p:txBody>
       </p:sp>
@@ -4359,13 +5343,6 @@
   <p:clrMapOvr>
     <a:masterClrMapping/>
   </p:clrMapOvr>
-  <p:timing>
-    <p:tnLst>
-      <p:par>
-        <p:cTn id="1" dur="indefinite" restart="never" nodeType="tmRoot"/>
-      </p:par>
-    </p:tnLst>
-  </p:timing>
 </p:sld>
 </file>
 
@@ -4417,7 +5394,7 @@
           <a:p>
             <a:pPr algn="ctr"/>
             <a:r>
-              <a:rPr lang="en-AU" b="1" dirty="0" smtClean="0">
+              <a:rPr lang="en-AU" b="1" dirty="0">
                 <a:solidFill>
                   <a:schemeClr val="bg1"/>
                 </a:solidFill>
@@ -4465,105 +5442,93 @@
           <a:p>
             <a:pPr lvl="0"/>
             <a:r>
-              <a:rPr lang="en-AU" dirty="0" err="1" smtClean="0"/>
-              <a:t>PasaBuy.App</a:t>
-            </a:r>
-            <a:r>
-              <a:rPr lang="en-AU" dirty="0" smtClean="0"/>
+              <a:rPr lang="en-AU" dirty="0" err="1"/>
+              <a:t>PasaBuy.app</a:t>
+            </a:r>
+            <a:r>
+              <a:rPr lang="en-AU" dirty="0"/>
+              <a:t> Website Up</a:t>
+            </a:r>
+            <a:endParaRPr lang="en-PH" dirty="0"/>
+          </a:p>
+          <a:p>
+            <a:pPr lvl="0"/>
+            <a:r>
+              <a:rPr lang="en-AU" dirty="0"/>
+              <a:t>Trade License Secured</a:t>
+            </a:r>
+            <a:endParaRPr lang="en-PH" dirty="0"/>
+          </a:p>
+          <a:p>
+            <a:pPr lvl="0"/>
+            <a:r>
+              <a:rPr lang="en-AU" dirty="0"/>
+              <a:t>Office Location Rented</a:t>
+            </a:r>
+            <a:endParaRPr lang="en-PH" dirty="0"/>
+          </a:p>
+          <a:p>
+            <a:pPr lvl="0"/>
+            <a:r>
+              <a:rPr lang="en-AU" dirty="0"/>
+              <a:t>30 Food Shops Signed as Partner </a:t>
+            </a:r>
+          </a:p>
+          <a:p>
+            <a:pPr lvl="0"/>
+            <a:r>
+              <a:rPr lang="en-AU" dirty="0"/>
+              <a:t>82 Interested Food Shops</a:t>
+            </a:r>
+            <a:endParaRPr lang="en-PH" dirty="0"/>
+          </a:p>
+          <a:p>
+            <a:pPr lvl="0"/>
+            <a:r>
+              <a:rPr lang="en-PH" dirty="0"/>
+              <a:t>Established Online Presence</a:t>
+            </a:r>
+          </a:p>
+          <a:p>
+            <a:pPr lvl="0"/>
+            <a:r>
+              <a:rPr lang="en-AU" dirty="0"/>
+              <a:t>Social Media Partnership @ </a:t>
+            </a:r>
+            <a:r>
+              <a:rPr lang="en-AU" dirty="0" err="1"/>
+              <a:t>Tiga</a:t>
+            </a:r>
+            <a:r>
+              <a:rPr lang="en-AU" dirty="0"/>
+              <a:t> South </a:t>
+            </a:r>
+            <a:r>
+              <a:rPr lang="en-AU" dirty="0" err="1"/>
+              <a:t>ka</a:t>
+            </a:r>
+            <a:r>
+              <a:rPr lang="en-AU" dirty="0"/>
               <a:t> </a:t>
             </a:r>
             <a:r>
-              <a:rPr lang="en-AU" dirty="0" smtClean="0"/>
-              <a:t>website up</a:t>
-            </a:r>
-            <a:endParaRPr lang="en-PH" dirty="0" smtClean="0"/>
+              <a:rPr lang="en-AU" dirty="0" err="1"/>
+              <a:t>ba</a:t>
+            </a:r>
+            <a:endParaRPr lang="en-PH" dirty="0"/>
           </a:p>
           <a:p>
             <a:pPr lvl="0"/>
             <a:r>
-              <a:rPr lang="en-AU" dirty="0" smtClean="0"/>
-              <a:t>Trade License secured</a:t>
-            </a:r>
-            <a:endParaRPr lang="en-PH" dirty="0" smtClean="0"/>
+              <a:rPr lang="en-AU" dirty="0"/>
+              <a:t>App Research and Development 40% Completed</a:t>
+            </a:r>
           </a:p>
           <a:p>
             <a:pPr lvl="0"/>
             <a:r>
-              <a:rPr lang="en-AU" dirty="0" smtClean="0"/>
-              <a:t>Office Location Rented</a:t>
-            </a:r>
-            <a:endParaRPr lang="en-PH" dirty="0" smtClean="0"/>
-          </a:p>
-          <a:p>
-            <a:pPr lvl="0"/>
-            <a:r>
-              <a:rPr lang="en-AU" dirty="0" smtClean="0"/>
-              <a:t>30 </a:t>
-            </a:r>
-            <a:r>
-              <a:rPr lang="en-AU" dirty="0" smtClean="0"/>
-              <a:t>Food Shops signed as </a:t>
-            </a:r>
-            <a:r>
-              <a:rPr lang="en-AU" dirty="0" smtClean="0"/>
-              <a:t>Partner </a:t>
-            </a:r>
-          </a:p>
-          <a:p>
-            <a:pPr lvl="0"/>
-            <a:r>
-              <a:rPr lang="en-AU" dirty="0" smtClean="0"/>
-              <a:t>82 Interested Food shops</a:t>
-            </a:r>
-            <a:endParaRPr lang="en-PH" dirty="0" smtClean="0"/>
-          </a:p>
-          <a:p>
-            <a:pPr lvl="0"/>
-            <a:r>
-              <a:rPr lang="en-PH" dirty="0" smtClean="0"/>
-              <a:t>Established Online Presence</a:t>
-            </a:r>
-          </a:p>
-          <a:p>
-            <a:pPr lvl="0"/>
-            <a:r>
-              <a:rPr lang="en-AU" dirty="0" smtClean="0"/>
-              <a:t>Social Media Partnership @ </a:t>
-            </a:r>
-            <a:r>
-              <a:rPr lang="en-AU" dirty="0" err="1" smtClean="0"/>
-              <a:t>Tiga</a:t>
-            </a:r>
-            <a:r>
-              <a:rPr lang="en-AU" dirty="0" smtClean="0"/>
-              <a:t> South </a:t>
-            </a:r>
-            <a:r>
-              <a:rPr lang="en-AU" dirty="0" err="1" smtClean="0"/>
-              <a:t>ka</a:t>
-            </a:r>
-            <a:r>
-              <a:rPr lang="en-AU" dirty="0" smtClean="0"/>
-              <a:t> </a:t>
-            </a:r>
-            <a:r>
-              <a:rPr lang="en-AU" dirty="0" err="1" smtClean="0"/>
-              <a:t>ba</a:t>
-            </a:r>
-            <a:endParaRPr lang="en-PH" dirty="0" smtClean="0"/>
-          </a:p>
-          <a:p>
-            <a:pPr lvl="0"/>
-            <a:r>
-              <a:rPr lang="en-AU" dirty="0" smtClean="0"/>
-              <a:t>App research and development 40% Completed</a:t>
-            </a:r>
-          </a:p>
-          <a:p>
-            <a:pPr lvl="0"/>
-            <a:r>
-              <a:rPr lang="en-AU" dirty="0" smtClean="0"/>
-              <a:t>Marketing assets / tools or Items acquired.</a:t>
+              <a:rPr lang="en-AU" dirty="0"/>
+              <a:t>Marketing Assets / Tools or Items Acquired.</a:t>
             </a:r>
             <a:endParaRPr lang="en-PH" dirty="0"/>
           </a:p>
@@ -4609,13 +5574,6 @@
   <p:clrMapOvr>
     <a:masterClrMapping/>
   </p:clrMapOvr>
-  <p:timing>
-    <p:tnLst>
-      <p:par>
-        <p:cTn id="1" dur="indefinite" restart="never" nodeType="tmRoot"/>
-      </p:par>
-    </p:tnLst>
-  </p:timing>
 </p:sld>
 </file>
 
@@ -4718,15 +5676,15 @@
               <a:t>Raising </a:t>
             </a:r>
             <a:r>
-              <a:rPr lang="en-AU" sz="2400" b="1" dirty="0" err="1"/>
+              <a:rPr lang="en-AU" sz="3200" b="1" dirty="0" err="1"/>
               <a:t>Php</a:t>
             </a:r>
             <a:r>
-              <a:rPr lang="en-AU" sz="2400" b="1" dirty="0"/>
+              <a:rPr lang="en-AU" sz="3200" b="1" dirty="0"/>
               <a:t> 6,000,000.00</a:t>
             </a:r>
             <a:r>
-              <a:rPr lang="en-AU" sz="2400" dirty="0"/>
+              <a:rPr lang="en-AU" sz="3200" dirty="0"/>
               <a:t> </a:t>
             </a:r>
             <a:r>
@@ -4753,7 +5711,7 @@
         </p:blipFill>
         <p:spPr>
           <a:xfrm>
-            <a:off x="5573901" y="2524226"/>
+            <a:off x="5506995" y="2524226"/>
             <a:ext cx="6114271" cy="3718990"/>
           </a:xfrm>
           <a:prstGeom prst="rect">
@@ -4783,7 +5741,7 @@
         </p:blipFill>
         <p:spPr>
           <a:xfrm>
-            <a:off x="632181" y="2536926"/>
+            <a:off x="565275" y="2536926"/>
             <a:ext cx="4941720" cy="3706290"/>
           </a:xfrm>
           <a:prstGeom prst="rect">
@@ -4806,13 +5764,6 @@
   <p:clrMapOvr>
     <a:masterClrMapping/>
   </p:clrMapOvr>
-  <p:timing>
-    <p:tnLst>
-      <p:par>
-        <p:cTn id="1" dur="indefinite" restart="never" nodeType="tmRoot"/>
-      </p:par>
-    </p:tnLst>
-  </p:timing>
 </p:sld>
 </file>
 
@@ -4917,13 +5868,6 @@
   <p:clrMapOvr>
     <a:masterClrMapping/>
   </p:clrMapOvr>
-  <p:timing>
-    <p:tnLst>
-      <p:par>
-        <p:cTn id="1" dur="indefinite" restart="never" nodeType="tmRoot"/>
-      </p:par>
-    </p:tnLst>
-  </p:timing>
 </p:sld>
 </file>
 
@@ -4933,7 +5877,7 @@
     <p:bg>
       <p:bgPr>
         <a:blipFill dpi="0" rotWithShape="1">
-          <a:blip r:embed="rId2">
+          <a:blip r:embed="rId3">
             <a:lum/>
           </a:blip>
           <a:srcRect/>
@@ -4977,7 +5921,7 @@
           <a:p>
             <a:pPr algn="ctr"/>
             <a:r>
-              <a:rPr lang="en-AU" sz="4000" b="1" dirty="0" smtClean="0">
+              <a:rPr lang="en-AU" sz="4000" b="1" dirty="0">
                 <a:solidFill>
                   <a:schemeClr val="bg1"/>
                 </a:solidFill>
@@ -5031,7 +5975,7 @@
             <a:pPr marL="0" indent="0" algn="ctr">
               <a:buNone/>
             </a:pPr>
-            <a:endParaRPr lang="en-AU" sz="2000" b="1" dirty="0" smtClean="0"/>
+            <a:endParaRPr lang="en-AU" sz="2000" b="1" dirty="0"/>
           </a:p>
           <a:p>
             <a:pPr marL="0" indent="0" algn="ctr">
@@ -5043,7 +5987,7 @@
             <a:pPr marL="0" indent="0" algn="ctr">
               <a:buNone/>
             </a:pPr>
-            <a:endParaRPr lang="en-AU" sz="2000" b="1" dirty="0" smtClean="0"/>
+            <a:endParaRPr lang="en-AU" sz="2000" b="1" dirty="0"/>
           </a:p>
           <a:p>
             <a:pPr marL="0" indent="0" algn="ctr">
@@ -5056,28 +6000,24 @@
               <a:buNone/>
             </a:pPr>
             <a:r>
-              <a:rPr lang="en-AU" sz="3600" b="1" dirty="0" smtClean="0"/>
+              <a:rPr lang="en-AU" sz="3600" b="1" dirty="0"/>
               <a:t>PRICE</a:t>
             </a:r>
-            <a:endParaRPr lang="en-AU" sz="3600" dirty="0" smtClean="0"/>
+            <a:endParaRPr lang="en-AU" sz="3600" dirty="0"/>
           </a:p>
           <a:p>
             <a:pPr marL="0" indent="0" algn="ctr">
               <a:buNone/>
             </a:pPr>
-            <a:endParaRPr lang="en-AU" sz="4000" i="1" dirty="0" smtClean="0"/>
+            <a:endParaRPr lang="en-AU" sz="4000" i="1" dirty="0"/>
           </a:p>
           <a:p>
             <a:pPr marL="0" indent="0" algn="ctr">
               <a:buNone/>
             </a:pPr>
             <a:r>
-              <a:rPr lang="en-AU" sz="2400" i="1" dirty="0" smtClean="0"/>
-              <a:t>an </a:t>
-            </a:r>
-            <a:r>
               <a:rPr lang="en-AU" sz="2400" i="1" dirty="0"/>
-              <a:t>important concern for customers ordering online.</a:t>
+              <a:t>an important concern for customers ordering online.</a:t>
             </a:r>
             <a:endParaRPr lang="en-PH" sz="2400" i="1" dirty="0"/>
           </a:p>
@@ -5276,57 +6216,48 @@
             <a:pPr marL="0" indent="0" algn="ctr">
               <a:buNone/>
             </a:pPr>
-            <a:endParaRPr lang="en-AU" sz="2000" b="1" dirty="0" smtClean="0"/>
+            <a:endParaRPr lang="en-AU" sz="2000" b="1" dirty="0"/>
           </a:p>
           <a:p>
             <a:pPr marL="0" indent="0" algn="ctr">
               <a:buNone/>
             </a:pPr>
-            <a:endParaRPr lang="en-AU" sz="2000" b="1" dirty="0" smtClean="0"/>
+            <a:endParaRPr lang="en-AU" sz="2000" b="1" dirty="0"/>
           </a:p>
           <a:p>
             <a:pPr marL="0" indent="0" algn="ctr">
               <a:buNone/>
             </a:pPr>
-            <a:endParaRPr lang="en-AU" sz="2000" b="1" dirty="0" smtClean="0"/>
+            <a:endParaRPr lang="en-AU" sz="2000" b="1" dirty="0"/>
           </a:p>
           <a:p>
             <a:pPr marL="0" indent="0" algn="ctr">
               <a:buNone/>
             </a:pPr>
-            <a:endParaRPr lang="en-AU" b="1" dirty="0" smtClean="0"/>
+            <a:endParaRPr lang="en-AU" b="1" dirty="0"/>
           </a:p>
           <a:p>
             <a:pPr marL="0" indent="0" algn="ctr">
               <a:buNone/>
             </a:pPr>
             <a:r>
-              <a:rPr lang="en-AU" sz="3600" b="1" dirty="0" smtClean="0"/>
+              <a:rPr lang="en-AU" sz="3600" b="1" dirty="0"/>
               <a:t>HIGH COMMISSION</a:t>
             </a:r>
-            <a:endParaRPr lang="en-AU" sz="3600" b="1" dirty="0" smtClean="0"/>
           </a:p>
           <a:p>
             <a:pPr marL="0" indent="0" algn="ctr">
               <a:buNone/>
             </a:pPr>
-            <a:endParaRPr lang="en-AU" sz="100" dirty="0" smtClean="0"/>
+            <a:endParaRPr lang="en-AU" sz="100" dirty="0"/>
           </a:p>
           <a:p>
             <a:pPr marL="0" indent="0" algn="ctr">
               <a:buNone/>
             </a:pPr>
             <a:r>
-              <a:rPr lang="en-AU" sz="2600" i="1" dirty="0" smtClean="0"/>
-              <a:t>gives </a:t>
-            </a:r>
-            <a:r>
               <a:rPr lang="en-AU" sz="2600" i="1" dirty="0"/>
-              <a:t>restaurant owners a hard time to earn profits</a:t>
-            </a:r>
-            <a:r>
-              <a:rPr lang="en-AU" sz="2600" i="1" dirty="0" smtClean="0"/>
-              <a:t>.</a:t>
+              <a:t>gives restaurant owners a hard time to earn profits.</a:t>
             </a:r>
             <a:endParaRPr lang="en-PH" sz="2600" i="1" dirty="0"/>
           </a:p>
@@ -5521,7 +6452,7 @@
             <a:pPr marL="0" indent="0" algn="ctr">
               <a:buNone/>
             </a:pPr>
-            <a:endParaRPr lang="en-AU" sz="2000" b="1" dirty="0" smtClean="0"/>
+            <a:endParaRPr lang="en-AU" sz="2000" b="1" dirty="0"/>
           </a:p>
           <a:p>
             <a:pPr marL="0" indent="0" algn="ctr">
@@ -5533,7 +6464,7 @@
             <a:pPr marL="0" indent="0" algn="ctr">
               <a:buNone/>
             </a:pPr>
-            <a:endParaRPr lang="en-AU" sz="2000" b="1" dirty="0" smtClean="0"/>
+            <a:endParaRPr lang="en-AU" sz="2000" b="1" dirty="0"/>
           </a:p>
           <a:p>
             <a:pPr marL="0" indent="0" algn="ctr">
@@ -5546,32 +6477,23 @@
               <a:buNone/>
             </a:pPr>
             <a:r>
-              <a:rPr lang="en-AU" sz="3600" b="1" dirty="0" smtClean="0"/>
+              <a:rPr lang="en-AU" sz="3600" b="1" dirty="0"/>
               <a:t>BOGUS BUYER</a:t>
             </a:r>
-            <a:endParaRPr lang="en-AU" sz="3600" b="1" dirty="0" smtClean="0"/>
           </a:p>
           <a:p>
             <a:pPr marL="0" indent="0" algn="ctr">
               <a:buNone/>
             </a:pPr>
-            <a:endParaRPr lang="en-AU" sz="3600" i="1" dirty="0" smtClean="0"/>
+            <a:endParaRPr lang="en-AU" sz="3600" i="1" dirty="0"/>
           </a:p>
           <a:p>
             <a:pPr marL="0" indent="0" algn="ctr">
               <a:buNone/>
             </a:pPr>
             <a:r>
-              <a:rPr lang="en-AU" sz="2400" i="1" dirty="0" smtClean="0"/>
-              <a:t>now </a:t>
-            </a:r>
-            <a:r>
               <a:rPr lang="en-AU" sz="2400" i="1" dirty="0"/>
-              <a:t>a major concern in the Philippines delivery </a:t>
-            </a:r>
-            <a:r>
-              <a:rPr lang="en-AU" sz="2400" i="1" dirty="0" smtClean="0"/>
-              <a:t>companies.</a:t>
+              <a:t>now a major concern in Philippine delivery companies.</a:t>
             </a:r>
             <a:endParaRPr lang="en-PH" sz="2400" i="1" dirty="0"/>
           </a:p>
@@ -5586,7 +6508,7 @@
           <p:nvPr/>
         </p:nvPicPr>
         <p:blipFill>
-          <a:blip r:embed="rId3" cstate="print">
+          <a:blip r:embed="rId4" cstate="print">
             <a:extLst>
               <a:ext uri="{28A0092B-C50C-407E-A947-70E740481C1C}">
                 <a14:useLocalDpi xmlns:a14="http://schemas.microsoft.com/office/drawing/2010/main" val="0"/>
@@ -5616,7 +6538,7 @@
           <p:nvPr/>
         </p:nvPicPr>
         <p:blipFill>
-          <a:blip r:embed="rId4" cstate="print">
+          <a:blip r:embed="rId5" cstate="print">
             <a:extLst>
               <a:ext uri="{28A0092B-C50C-407E-A947-70E740481C1C}">
                 <a14:useLocalDpi xmlns:a14="http://schemas.microsoft.com/office/drawing/2010/main" val="0"/>
@@ -5646,7 +6568,7 @@
           <p:nvPr/>
         </p:nvPicPr>
         <p:blipFill>
-          <a:blip r:embed="rId5" cstate="print">
+          <a:blip r:embed="rId6" cstate="print">
             <a:extLst>
               <a:ext uri="{28A0092B-C50C-407E-A947-70E740481C1C}">
                 <a14:useLocalDpi xmlns:a14="http://schemas.microsoft.com/office/drawing/2010/main" val="0"/>
@@ -5677,13 +6599,6 @@
   <p:clrMapOvr>
     <a:masterClrMapping/>
   </p:clrMapOvr>
-  <p:timing>
-    <p:tnLst>
-      <p:par>
-        <p:cTn id="1" dur="indefinite" restart="never" nodeType="tmRoot"/>
-      </p:par>
-    </p:tnLst>
-  </p:timing>
 </p:sld>
 </file>
 
@@ -5735,7 +6650,7 @@
           <a:p>
             <a:pPr algn="ctr"/>
             <a:r>
-              <a:rPr lang="en-US" b="1" dirty="0" smtClean="0">
+              <a:rPr lang="en-US" b="1" dirty="0">
                 <a:solidFill>
                   <a:schemeClr val="bg1"/>
                 </a:solidFill>
@@ -5790,16 +6705,8 @@
               <a:buNone/>
             </a:pPr>
             <a:r>
-              <a:rPr lang="en-AU" sz="3000" dirty="0" smtClean="0"/>
-              <a:t>	</a:t>
-            </a:r>
-            <a:r>
               <a:rPr lang="en-AU" sz="3000" dirty="0"/>
-              <a:t>	</a:t>
-            </a:r>
-            <a:r>
-              <a:rPr lang="en-AU" sz="3000" dirty="0" smtClean="0"/>
-              <a:t>  </a:t>
+              <a:t>		  </a:t>
             </a:r>
           </a:p>
           <a:p>
@@ -5808,40 +6715,24 @@
             </a:pPr>
             <a:r>
               <a:rPr lang="en-AU" sz="3600" dirty="0"/>
-              <a:t>	</a:t>
-            </a:r>
-            <a:r>
-              <a:rPr lang="en-AU" sz="3600" dirty="0" smtClean="0"/>
-              <a:t>	  Save </a:t>
+              <a:t>		  Save money on </a:t>
+            </a:r>
+            <a:r>
+              <a:rPr lang="en-AU" sz="3600" b="1" dirty="0"/>
+              <a:t>low delivery </a:t>
+            </a:r>
+          </a:p>
+          <a:p>
+            <a:pPr marL="0" lvl="0" indent="0">
+              <a:buNone/>
+            </a:pPr>
+            <a:r>
+              <a:rPr lang="en-AU" sz="3600" b="1" dirty="0"/>
+              <a:t>		  fee</a:t>
             </a:r>
             <a:r>
               <a:rPr lang="en-AU" sz="3600" dirty="0"/>
-              <a:t>money on </a:t>
-            </a:r>
-            <a:r>
-              <a:rPr lang="en-AU" sz="3600" b="1" dirty="0"/>
-              <a:t>low </a:t>
-            </a:r>
-            <a:r>
-              <a:rPr lang="en-AU" sz="3600" b="1" dirty="0" smtClean="0"/>
-              <a:t>delivery </a:t>
-            </a:r>
-          </a:p>
-          <a:p>
-            <a:pPr marL="0" lvl="0" indent="0">
-              <a:buNone/>
-            </a:pPr>
-            <a:r>
-              <a:rPr lang="en-AU" sz="3600" b="1" dirty="0" smtClean="0"/>
-              <a:t>		  fee</a:t>
-            </a:r>
-            <a:r>
-              <a:rPr lang="en-AU" sz="3600" dirty="0" smtClean="0"/>
-              <a:t> </a:t>
-            </a:r>
-            <a:r>
-              <a:rPr lang="en-AU" sz="3600" dirty="0"/>
-              <a:t>and </a:t>
+              <a:t> and </a:t>
             </a:r>
             <a:r>
               <a:rPr lang="en-AU" sz="3600" b="1" dirty="0"/>
@@ -5852,8 +6743,12 @@
               <a:t> </a:t>
             </a:r>
             <a:r>
-              <a:rPr lang="en-AU" sz="3600" dirty="0" smtClean="0"/>
-              <a:t>Vouchers</a:t>
+              <a:rPr lang="en-AU" sz="3600" b="1" dirty="0"/>
+              <a:t>vouchers</a:t>
+            </a:r>
+            <a:r>
+              <a:rPr lang="en-AU" sz="3600" dirty="0"/>
+              <a:t>.</a:t>
             </a:r>
           </a:p>
           <a:p>
@@ -5868,19 +6763,20 @@
             </a:pPr>
             <a:r>
               <a:rPr lang="en-AU" sz="3600" dirty="0"/>
-              <a:t>Make sure </a:t>
-            </a:r>
-            <a:r>
-              <a:rPr lang="en-AU" sz="3600" dirty="0" smtClean="0"/>
-              <a:t>your </a:t>
+              <a:t>Make sure your dealing with			 </a:t>
+            </a:r>
+          </a:p>
+          <a:p>
+            <a:pPr marL="0" lvl="0" indent="0" algn="r">
+              <a:buNone/>
+            </a:pPr>
+            <a:r>
+              <a:rPr lang="en-AU" sz="3600" b="1" dirty="0"/>
+              <a:t>Validated Customers</a:t>
             </a:r>
             <a:r>
               <a:rPr lang="en-AU" sz="3600" dirty="0"/>
-              <a:t>dealing </a:t>
-            </a:r>
-            <a:r>
-              <a:rPr lang="en-AU" sz="3600" dirty="0" smtClean="0"/>
-              <a:t>with			 </a:t>
+              <a:t> by checking			 </a:t>
             </a:r>
           </a:p>
           <a:p>
@@ -5888,28 +6784,7 @@
               <a:buNone/>
             </a:pPr>
             <a:r>
-              <a:rPr lang="en-AU" sz="3600" b="1" dirty="0" smtClean="0"/>
-              <a:t>Validated Customers</a:t>
-            </a:r>
-            <a:r>
-              <a:rPr lang="en-AU" sz="3600" dirty="0" smtClean="0"/>
-              <a:t> </a:t>
-            </a:r>
-            <a:r>
               <a:rPr lang="en-AU" sz="3600" dirty="0"/>
-              <a:t>by </a:t>
-            </a:r>
-            <a:r>
-              <a:rPr lang="en-AU" sz="3600" dirty="0" smtClean="0"/>
-              <a:t>checking			 </a:t>
-            </a:r>
-          </a:p>
-          <a:p>
-            <a:pPr marL="0" lvl="0" indent="0" algn="r">
-              <a:buNone/>
-            </a:pPr>
-            <a:r>
-              <a:rPr lang="en-AU" sz="3600" dirty="0" smtClean="0"/>
               <a:t>their </a:t>
             </a:r>
             <a:r>
@@ -5925,7 +6800,7 @@
               <a:t>badges</a:t>
             </a:r>
             <a:r>
-              <a:rPr lang="en-AU" sz="3600" dirty="0" smtClean="0"/>
+              <a:rPr lang="en-AU" sz="3600" dirty="0"/>
               <a:t>.			</a:t>
             </a:r>
             <a:endParaRPr lang="en-PH" sz="3600" dirty="0"/>
@@ -5934,37 +6809,28 @@
             <a:pPr marL="0" lvl="0" indent="0">
               <a:buNone/>
             </a:pPr>
-            <a:endParaRPr lang="en-AU" sz="1800" dirty="0" smtClean="0"/>
+            <a:endParaRPr lang="en-AU" sz="1800" dirty="0"/>
           </a:p>
           <a:p>
             <a:pPr marL="0" lvl="0" indent="0">
               <a:buNone/>
             </a:pPr>
             <a:r>
-              <a:rPr lang="en-AU" sz="3600" b="1" dirty="0" smtClean="0"/>
-              <a:t>		  Lowest </a:t>
-            </a:r>
-            <a:r>
               <a:rPr lang="en-AU" sz="3600" b="1" dirty="0"/>
-              <a:t>commission </a:t>
+              <a:t>		  Lowest commission </a:t>
             </a:r>
             <a:r>
               <a:rPr lang="en-AU" sz="3600" dirty="0"/>
               <a:t>rate </a:t>
             </a:r>
-            <a:endParaRPr lang="en-AU" sz="3600" dirty="0" smtClean="0"/>
           </a:p>
           <a:p>
             <a:pPr marL="0" lvl="0" indent="0">
               <a:buNone/>
             </a:pPr>
             <a:r>
-              <a:rPr lang="en-AU" sz="3600" dirty="0" smtClean="0"/>
-              <a:t>		  in </a:t>
-            </a:r>
-            <a:r>
               <a:rPr lang="en-AU" sz="3600" dirty="0"/>
-              <a:t>the market.</a:t>
+              <a:t>		  in the market.</a:t>
             </a:r>
             <a:endParaRPr lang="en-PH" sz="3600" dirty="0"/>
           </a:p>
@@ -6070,13 +6936,6 @@
   <p:clrMapOvr>
     <a:masterClrMapping/>
   </p:clrMapOvr>
-  <p:timing>
-    <p:tnLst>
-      <p:par>
-        <p:cTn id="1" dur="indefinite" restart="never" nodeType="tmRoot"/>
-      </p:par>
-    </p:tnLst>
-  </p:timing>
 </p:sld>
 </file>
 
@@ -6128,7 +6987,7 @@
           <a:p>
             <a:pPr algn="ctr"/>
             <a:r>
-              <a:rPr lang="en-US" b="1" dirty="0" smtClean="0">
+              <a:rPr lang="en-US" b="1" dirty="0">
                 <a:solidFill>
                   <a:schemeClr val="bg1"/>
                 </a:solidFill>
@@ -6383,7 +7242,7 @@
           <a:p>
             <a:pPr algn="ctr"/>
             <a:r>
-              <a:rPr lang="en-US" b="1" dirty="0" smtClean="0">
+              <a:rPr lang="en-US" b="1" dirty="0">
                 <a:solidFill>
                   <a:schemeClr val="bg1"/>
                 </a:solidFill>
@@ -6438,21 +7297,20 @@
               <a:buNone/>
             </a:pPr>
             <a:r>
-              <a:rPr lang="en-AU" sz="5400" b="1" dirty="0"/>
+              <a:rPr lang="en-AU" sz="6000" b="1" dirty="0"/>
               <a:t>3,756,007</a:t>
             </a:r>
             <a:r>
-              <a:rPr lang="en-AU" sz="5400" dirty="0"/>
+              <a:rPr lang="en-AU" sz="6000" dirty="0"/>
               <a:t> </a:t>
             </a:r>
-            <a:endParaRPr lang="en-AU" sz="5400" dirty="0" smtClean="0"/>
           </a:p>
           <a:p>
             <a:pPr marL="0" indent="0" algn="ctr">
               <a:buNone/>
             </a:pPr>
             <a:r>
-              <a:rPr lang="en-AU" sz="1800" dirty="0" smtClean="0"/>
+              <a:rPr lang="en-AU" dirty="0"/>
               <a:t>Total population</a:t>
             </a:r>
           </a:p>
@@ -6648,11 +7506,11 @@
               <a:buNone/>
             </a:pPr>
             <a:r>
-              <a:rPr lang="en-AU" sz="5400" b="1" dirty="0" smtClean="0"/>
+              <a:rPr lang="en-AU" sz="6000" b="1" dirty="0"/>
               <a:t>301,629</a:t>
             </a:r>
             <a:r>
-              <a:rPr lang="en-AU" sz="5400" dirty="0" smtClean="0"/>
+              <a:rPr lang="en-AU" sz="5400" dirty="0"/>
               <a:t> </a:t>
             </a:r>
           </a:p>
@@ -6661,10 +7519,10 @@
               <a:buNone/>
             </a:pPr>
             <a:r>
-              <a:rPr lang="en-AU" sz="1800" dirty="0" smtClean="0"/>
+              <a:rPr lang="en-AU" dirty="0"/>
               <a:t>Food Delivery App User</a:t>
             </a:r>
-            <a:endParaRPr lang="en-PH" sz="1800" dirty="0"/>
+            <a:endParaRPr lang="en-PH" dirty="0"/>
           </a:p>
         </p:txBody>
       </p:sp>
@@ -6728,6 +7586,45 @@
           </a:prstGeom>
         </p:spPr>
       </p:pic>
+      <p:sp>
+        <p:nvSpPr>
+          <p:cNvPr id="7" name="TextBox 6">
+            <a:extLst>
+              <a:ext uri="{FF2B5EF4-FFF2-40B4-BE49-F238E27FC236}">
+                <a16:creationId xmlns:a16="http://schemas.microsoft.com/office/drawing/2014/main" id="{50515BD3-A8B2-1448-AEE4-823DC64152E1}"/>
+              </a:ext>
+            </a:extLst>
+          </p:cNvPr>
+          <p:cNvSpPr txBox="1"/>
+          <p:nvPr/>
+        </p:nvSpPr>
+        <p:spPr>
+          <a:xfrm>
+            <a:off x="8915400" y="6386513"/>
+            <a:ext cx="2871788" cy="461665"/>
+          </a:xfrm>
+          <a:prstGeom prst="rect">
+            <a:avLst/>
+          </a:prstGeom>
+          <a:noFill/>
+        </p:spPr>
+        <p:txBody>
+          <a:bodyPr wrap="square" rtlCol="0">
+            <a:spAutoFit/>
+          </a:bodyPr>
+          <a:lstStyle/>
+          <a:p>
+            <a:r>
+              <a:rPr lang="en-US" sz="2400" dirty="0">
+                <a:solidFill>
+                  <a:srgbClr val="FF0000"/>
+                </a:solidFill>
+              </a:rPr>
+              <a:t>Put source</a:t>
+            </a:r>
+          </a:p>
+        </p:txBody>
+      </p:sp>
     </p:spTree>
     <p:extLst>
       <p:ext uri="{BB962C8B-B14F-4D97-AF65-F5344CB8AC3E}">
@@ -6738,13 +7635,6 @@
   <p:clrMapOvr>
     <a:masterClrMapping/>
   </p:clrMapOvr>
-  <p:timing>
-    <p:tnLst>
-      <p:par>
-        <p:cTn id="1" dur="indefinite" restart="never" nodeType="tmRoot"/>
-      </p:par>
-    </p:tnLst>
-  </p:timing>
 </p:sld>
 </file>
 
@@ -6927,7 +7817,7 @@
               <a:buNone/>
             </a:pPr>
             <a:r>
-              <a:rPr lang="en-AU" sz="5400" dirty="0" smtClean="0"/>
+              <a:rPr lang="en-AU" sz="5400" dirty="0"/>
               <a:t>PHP 12.35B</a:t>
             </a:r>
           </a:p>
@@ -6936,10 +7826,9 @@
               <a:buNone/>
             </a:pPr>
             <a:r>
-              <a:rPr lang="en-AU" sz="2000" dirty="0"/>
+              <a:rPr lang="en-AU" sz="2400" dirty="0"/>
               <a:t>Total Available Market Revenue in 2020</a:t>
             </a:r>
-            <a:endParaRPr lang="en-AU" sz="1400" dirty="0" smtClean="0"/>
           </a:p>
         </p:txBody>
       </p:sp>
@@ -6953,8 +7842,8 @@
         </p:nvSpPr>
         <p:spPr>
           <a:xfrm>
-            <a:off x="6257731" y="1825625"/>
-            <a:ext cx="5096069" cy="4351338"/>
+            <a:off x="6041036" y="1825625"/>
+            <a:ext cx="5529457" cy="4351338"/>
           </a:xfrm>
           <a:prstGeom prst="rect">
             <a:avLst/>
@@ -7133,7 +8022,7 @@
               <a:buNone/>
             </a:pPr>
             <a:r>
-              <a:rPr lang="en-AU" sz="5400" dirty="0" smtClean="0"/>
+              <a:rPr lang="en-AU" sz="5400" dirty="0"/>
               <a:t>PHP 423.6M</a:t>
             </a:r>
           </a:p>
@@ -7142,10 +8031,10 @@
               <a:buNone/>
             </a:pPr>
             <a:r>
-              <a:rPr lang="en-AU" sz="2000" dirty="0"/>
+              <a:rPr lang="en-AU" sz="2400" dirty="0"/>
               <a:t>Serviceable Available Market Revenue</a:t>
             </a:r>
-            <a:endParaRPr lang="en-PH" sz="1400" dirty="0"/>
+            <a:endParaRPr lang="en-PH" sz="2400" dirty="0"/>
           </a:p>
         </p:txBody>
       </p:sp>
@@ -7179,28 +8068,12 @@
               </a:spcAft>
             </a:pPr>
             <a:r>
-              <a:rPr lang="en-AU" sz="2400" i="1" dirty="0" smtClean="0">
-                <a:latin typeface="Calibri" panose="020F0502020204030204" pitchFamily="34" charset="0"/>
-                <a:ea typeface="Calibri" panose="020F0502020204030204" pitchFamily="34" charset="0"/>
-                <a:cs typeface="Times New Roman" panose="02020603050405020304" pitchFamily="18" charset="0"/>
-              </a:rPr>
-              <a:t>* Top </a:t>
-            </a:r>
-            <a:r>
               <a:rPr lang="en-AU" sz="2400" i="1" dirty="0">
                 <a:latin typeface="Calibri" panose="020F0502020204030204" pitchFamily="34" charset="0"/>
                 <a:ea typeface="Calibri" panose="020F0502020204030204" pitchFamily="34" charset="0"/>
                 <a:cs typeface="Times New Roman" panose="02020603050405020304" pitchFamily="18" charset="0"/>
               </a:rPr>
-              <a:t>2 Players combine 70% </a:t>
-            </a:r>
-            <a:r>
-              <a:rPr lang="en-AU" sz="2400" i="1" dirty="0" smtClean="0">
-                <a:latin typeface="Calibri" panose="020F0502020204030204" pitchFamily="34" charset="0"/>
-                <a:ea typeface="Calibri" panose="020F0502020204030204" pitchFamily="34" charset="0"/>
-                <a:cs typeface="Times New Roman" panose="02020603050405020304" pitchFamily="18" charset="0"/>
-              </a:rPr>
-              <a:t>Revenue *</a:t>
+              <a:t>* Top 2 Players combine 70% Revenue *</a:t>
             </a:r>
             <a:endParaRPr lang="en-PH" sz="2400" i="1" dirty="0">
               <a:latin typeface="Calibri" panose="020F0502020204030204" pitchFamily="34" charset="0"/>
@@ -7294,6 +8167,45 @@
           </a:p>
         </p:txBody>
       </p:sp>
+      <p:sp>
+        <p:nvSpPr>
+          <p:cNvPr id="10" name="TextBox 9">
+            <a:extLst>
+              <a:ext uri="{FF2B5EF4-FFF2-40B4-BE49-F238E27FC236}">
+                <a16:creationId xmlns:a16="http://schemas.microsoft.com/office/drawing/2014/main" id="{745DFDF4-EDE2-E44E-B229-B851F78FE917}"/>
+              </a:ext>
+            </a:extLst>
+          </p:cNvPr>
+          <p:cNvSpPr txBox="1"/>
+          <p:nvPr/>
+        </p:nvSpPr>
+        <p:spPr>
+          <a:xfrm>
+            <a:off x="8915400" y="6386513"/>
+            <a:ext cx="2871788" cy="461665"/>
+          </a:xfrm>
+          <a:prstGeom prst="rect">
+            <a:avLst/>
+          </a:prstGeom>
+          <a:noFill/>
+        </p:spPr>
+        <p:txBody>
+          <a:bodyPr wrap="square" rtlCol="0">
+            <a:spAutoFit/>
+          </a:bodyPr>
+          <a:lstStyle/>
+          <a:p>
+            <a:r>
+              <a:rPr lang="en-US" sz="2400" dirty="0">
+                <a:solidFill>
+                  <a:srgbClr val="FF0000"/>
+                </a:solidFill>
+              </a:rPr>
+              <a:t>Put source</a:t>
+            </a:r>
+          </a:p>
+        </p:txBody>
+      </p:sp>
     </p:spTree>
     <p:extLst>
       <p:ext uri="{BB962C8B-B14F-4D97-AF65-F5344CB8AC3E}">
@@ -7304,13 +8216,6 @@
   <p:clrMapOvr>
     <a:masterClrMapping/>
   </p:clrMapOvr>
-  <p:timing>
-    <p:tnLst>
-      <p:par>
-        <p:cTn id="1" dur="indefinite" restart="never" nodeType="tmRoot"/>
-      </p:par>
-    </p:tnLst>
-  </p:timing>
 </p:sld>
 </file>
 
@@ -7405,8 +8310,8 @@
         </p:nvSpPr>
         <p:spPr>
           <a:xfrm>
-            <a:off x="838200" y="1825625"/>
-            <a:ext cx="3451860" cy="4351338"/>
+            <a:off x="369875" y="1825625"/>
+            <a:ext cx="3992136" cy="4351338"/>
           </a:xfrm>
         </p:spPr>
         <p:txBody>
@@ -7418,7 +8323,7 @@
             <a:pPr marL="0" indent="0" algn="ctr">
               <a:buNone/>
             </a:pPr>
-            <a:endParaRPr lang="en-AU" sz="2000" b="1" dirty="0" smtClean="0"/>
+            <a:endParaRPr lang="en-AU" sz="2000" b="1" dirty="0"/>
           </a:p>
           <a:p>
             <a:pPr marL="0" indent="0" algn="ctr">
@@ -7430,7 +8335,7 @@
             <a:pPr marL="0" indent="0" algn="ctr">
               <a:buNone/>
             </a:pPr>
-            <a:endParaRPr lang="en-AU" sz="2000" b="1" dirty="0" smtClean="0"/>
+            <a:endParaRPr lang="en-AU" sz="2000" b="1" dirty="0"/>
           </a:p>
           <a:p>
             <a:pPr marL="0" indent="0" algn="ctr">
@@ -7442,74 +8347,62 @@
             <a:pPr marL="0" indent="0" algn="ctr">
               <a:buNone/>
             </a:pPr>
-            <a:endParaRPr lang="en-AU" sz="2000" b="1" dirty="0" smtClean="0"/>
+            <a:endParaRPr lang="en-AU" sz="2000" b="1" dirty="0"/>
           </a:p>
           <a:p>
             <a:pPr marL="0" indent="0" algn="ctr">
               <a:buNone/>
             </a:pPr>
             <a:r>
-              <a:rPr lang="en-AU" sz="2000" b="1" dirty="0" smtClean="0"/>
-              <a:t>Worst </a:t>
+              <a:rPr lang="en-AU" b="1" dirty="0"/>
+              <a:t>Worst case Scenario</a:t>
+            </a:r>
+          </a:p>
+          <a:p>
+            <a:pPr marL="0" indent="0" algn="ctr">
+              <a:buNone/>
+            </a:pPr>
+            <a:endParaRPr lang="en-AU" sz="1000" dirty="0"/>
+          </a:p>
+          <a:p>
+            <a:pPr marL="0" indent="0" algn="ctr">
+              <a:buNone/>
+            </a:pPr>
+            <a:r>
+              <a:rPr lang="en-AU" sz="2000" dirty="0"/>
+              <a:t>PHP</a:t>
+            </a:r>
+            <a:r>
+              <a:rPr lang="en-AU" sz="3200" b="1" dirty="0"/>
+              <a:t> 2,118,000</a:t>
+            </a:r>
+            <a:r>
+              <a:rPr lang="en-AU" sz="3200" dirty="0"/>
+              <a:t> </a:t>
+            </a:r>
+          </a:p>
+          <a:p>
+            <a:pPr marL="0" indent="0" algn="ctr">
+              <a:buNone/>
+            </a:pPr>
+            <a:r>
+              <a:rPr lang="en-AU" sz="2000" dirty="0"/>
+              <a:t>Gets </a:t>
             </a:r>
             <a:r>
               <a:rPr lang="en-AU" sz="2000" b="1" dirty="0"/>
-              <a:t>case </a:t>
-            </a:r>
-            <a:r>
-              <a:rPr lang="en-AU" sz="2000" b="1" dirty="0" smtClean="0"/>
-              <a:t>Scenario</a:t>
+              <a:t>0.5% </a:t>
+            </a:r>
+            <a:r>
+              <a:rPr lang="en-AU" sz="2000" dirty="0"/>
+              <a:t>of Serviceable Market</a:t>
             </a:r>
           </a:p>
           <a:p>
             <a:pPr marL="0" indent="0" algn="ctr">
               <a:buNone/>
             </a:pPr>
-            <a:endParaRPr lang="en-AU" sz="1000" dirty="0" smtClean="0"/>
-          </a:p>
-          <a:p>
-            <a:pPr marL="0" indent="0" algn="ctr">
-              <a:buNone/>
-            </a:pPr>
-            <a:r>
-              <a:rPr lang="en-AU" sz="2000" dirty="0" smtClean="0"/>
-              <a:t>PHP</a:t>
-            </a:r>
-            <a:r>
-              <a:rPr lang="en-AU" sz="3200" b="1" dirty="0" smtClean="0"/>
-              <a:t> 2,118,000</a:t>
-            </a:r>
-            <a:r>
-              <a:rPr lang="en-AU" sz="3200" dirty="0" smtClean="0"/>
-              <a:t> </a:t>
-            </a:r>
-          </a:p>
-          <a:p>
-            <a:pPr marL="0" indent="0" algn="ctr">
-              <a:buNone/>
-            </a:pPr>
-            <a:r>
-              <a:rPr lang="en-AU" sz="1600" dirty="0" smtClean="0"/>
-              <a:t>Gets </a:t>
-            </a:r>
-            <a:r>
-              <a:rPr lang="en-AU" sz="1600" b="1" dirty="0"/>
-              <a:t>0.5% </a:t>
-            </a:r>
-            <a:r>
-              <a:rPr lang="en-AU" sz="1600" dirty="0"/>
-              <a:t>of Serviceable </a:t>
-            </a:r>
-            <a:r>
-              <a:rPr lang="en-AU" sz="1600" dirty="0" smtClean="0"/>
-              <a:t>Market</a:t>
-            </a:r>
-          </a:p>
-          <a:p>
-            <a:pPr marL="0" indent="0" algn="ctr">
-              <a:buNone/>
-            </a:pPr>
-            <a:endParaRPr lang="en-AU" sz="1200" dirty="0" smtClean="0"/>
+            <a:endParaRPr lang="en-AU" sz="1200" dirty="0"/>
           </a:p>
         </p:txBody>
       </p:sp>
@@ -7523,7 +8416,7 @@
         </p:nvSpPr>
         <p:spPr>
           <a:xfrm>
-            <a:off x="7901940" y="1690688"/>
+            <a:off x="8242246" y="1710779"/>
             <a:ext cx="3451860" cy="4351338"/>
           </a:xfrm>
           <a:prstGeom prst="rect">
@@ -7702,50 +8595,46 @@
             <a:pPr marL="0" indent="0" algn="ctr">
               <a:buNone/>
             </a:pPr>
-            <a:endParaRPr lang="en-AU" sz="2000" b="1" dirty="0" smtClean="0"/>
+            <a:endParaRPr lang="en-AU" sz="2000" b="1" dirty="0"/>
           </a:p>
           <a:p>
             <a:pPr marL="0" indent="0" algn="ctr">
               <a:buNone/>
             </a:pPr>
-            <a:endParaRPr lang="en-AU" sz="2000" b="1" dirty="0" smtClean="0"/>
+            <a:endParaRPr lang="en-AU" sz="2000" b="1" dirty="0"/>
           </a:p>
           <a:p>
             <a:pPr marL="0" indent="0" algn="ctr">
               <a:buNone/>
             </a:pPr>
-            <a:endParaRPr lang="en-AU" sz="2000" b="1" dirty="0" smtClean="0"/>
+            <a:endParaRPr lang="en-AU" sz="2000" b="1" dirty="0"/>
           </a:p>
           <a:p>
             <a:pPr marL="0" indent="0" algn="ctr">
               <a:buNone/>
             </a:pPr>
-            <a:endParaRPr lang="en-AU" b="1" dirty="0" smtClean="0"/>
+            <a:endParaRPr lang="en-AU" b="1" dirty="0"/>
           </a:p>
           <a:p>
             <a:pPr marL="0" indent="0" algn="ctr">
               <a:buNone/>
             </a:pPr>
-            <a:endParaRPr lang="en-AU" sz="2000" b="1" dirty="0" smtClean="0"/>
+            <a:endParaRPr lang="en-AU" sz="2000" b="1" dirty="0"/>
           </a:p>
           <a:p>
             <a:pPr marL="0" indent="0" algn="ctr">
               <a:buNone/>
             </a:pPr>
             <a:r>
-              <a:rPr lang="en-AU" sz="2000" b="1" dirty="0" smtClean="0"/>
-              <a:t>Best </a:t>
-            </a:r>
-            <a:r>
-              <a:rPr lang="en-AU" sz="2000" b="1" dirty="0" smtClean="0"/>
-              <a:t>Case Scenario</a:t>
+              <a:rPr lang="en-AU" b="1" dirty="0"/>
+              <a:t>Best Case Scenario</a:t>
             </a:r>
           </a:p>
           <a:p>
             <a:pPr marL="0" indent="0" algn="ctr">
               <a:buNone/>
             </a:pPr>
-            <a:endParaRPr lang="en-AU" sz="1100" dirty="0" smtClean="0"/>
+            <a:endParaRPr lang="en-AU" sz="1100" dirty="0"/>
           </a:p>
           <a:p>
             <a:pPr marL="0" indent="0" algn="ctr">
@@ -7756,11 +8645,11 @@
               <a:t>PHP </a:t>
             </a:r>
             <a:r>
-              <a:rPr lang="en-AU" sz="3200" b="1" dirty="0" smtClean="0"/>
+              <a:rPr lang="en-AU" sz="3200" b="1" dirty="0"/>
               <a:t>216,036,000</a:t>
             </a:r>
             <a:r>
-              <a:rPr lang="en-AU" sz="3200" dirty="0" smtClean="0"/>
+              <a:rPr lang="en-AU" sz="3200" dirty="0"/>
               <a:t> </a:t>
             </a:r>
           </a:p>
@@ -7769,11 +8658,11 @@
               <a:buNone/>
             </a:pPr>
             <a:r>
-              <a:rPr lang="en-AU" sz="1600" b="1" dirty="0"/>
+              <a:rPr lang="en-AU" sz="2000" b="1" dirty="0"/>
               <a:t>51% </a:t>
             </a:r>
             <a:r>
-              <a:rPr lang="en-AU" sz="1600" dirty="0"/>
+              <a:rPr lang="en-AU" sz="2000" dirty="0"/>
               <a:t>of Serviceable Market</a:t>
             </a:r>
           </a:p>
@@ -7782,7 +8671,7 @@
               <a:buNone/>
             </a:pPr>
             <a:r>
-              <a:rPr lang="en-AU" sz="1200" dirty="0" smtClean="0"/>
+              <a:rPr lang="en-AU" sz="1200" dirty="0"/>
               <a:t> </a:t>
             </a:r>
           </a:p>
@@ -7977,7 +8866,7 @@
             <a:pPr marL="0" indent="0" algn="ctr">
               <a:buNone/>
             </a:pPr>
-            <a:endParaRPr lang="en-AU" sz="2000" b="1" dirty="0" smtClean="0"/>
+            <a:endParaRPr lang="en-AU" sz="2000" b="1" dirty="0"/>
           </a:p>
           <a:p>
             <a:pPr marL="0" indent="0" algn="ctr">
@@ -7989,7 +8878,7 @@
             <a:pPr marL="0" indent="0" algn="ctr">
               <a:buNone/>
             </a:pPr>
-            <a:endParaRPr lang="en-AU" sz="2000" b="1" dirty="0" smtClean="0"/>
+            <a:endParaRPr lang="en-AU" sz="2000" b="1" dirty="0"/>
           </a:p>
           <a:p>
             <a:pPr marL="0" indent="0" algn="ctr">
@@ -8001,26 +8890,22 @@
             <a:pPr marL="0" indent="0" algn="ctr">
               <a:buNone/>
             </a:pPr>
-            <a:endParaRPr lang="en-AU" sz="2000" b="1" dirty="0" smtClean="0"/>
+            <a:endParaRPr lang="en-AU" sz="2000" b="1" dirty="0"/>
           </a:p>
           <a:p>
             <a:pPr marL="0" indent="0" algn="ctr">
               <a:buNone/>
             </a:pPr>
             <a:r>
-              <a:rPr lang="en-AU" sz="2000" b="1" dirty="0" smtClean="0"/>
-              <a:t>Realistic </a:t>
-            </a:r>
-            <a:r>
-              <a:rPr lang="en-AU" sz="2000" b="1" dirty="0" smtClean="0"/>
-              <a:t>Scenario</a:t>
+              <a:rPr lang="en-AU" b="1" dirty="0"/>
+              <a:t>Realistic Scenario</a:t>
             </a:r>
           </a:p>
           <a:p>
             <a:pPr marL="0" indent="0" algn="ctr">
               <a:buNone/>
             </a:pPr>
-            <a:endParaRPr lang="en-AU" sz="1050" b="1" dirty="0" smtClean="0"/>
+            <a:endParaRPr lang="en-AU" sz="1050" b="1" dirty="0"/>
           </a:p>
           <a:p>
             <a:pPr marL="0" indent="0" algn="ctr">
@@ -8031,7 +8916,7 @@
               <a:t>PHP </a:t>
             </a:r>
             <a:r>
-              <a:rPr lang="en-AU" sz="3200" b="1" dirty="0" smtClean="0"/>
+              <a:rPr lang="en-AU" sz="3200" b="1" dirty="0"/>
               <a:t>21,180,000</a:t>
             </a:r>
           </a:p>
@@ -8040,15 +8925,15 @@
               <a:buNone/>
             </a:pPr>
             <a:r>
-              <a:rPr lang="en-AU" sz="1600" dirty="0"/>
+              <a:rPr lang="en-AU" sz="2000" dirty="0"/>
               <a:t>Gets </a:t>
             </a:r>
             <a:r>
-              <a:rPr lang="en-AU" sz="1600" b="1" dirty="0"/>
+              <a:rPr lang="en-AU" sz="2000" b="1" dirty="0"/>
               <a:t>5% </a:t>
             </a:r>
             <a:r>
-              <a:rPr lang="en-AU" sz="1600" dirty="0"/>
+              <a:rPr lang="en-AU" sz="2000" dirty="0"/>
               <a:t>of Serviceable Market</a:t>
             </a:r>
           </a:p>
@@ -8083,7 +8968,7 @@
         </p:blipFill>
         <p:spPr bwMode="auto">
           <a:xfrm>
-            <a:off x="5207330" y="1988576"/>
+            <a:off x="5141645" y="1974312"/>
             <a:ext cx="1908710" cy="1603018"/>
           </a:xfrm>
           <a:prstGeom prst="rect">
@@ -8123,7 +9008,7 @@
         </p:blipFill>
         <p:spPr>
           <a:xfrm>
-            <a:off x="1755470" y="1825625"/>
+            <a:off x="1415747" y="1825625"/>
             <a:ext cx="1900393" cy="1900393"/>
           </a:xfrm>
           <a:prstGeom prst="rect">
@@ -8153,7 +9038,7 @@
         </p:blipFill>
         <p:spPr>
           <a:xfrm>
-            <a:off x="8739200" y="1825625"/>
+            <a:off x="9017980" y="1825625"/>
             <a:ext cx="1900393" cy="1900393"/>
           </a:xfrm>
           <a:prstGeom prst="rect">
@@ -8171,13 +9056,6 @@
   <p:clrMapOvr>
     <a:masterClrMapping/>
   </p:clrMapOvr>
-  <p:timing>
-    <p:tnLst>
-      <p:par>
-        <p:cTn id="1" dur="indefinite" restart="never" nodeType="tmRoot"/>
-      </p:par>
-    </p:tnLst>
-  </p:timing>
 </p:sld>
 </file>
 
@@ -8276,12 +9154,8 @@
           <a:lstStyle/>
           <a:p>
             <a:r>
-              <a:rPr lang="en-AU" sz="3200" dirty="0" smtClean="0"/>
-              <a:t>We </a:t>
-            </a:r>
-            <a:r>
               <a:rPr lang="en-AU" sz="3200" dirty="0"/>
-              <a:t>take </a:t>
+              <a:t>We take </a:t>
             </a:r>
             <a:r>
               <a:rPr lang="en-AU" sz="3200" b="1" dirty="0"/>
@@ -8289,15 +9163,7 @@
             </a:r>
             <a:r>
               <a:rPr lang="en-AU" sz="3200" dirty="0"/>
-              <a:t>on each </a:t>
-            </a:r>
-            <a:r>
-              <a:rPr lang="en-AU" sz="3200" dirty="0" smtClean="0"/>
-              <a:t>Partner’s </a:t>
-            </a:r>
-            <a:r>
-              <a:rPr lang="en-AU" sz="3200" dirty="0"/>
-              <a:t>food delivery transaction and </a:t>
+              <a:t>on each Partner’s food delivery transaction and </a:t>
             </a:r>
             <a:r>
               <a:rPr lang="en-AU" sz="3200" b="1" dirty="0"/>
@@ -8305,19 +9171,16 @@
             </a:r>
             <a:r>
               <a:rPr lang="en-AU" sz="3200" dirty="0"/>
-              <a:t>on </a:t>
-            </a:r>
-            <a:r>
-              <a:rPr lang="en-AU" sz="3200" dirty="0" smtClean="0"/>
-              <a:t>all </a:t>
-            </a:r>
+              <a:t>on all normal delivery transaction.</a:t>
+            </a:r>
+          </a:p>
+          <a:p>
+            <a:endParaRPr lang="en-PH" sz="1800" dirty="0"/>
+          </a:p>
+          <a:p>
             <a:r>
               <a:rPr lang="en-AU" sz="3200" dirty="0"/>
-              <a:t>normal delivery transaction</a:t>
-            </a:r>
-            <a:r>
-              <a:rPr lang="en-AU" sz="3200" dirty="0" smtClean="0"/>
-              <a:t>.</a:t>
+              <a:t>Featured ads of our partners.</a:t>
             </a:r>
           </a:p>
           <a:p>
@@ -8325,29 +9188,8 @@
           </a:p>
           <a:p>
             <a:r>
-              <a:rPr lang="en-AU" sz="3200" dirty="0" smtClean="0"/>
-              <a:t>Featured </a:t>
-            </a:r>
-            <a:r>
               <a:rPr lang="en-AU" sz="3200" dirty="0"/>
-              <a:t>ads of our partners</a:t>
-            </a:r>
-            <a:r>
-              <a:rPr lang="en-AU" sz="3200" dirty="0" smtClean="0"/>
-              <a:t>.</a:t>
-            </a:r>
-          </a:p>
-          <a:p>
-            <a:endParaRPr lang="en-PH" sz="1800" dirty="0"/>
-          </a:p>
-          <a:p>
-            <a:r>
-              <a:rPr lang="en-AU" sz="3200" dirty="0" smtClean="0"/>
-              <a:t>paid </a:t>
-            </a:r>
-            <a:r>
-              <a:rPr lang="en-AU" sz="3200" dirty="0"/>
-              <a:t>ads for those who wants promote their products.</a:t>
+              <a:t>Paid ads for those who want to promote their products.</a:t>
             </a:r>
             <a:endParaRPr lang="en-PH" sz="3200" dirty="0"/>
           </a:p>
@@ -8393,13 +9235,6 @@
   <p:clrMapOvr>
     <a:masterClrMapping/>
   </p:clrMapOvr>
-  <p:timing>
-    <p:tnLst>
-      <p:par>
-        <p:cTn id="1" dur="indefinite" restart="never" nodeType="tmRoot"/>
-      </p:par>
-    </p:tnLst>
-  </p:timing>
 </p:sld>
 </file>
 
@@ -8451,7 +9286,7 @@
           <a:p>
             <a:pPr algn="ctr"/>
             <a:r>
-              <a:rPr lang="en-AU" b="1" dirty="0" smtClean="0">
+              <a:rPr lang="en-AU" b="1" dirty="0">
                 <a:solidFill>
                   <a:schemeClr val="bg1"/>
                 </a:solidFill>
@@ -8502,8 +9337,8 @@
         </p:blipFill>
         <p:spPr>
           <a:xfrm>
-            <a:off x="1556109" y="1549400"/>
-            <a:ext cx="9079781" cy="5107377"/>
+            <a:off x="1419250" y="1462342"/>
+            <a:ext cx="9353500" cy="5261344"/>
           </a:xfrm>
           <a:prstGeom prst="rect">
             <a:avLst/>
@@ -8520,13 +9355,6 @@
   <p:clrMapOvr>
     <a:masterClrMapping/>
   </p:clrMapOvr>
-  <p:timing>
-    <p:tnLst>
-      <p:par>
-        <p:cTn id="1" dur="indefinite" restart="never" nodeType="tmRoot"/>
-      </p:par>
-    </p:tnLst>
-  </p:timing>
 </p:sld>
 </file>
 
@@ -8789,4 +9617,299 @@
     </a:ext>
   </a:extLst>
 </a:theme>
+</file>
+
+<file path=ppt/theme/theme2.xml><?xml version="1.0" encoding="utf-8"?>
+<a:theme xmlns:a="http://schemas.openxmlformats.org/drawingml/2006/main" name="Office Theme">
+  <a:themeElements>
+    <a:clrScheme name="Office">
+      <a:dk1>
+        <a:sysClr val="windowText" lastClr="000000"/>
+      </a:dk1>
+      <a:lt1>
+        <a:sysClr val="window" lastClr="FFFFFF"/>
+      </a:lt1>
+      <a:dk2>
+        <a:srgbClr val="44546A"/>
+      </a:dk2>
+      <a:lt2>
+        <a:srgbClr val="E7E6E6"/>
+      </a:lt2>
+      <a:accent1>
+        <a:srgbClr val="4472C4"/>
+      </a:accent1>
+      <a:accent2>
+        <a:srgbClr val="ED7D31"/>
+      </a:accent2>
+      <a:accent3>
+        <a:srgbClr val="A5A5A5"/>
+      </a:accent3>
+      <a:accent4>
+        <a:srgbClr val="FFC000"/>
+      </a:accent4>
+      <a:accent5>
+        <a:srgbClr val="5B9BD5"/>
+      </a:accent5>
+      <a:accent6>
+        <a:srgbClr val="70AD47"/>
+      </a:accent6>
+      <a:hlink>
+        <a:srgbClr val="0563C1"/>
+      </a:hlink>
+      <a:folHlink>
+        <a:srgbClr val="954F72"/>
+      </a:folHlink>
+    </a:clrScheme>
+    <a:fontScheme name="Office">
+      <a:majorFont>
+        <a:latin typeface="Calibri Light" panose="020F0302020204030204"/>
+        <a:ea typeface=""/>
+        <a:cs typeface=""/>
+        <a:font script="Jpan" typeface="游ゴシック Light"/>
+        <a:font script="Hang" typeface="맑은 고딕"/>
+        <a:font script="Hans" typeface="等线 Light"/>
+        <a:font script="Hant" typeface="新細明體"/>
+        <a:font script="Arab" typeface="Times New Roman"/>
+        <a:font script="Hebr" typeface="Times New Roman"/>
+        <a:font script="Thai" typeface="Angsana New"/>
+        <a:font script="Ethi" typeface="Nyala"/>
+        <a:font script="Beng" typeface="Vrinda"/>
+        <a:font script="Gujr" typeface="Shruti"/>
+        <a:font script="Khmr" typeface="MoolBoran"/>
+        <a:font script="Knda" typeface="Tunga"/>
+        <a:font script="Guru" typeface="Raavi"/>
+        <a:font script="Cans" typeface="Euphemia"/>
+        <a:font script="Cher" typeface="Plantagenet Cherokee"/>
+        <a:font script="Yiii" typeface="Microsoft Yi Baiti"/>
+        <a:font script="Tibt" typeface="Microsoft Himalaya"/>
+        <a:font script="Thaa" typeface="MV Boli"/>
+        <a:font script="Deva" typeface="Mangal"/>
+        <a:font script="Telu" typeface="Gautami"/>
+        <a:font script="Taml" typeface="Latha"/>
+        <a:font script="Syrc" typeface="Estrangelo Edessa"/>
+        <a:font script="Orya" typeface="Kalinga"/>
+        <a:font script="Mlym" typeface="Kartika"/>
+        <a:font script="Laoo" typeface="DokChampa"/>
+        <a:font script="Sinh" typeface="Iskoola Pota"/>
+        <a:font script="Mong" typeface="Mongolian Baiti"/>
+        <a:font script="Viet" typeface="Times New Roman"/>
+        <a:font script="Uigh" typeface="Microsoft Uighur"/>
+        <a:font script="Geor" typeface="Sylfaen"/>
+        <a:font script="Armn" typeface="Arial"/>
+        <a:font script="Bugi" typeface="Leelawadee UI"/>
+        <a:font script="Bopo" typeface="Microsoft JhengHei"/>
+        <a:font script="Java" typeface="Javanese Text"/>
+        <a:font script="Lisu" typeface="Segoe UI"/>
+        <a:font script="Mymr" typeface="Myanmar Text"/>
+        <a:font script="Nkoo" typeface="Ebrima"/>
+        <a:font script="Olck" typeface="Nirmala UI"/>
+        <a:font script="Osma" typeface="Ebrima"/>
+        <a:font script="Phag" typeface="Phagspa"/>
+        <a:font script="Syrn" typeface="Estrangelo Edessa"/>
+        <a:font script="Syrj" typeface="Estrangelo Edessa"/>
+        <a:font script="Syre" typeface="Estrangelo Edessa"/>
+        <a:font script="Sora" typeface="Nirmala UI"/>
+        <a:font script="Tale" typeface="Microsoft Tai Le"/>
+        <a:font script="Talu" typeface="Microsoft New Tai Lue"/>
+        <a:font script="Tfng" typeface="Ebrima"/>
+      </a:majorFont>
+      <a:minorFont>
+        <a:latin typeface="Calibri" panose="020F0502020204030204"/>
+        <a:ea typeface=""/>
+        <a:cs typeface=""/>
+        <a:font script="Jpan" typeface="游ゴシック"/>
+        <a:font script="Hang" typeface="맑은 고딕"/>
+        <a:font script="Hans" typeface="等线"/>
+        <a:font script="Hant" typeface="新細明體"/>
+        <a:font script="Arab" typeface="Arial"/>
+        <a:font script="Hebr" typeface="Arial"/>
+        <a:font script="Thai" typeface="Cordia New"/>
+        <a:font script="Ethi" typeface="Nyala"/>
+        <a:font script="Beng" typeface="Vrinda"/>
+        <a:font script="Gujr" typeface="Shruti"/>
+        <a:font script="Khmr" typeface="DaunPenh"/>
+        <a:font script="Knda" typeface="Tunga"/>
+        <a:font script="Guru" typeface="Raavi"/>
+        <a:font script="Cans" typeface="Euphemia"/>
+        <a:font script="Cher" typeface="Plantagenet Cherokee"/>
+        <a:font script="Yiii" typeface="Microsoft Yi Baiti"/>
+        <a:font script="Tibt" typeface="Microsoft Himalaya"/>
+        <a:font script="Thaa" typeface="MV Boli"/>
+        <a:font script="Deva" typeface="Mangal"/>
+        <a:font script="Telu" typeface="Gautami"/>
+        <a:font script="Taml" typeface="Latha"/>
+        <a:font script="Syrc" typeface="Estrangelo Edessa"/>
+        <a:font script="Orya" typeface="Kalinga"/>
+        <a:font script="Mlym" typeface="Kartika"/>
+        <a:font script="Laoo" typeface="DokChampa"/>
+        <a:font script="Sinh" typeface="Iskoola Pota"/>
+        <a:font script="Mong" typeface="Mongolian Baiti"/>
+        <a:font script="Viet" typeface="Arial"/>
+        <a:font script="Uigh" typeface="Microsoft Uighur"/>
+        <a:font script="Geor" typeface="Sylfaen"/>
+        <a:font script="Armn" typeface="Arial"/>
+        <a:font script="Bugi" typeface="Leelawadee UI"/>
+        <a:font script="Bopo" typeface="Microsoft JhengHei"/>
+        <a:font script="Java" typeface="Javanese Text"/>
+        <a:font script="Lisu" typeface="Segoe UI"/>
+        <a:font script="Mymr" typeface="Myanmar Text"/>
+        <a:font script="Nkoo" typeface="Ebrima"/>
+        <a:font script="Olck" typeface="Nirmala UI"/>
+        <a:font script="Osma" typeface="Ebrima"/>
+        <a:font script="Phag" typeface="Phagspa"/>
+        <a:font script="Syrn" typeface="Estrangelo Edessa"/>
+        <a:font script="Syrj" typeface="Estrangelo Edessa"/>
+        <a:font script="Syre" typeface="Estrangelo Edessa"/>
+        <a:font script="Sora" typeface="Nirmala UI"/>
+        <a:font script="Tale" typeface="Microsoft Tai Le"/>
+        <a:font script="Talu" typeface="Microsoft New Tai Lue"/>
+        <a:font script="Tfng" typeface="Ebrima"/>
+      </a:minorFont>
+    </a:fontScheme>
+    <a:fmtScheme name="Office">
+      <a:fillStyleLst>
+        <a:solidFill>
+          <a:schemeClr val="phClr"/>
+        </a:solidFill>
+        <a:gradFill rotWithShape="1">
+          <a:gsLst>
+            <a:gs pos="0">
+              <a:schemeClr val="phClr">
+                <a:lumMod val="110000"/>
+                <a:satMod val="105000"/>
+                <a:tint val="67000"/>
+              </a:schemeClr>
+            </a:gs>
+            <a:gs pos="50000">
+              <a:schemeClr val="phClr">
+                <a:lumMod val="105000"/>
+                <a:satMod val="103000"/>
+                <a:tint val="73000"/>
+              </a:schemeClr>
+            </a:gs>
+            <a:gs pos="100000">
+              <a:schemeClr val="phClr">
+                <a:lumMod val="105000"/>
+                <a:satMod val="109000"/>
+                <a:tint val="81000"/>
+              </a:schemeClr>
+            </a:gs>
+          </a:gsLst>
+          <a:lin ang="5400000" scaled="0"/>
+        </a:gradFill>
+        <a:gradFill rotWithShape="1">
+          <a:gsLst>
+            <a:gs pos="0">
+              <a:schemeClr val="phClr">
+                <a:satMod val="103000"/>
+                <a:lumMod val="102000"/>
+                <a:tint val="94000"/>
+              </a:schemeClr>
+            </a:gs>
+            <a:gs pos="50000">
+              <a:schemeClr val="phClr">
+                <a:satMod val="110000"/>
+                <a:lumMod val="100000"/>
+                <a:shade val="100000"/>
+              </a:schemeClr>
+            </a:gs>
+            <a:gs pos="100000">
+              <a:schemeClr val="phClr">
+                <a:lumMod val="99000"/>
+                <a:satMod val="120000"/>
+                <a:shade val="78000"/>
+              </a:schemeClr>
+            </a:gs>
+          </a:gsLst>
+          <a:lin ang="5400000" scaled="0"/>
+        </a:gradFill>
+      </a:fillStyleLst>
+      <a:lnStyleLst>
+        <a:ln w="6350" cap="flat" cmpd="sng" algn="ctr">
+          <a:solidFill>
+            <a:schemeClr val="phClr"/>
+          </a:solidFill>
+          <a:prstDash val="solid"/>
+          <a:miter lim="800000"/>
+        </a:ln>
+        <a:ln w="12700" cap="flat" cmpd="sng" algn="ctr">
+          <a:solidFill>
+            <a:schemeClr val="phClr"/>
+          </a:solidFill>
+          <a:prstDash val="solid"/>
+          <a:miter lim="800000"/>
+        </a:ln>
+        <a:ln w="19050" cap="flat" cmpd="sng" algn="ctr">
+          <a:solidFill>
+            <a:schemeClr val="phClr"/>
+          </a:solidFill>
+          <a:prstDash val="solid"/>
+          <a:miter lim="800000"/>
+        </a:ln>
+      </a:lnStyleLst>
+      <a:effectStyleLst>
+        <a:effectStyle>
+          <a:effectLst/>
+        </a:effectStyle>
+        <a:effectStyle>
+          <a:effectLst/>
+        </a:effectStyle>
+        <a:effectStyle>
+          <a:effectLst>
+            <a:outerShdw blurRad="57150" dist="19050" dir="5400000" algn="ctr" rotWithShape="0">
+              <a:srgbClr val="000000">
+                <a:alpha val="63000"/>
+              </a:srgbClr>
+            </a:outerShdw>
+          </a:effectLst>
+        </a:effectStyle>
+      </a:effectStyleLst>
+      <a:bgFillStyleLst>
+        <a:solidFill>
+          <a:schemeClr val="phClr"/>
+        </a:solidFill>
+        <a:solidFill>
+          <a:schemeClr val="phClr">
+            <a:tint val="95000"/>
+            <a:satMod val="170000"/>
+          </a:schemeClr>
+        </a:solidFill>
+        <a:gradFill rotWithShape="1">
+          <a:gsLst>
+            <a:gs pos="0">
+              <a:schemeClr val="phClr">
+                <a:tint val="93000"/>
+                <a:satMod val="150000"/>
+                <a:shade val="98000"/>
+                <a:lumMod val="102000"/>
+              </a:schemeClr>
+            </a:gs>
+            <a:gs pos="50000">
+              <a:schemeClr val="phClr">
+                <a:tint val="98000"/>
+                <a:satMod val="130000"/>
+                <a:shade val="90000"/>
+                <a:lumMod val="103000"/>
+              </a:schemeClr>
+            </a:gs>
+            <a:gs pos="100000">
+              <a:schemeClr val="phClr">
+                <a:shade val="63000"/>
+                <a:satMod val="120000"/>
+              </a:schemeClr>
+            </a:gs>
+          </a:gsLst>
+          <a:lin ang="5400000" scaled="0"/>
+        </a:gradFill>
+      </a:bgFillStyleLst>
+    </a:fmtScheme>
+  </a:themeElements>
+  <a:objectDefaults/>
+  <a:extraClrSchemeLst/>
+  <a:extLst>
+    <a:ext uri="{05A4C25C-085E-4340-85A3-A5531E510DB2}">
+      <thm15:themeFamily xmlns:thm15="http://schemas.microsoft.com/office/thememl/2012/main" name="Office Theme" id="{62F939B6-93AF-4DB8-9C6B-D6C7DFDC589F}" vid="{4A3C46E8-61CC-4603-A589-7422A47A8E4A}"/>
+    </a:ext>
+  </a:extLst>
+</a:theme>
 </file>
</xml_diff>

<commit_message>
Finalized project investor pitch video.
</commit_message>
<xml_diff>
--- a/docs/Project-Investor-Pitch.pptx
+++ b/docs/Project-Investor-Pitch.pptx
@@ -3523,6 +3523,13 @@
   <p:clrMapOvr>
     <a:masterClrMapping/>
   </p:clrMapOvr>
+  <p:timing>
+    <p:tnLst>
+      <p:par>
+        <p:cTn id="1" dur="indefinite" restart="never" nodeType="tmRoot"/>
+      </p:par>
+    </p:tnLst>
+  </p:timing>
 </p:sld>
 </file>
 
@@ -3689,6 +3696,13 @@
   <p:clrMapOvr>
     <a:masterClrMapping/>
   </p:clrMapOvr>
+  <p:timing>
+    <p:tnLst>
+      <p:par>
+        <p:cTn id="1" dur="indefinite" restart="never" nodeType="tmRoot"/>
+      </p:par>
+    </p:tnLst>
+  </p:timing>
 </p:sld>
 </file>
 
@@ -3855,6 +3869,13 @@
   <p:clrMapOvr>
     <a:masterClrMapping/>
   </p:clrMapOvr>
+  <p:timing>
+    <p:tnLst>
+      <p:par>
+        <p:cTn id="1" dur="indefinite" restart="never" nodeType="tmRoot"/>
+      </p:par>
+    </p:tnLst>
+  </p:timing>
 </p:sld>
 </file>
 
@@ -5271,11 +5292,7 @@
             </a:r>
             <a:r>
               <a:rPr lang="en-US" sz="1400" i="1" dirty="0" smtClean="0"/>
-              <a:t>in</a:t>
-            </a:r>
-            <a:r>
-              <a:rPr lang="en-US" sz="1400" i="1" dirty="0" smtClean="0"/>
-              <a:t> </a:t>
+              <a:t>in </a:t>
             </a:r>
             <a:r>
               <a:rPr lang="en-US" sz="1400" i="1" dirty="0"/>
@@ -5319,15 +5336,7 @@
             </a:r>
             <a:r>
               <a:rPr lang="en-US" sz="1400" i="1" dirty="0" smtClean="0"/>
-              <a:t>Security in a Business Process </a:t>
-            </a:r>
-            <a:r>
-              <a:rPr lang="en-US" sz="1400" i="1" dirty="0" smtClean="0"/>
-              <a:t>Outsourcing</a:t>
-            </a:r>
-            <a:r>
-              <a:rPr lang="en-US" sz="1400" i="1" dirty="0" smtClean="0"/>
-              <a:t>.</a:t>
+              <a:t>Security in a Business Process Outsourcing.</a:t>
             </a:r>
             <a:endParaRPr lang="en-US" sz="1400" i="1" dirty="0"/>
           </a:p>
@@ -5343,6 +5352,13 @@
   <p:clrMapOvr>
     <a:masterClrMapping/>
   </p:clrMapOvr>
+  <p:timing>
+    <p:tnLst>
+      <p:par>
+        <p:cTn id="1" dur="indefinite" restart="never" nodeType="tmRoot"/>
+      </p:par>
+    </p:tnLst>
+  </p:timing>
 </p:sld>
 </file>
 
@@ -5574,6 +5590,13 @@
   <p:clrMapOvr>
     <a:masterClrMapping/>
   </p:clrMapOvr>
+  <p:timing>
+    <p:tnLst>
+      <p:par>
+        <p:cTn id="1" dur="indefinite" restart="never" nodeType="tmRoot"/>
+      </p:par>
+    </p:tnLst>
+  </p:timing>
 </p:sld>
 </file>
 
@@ -5764,6 +5787,13 @@
   <p:clrMapOvr>
     <a:masterClrMapping/>
   </p:clrMapOvr>
+  <p:timing>
+    <p:tnLst>
+      <p:par>
+        <p:cTn id="1" dur="indefinite" restart="never" nodeType="tmRoot"/>
+      </p:par>
+    </p:tnLst>
+  </p:timing>
 </p:sld>
 </file>
 
@@ -5868,6 +5898,13 @@
   <p:clrMapOvr>
     <a:masterClrMapping/>
   </p:clrMapOvr>
+  <p:timing>
+    <p:tnLst>
+      <p:par>
+        <p:cTn id="1" dur="indefinite" restart="never" nodeType="tmRoot"/>
+      </p:par>
+    </p:tnLst>
+  </p:timing>
 </p:sld>
 </file>
 
@@ -6599,6 +6636,13 @@
   <p:clrMapOvr>
     <a:masterClrMapping/>
   </p:clrMapOvr>
+  <p:timing>
+    <p:tnLst>
+      <p:par>
+        <p:cTn id="1" dur="indefinite" restart="never" nodeType="tmRoot"/>
+      </p:par>
+    </p:tnLst>
+  </p:timing>
 </p:sld>
 </file>
 
@@ -6936,6 +6980,13 @@
   <p:clrMapOvr>
     <a:masterClrMapping/>
   </p:clrMapOvr>
+  <p:timing>
+    <p:tnLst>
+      <p:par>
+        <p:cTn id="1" dur="indefinite" restart="never" nodeType="tmRoot"/>
+      </p:par>
+    </p:tnLst>
+  </p:timing>
 </p:sld>
 </file>
 
@@ -7018,7 +7069,7 @@
       </p:sp>
       <p:pic>
         <p:nvPicPr>
-          <p:cNvPr id="5" name="s4LQTCrSZyU"/>
+          <p:cNvPr id="8" name="FdF1IVPjG_Y"/>
           <p:cNvPicPr>
             <a:picLocks noGrp="1" noRot="1" noChangeAspect="1"/>
           </p:cNvPicPr>
@@ -7036,7 +7087,7 @@
         <p:spPr>
           <a:xfrm>
             <a:off x="0" y="0"/>
-            <a:ext cx="12191998" cy="6858000"/>
+            <a:ext cx="12192000" cy="6858000"/>
           </a:xfrm>
           <a:prstGeom prst="rect">
             <a:avLst/>
@@ -7086,7 +7137,7 @@
                                       <p:cBhvr>
                                         <p:cTn id="6" dur="1" fill="hold"/>
                                         <p:tgtEl>
-                                          <p:spTgt spid="5"/>
+                                          <p:spTgt spid="8"/>
                                         </p:tgtEl>
                                       </p:cBhvr>
                                     </p:cmd>
@@ -7124,7 +7175,7 @@
                   </p:stCondLst>
                 </p:cTn>
                 <p:tgtEl>
-                  <p:spTgt spid="5"/>
+                  <p:spTgt spid="8"/>
                 </p:tgtEl>
               </p:cMediaNode>
             </p:video>
@@ -7133,7 +7184,7 @@
                 <p:stCondLst>
                   <p:cond evt="onClick" delay="0">
                     <p:tgtEl>
-                      <p:spTgt spid="5"/>
+                      <p:spTgt spid="8"/>
                     </p:tgtEl>
                   </p:cond>
                 </p:stCondLst>
@@ -7163,7 +7214,7 @@
                                       <p:cBhvr>
                                         <p:cTn id="12" dur="1" fill="hold"/>
                                         <p:tgtEl>
-                                          <p:spTgt spid="5"/>
+                                          <p:spTgt spid="8"/>
                                         </p:tgtEl>
                                       </p:cBhvr>
                                     </p:cmd>
@@ -7181,7 +7232,7 @@
               <p:nextCondLst>
                 <p:cond evt="onClick" delay="0">
                   <p:tgtEl>
-                    <p:spTgt spid="5"/>
+                    <p:spTgt spid="8"/>
                   </p:tgtEl>
                 </p:cond>
               </p:nextCondLst>
@@ -7588,10 +7639,10 @@
       </p:pic>
       <p:sp>
         <p:nvSpPr>
-          <p:cNvPr id="7" name="TextBox 6">
+          <p:cNvPr id="8" name="TextBox 7">
             <a:extLst>
               <a:ext uri="{FF2B5EF4-FFF2-40B4-BE49-F238E27FC236}">
-                <a16:creationId xmlns:a16="http://schemas.microsoft.com/office/drawing/2014/main" id="{50515BD3-A8B2-1448-AEE4-823DC64152E1}"/>
+                <a16:creationId xmlns:a16="http://schemas.microsoft.com/office/drawing/2014/main" id="{745DFDF4-EDE2-E44E-B229-B851F78FE917}"/>
               </a:ext>
             </a:extLst>
           </p:cNvPr>
@@ -7600,8 +7651,8 @@
         </p:nvSpPr>
         <p:spPr>
           <a:xfrm>
-            <a:off x="8915400" y="6386513"/>
-            <a:ext cx="2871788" cy="461665"/>
+            <a:off x="7946967" y="6259432"/>
+            <a:ext cx="3773719" cy="369332"/>
           </a:xfrm>
           <a:prstGeom prst="rect">
             <a:avLst/>
@@ -7614,14 +7665,27 @@
           </a:bodyPr>
           <a:lstStyle/>
           <a:p>
-            <a:r>
-              <a:rPr lang="en-US" sz="2400" dirty="0">
-                <a:solidFill>
-                  <a:srgbClr val="FF0000"/>
-                </a:solidFill>
+            <a:pPr algn="r"/>
+            <a:r>
+              <a:rPr lang="en-PH" dirty="0">
+                <a:solidFill>
+                  <a:schemeClr val="tx1">
+                    <a:lumMod val="50000"/>
+                    <a:lumOff val="50000"/>
+                  </a:schemeClr>
+                </a:solidFill>
+                <a:hlinkClick r:id="rId5"/>
               </a:rPr>
-              <a:t>Put source</a:t>
-            </a:r>
+              <a:t>https://www.statista.com/</a:t>
+            </a:r>
+            <a:endParaRPr lang="en-US" dirty="0">
+              <a:solidFill>
+                <a:schemeClr val="tx1">
+                  <a:lumMod val="50000"/>
+                  <a:lumOff val="50000"/>
+                </a:schemeClr>
+              </a:solidFill>
+            </a:endParaRPr>
           </a:p>
         </p:txBody>
       </p:sp>
@@ -7635,6 +7699,13 @@
   <p:clrMapOvr>
     <a:masterClrMapping/>
   </p:clrMapOvr>
+  <p:timing>
+    <p:tnLst>
+      <p:par>
+        <p:cTn id="1" dur="indefinite" restart="never" nodeType="tmRoot"/>
+      </p:par>
+    </p:tnLst>
+  </p:timing>
 </p:sld>
 </file>
 
@@ -8181,8 +8252,8 @@
         </p:nvSpPr>
         <p:spPr>
           <a:xfrm>
-            <a:off x="8915400" y="6386513"/>
-            <a:ext cx="2871788" cy="461665"/>
+            <a:off x="7946967" y="6259432"/>
+            <a:ext cx="3773719" cy="369332"/>
           </a:xfrm>
           <a:prstGeom prst="rect">
             <a:avLst/>
@@ -8195,14 +8266,27 @@
           </a:bodyPr>
           <a:lstStyle/>
           <a:p>
-            <a:r>
-              <a:rPr lang="en-US" sz="2400" dirty="0">
-                <a:solidFill>
-                  <a:srgbClr val="FF0000"/>
-                </a:solidFill>
+            <a:pPr algn="r"/>
+            <a:r>
+              <a:rPr lang="en-PH" dirty="0">
+                <a:solidFill>
+                  <a:schemeClr val="tx1">
+                    <a:lumMod val="50000"/>
+                    <a:lumOff val="50000"/>
+                  </a:schemeClr>
+                </a:solidFill>
+                <a:hlinkClick r:id="rId3"/>
               </a:rPr>
-              <a:t>Put source</a:t>
-            </a:r>
+              <a:t>https://www.statista.com/</a:t>
+            </a:r>
+            <a:endParaRPr lang="en-US" dirty="0">
+              <a:solidFill>
+                <a:schemeClr val="tx1">
+                  <a:lumMod val="50000"/>
+                  <a:lumOff val="50000"/>
+                </a:schemeClr>
+              </a:solidFill>
+            </a:endParaRPr>
           </a:p>
         </p:txBody>
       </p:sp>
@@ -8216,6 +8300,13 @@
   <p:clrMapOvr>
     <a:masterClrMapping/>
   </p:clrMapOvr>
+  <p:timing>
+    <p:tnLst>
+      <p:par>
+        <p:cTn id="1" dur="indefinite" restart="never" nodeType="tmRoot"/>
+      </p:par>
+    </p:tnLst>
+  </p:timing>
 </p:sld>
 </file>
 
@@ -9056,6 +9147,13 @@
   <p:clrMapOvr>
     <a:masterClrMapping/>
   </p:clrMapOvr>
+  <p:timing>
+    <p:tnLst>
+      <p:par>
+        <p:cTn id="1" dur="indefinite" restart="never" nodeType="tmRoot"/>
+      </p:par>
+    </p:tnLst>
+  </p:timing>
 </p:sld>
 </file>
 
@@ -9235,6 +9333,13 @@
   <p:clrMapOvr>
     <a:masterClrMapping/>
   </p:clrMapOvr>
+  <p:timing>
+    <p:tnLst>
+      <p:par>
+        <p:cTn id="1" dur="indefinite" restart="never" nodeType="tmRoot"/>
+      </p:par>
+    </p:tnLst>
+  </p:timing>
 </p:sld>
 </file>
 
@@ -9355,6 +9460,13 @@
   <p:clrMapOvr>
     <a:masterClrMapping/>
   </p:clrMapOvr>
+  <p:timing>
+    <p:tnLst>
+      <p:par>
+        <p:cTn id="1" dur="indefinite" restart="never" nodeType="tmRoot"/>
+      </p:par>
+    </p:tnLst>
+  </p:timing>
 </p:sld>
 </file>
 

</xml_diff>